<commit_message>
scRNACITEseq - R preprocessing src
Small modifications in the scripts.
DAG of the scRNAseq scripts for preprocessing steps. 
Source file to launch all the scripts in the right order and produce html reports.
</commit_message>
<xml_diff>
--- a/README_workflow.pptx
+++ b/README_workflow.pptx
@@ -6,6 +6,7 @@
   </p:sldMasterIdLst>
   <p:sldIdLst>
     <p:sldId id="256" r:id="rId2"/>
+    <p:sldId id="257" r:id="rId3"/>
   </p:sldIdLst>
   <p:sldSz cx="6858000" cy="9906000" type="A4"/>
   <p:notesSz cx="6858000" cy="9144000"/>
@@ -243,7 +244,7 @@
           <a:p>
             <a:fld id="{9D1EF9BC-167A-4958-9165-27D2C5388731}" type="datetimeFigureOut">
               <a:rPr lang="fr-FR" smtClean="0"/>
-              <a:t>23/11/2022</a:t>
+              <a:t>01/12/2022</a:t>
             </a:fld>
             <a:endParaRPr lang="fr-FR"/>
           </a:p>
@@ -413,7 +414,7 @@
           <a:p>
             <a:fld id="{9D1EF9BC-167A-4958-9165-27D2C5388731}" type="datetimeFigureOut">
               <a:rPr lang="fr-FR" smtClean="0"/>
-              <a:t>23/11/2022</a:t>
+              <a:t>01/12/2022</a:t>
             </a:fld>
             <a:endParaRPr lang="fr-FR"/>
           </a:p>
@@ -593,7 +594,7 @@
           <a:p>
             <a:fld id="{9D1EF9BC-167A-4958-9165-27D2C5388731}" type="datetimeFigureOut">
               <a:rPr lang="fr-FR" smtClean="0"/>
-              <a:t>23/11/2022</a:t>
+              <a:t>01/12/2022</a:t>
             </a:fld>
             <a:endParaRPr lang="fr-FR"/>
           </a:p>
@@ -763,7 +764,7 @@
           <a:p>
             <a:fld id="{9D1EF9BC-167A-4958-9165-27D2C5388731}" type="datetimeFigureOut">
               <a:rPr lang="fr-FR" smtClean="0"/>
-              <a:t>23/11/2022</a:t>
+              <a:t>01/12/2022</a:t>
             </a:fld>
             <a:endParaRPr lang="fr-FR"/>
           </a:p>
@@ -1007,7 +1008,7 @@
           <a:p>
             <a:fld id="{9D1EF9BC-167A-4958-9165-27D2C5388731}" type="datetimeFigureOut">
               <a:rPr lang="fr-FR" smtClean="0"/>
-              <a:t>23/11/2022</a:t>
+              <a:t>01/12/2022</a:t>
             </a:fld>
             <a:endParaRPr lang="fr-FR"/>
           </a:p>
@@ -1239,7 +1240,7 @@
           <a:p>
             <a:fld id="{9D1EF9BC-167A-4958-9165-27D2C5388731}" type="datetimeFigureOut">
               <a:rPr lang="fr-FR" smtClean="0"/>
-              <a:t>23/11/2022</a:t>
+              <a:t>01/12/2022</a:t>
             </a:fld>
             <a:endParaRPr lang="fr-FR"/>
           </a:p>
@@ -1606,7 +1607,7 @@
           <a:p>
             <a:fld id="{9D1EF9BC-167A-4958-9165-27D2C5388731}" type="datetimeFigureOut">
               <a:rPr lang="fr-FR" smtClean="0"/>
-              <a:t>23/11/2022</a:t>
+              <a:t>01/12/2022</a:t>
             </a:fld>
             <a:endParaRPr lang="fr-FR"/>
           </a:p>
@@ -1724,7 +1725,7 @@
           <a:p>
             <a:fld id="{9D1EF9BC-167A-4958-9165-27D2C5388731}" type="datetimeFigureOut">
               <a:rPr lang="fr-FR" smtClean="0"/>
-              <a:t>23/11/2022</a:t>
+              <a:t>01/12/2022</a:t>
             </a:fld>
             <a:endParaRPr lang="fr-FR"/>
           </a:p>
@@ -1819,7 +1820,7 @@
           <a:p>
             <a:fld id="{9D1EF9BC-167A-4958-9165-27D2C5388731}" type="datetimeFigureOut">
               <a:rPr lang="fr-FR" smtClean="0"/>
-              <a:t>23/11/2022</a:t>
+              <a:t>01/12/2022</a:t>
             </a:fld>
             <a:endParaRPr lang="fr-FR"/>
           </a:p>
@@ -2096,7 +2097,7 @@
           <a:p>
             <a:fld id="{9D1EF9BC-167A-4958-9165-27D2C5388731}" type="datetimeFigureOut">
               <a:rPr lang="fr-FR" smtClean="0"/>
-              <a:t>23/11/2022</a:t>
+              <a:t>01/12/2022</a:t>
             </a:fld>
             <a:endParaRPr lang="fr-FR"/>
           </a:p>
@@ -2353,7 +2354,7 @@
           <a:p>
             <a:fld id="{9D1EF9BC-167A-4958-9165-27D2C5388731}" type="datetimeFigureOut">
               <a:rPr lang="fr-FR" smtClean="0"/>
-              <a:t>23/11/2022</a:t>
+              <a:t>01/12/2022</a:t>
             </a:fld>
             <a:endParaRPr lang="fr-FR"/>
           </a:p>
@@ -2566,7 +2567,7 @@
           <a:p>
             <a:fld id="{9D1EF9BC-167A-4958-9165-27D2C5388731}" type="datetimeFigureOut">
               <a:rPr lang="fr-FR" smtClean="0"/>
-              <a:t>23/11/2022</a:t>
+              <a:t>01/12/2022</a:t>
             </a:fld>
             <a:endParaRPr lang="fr-FR"/>
           </a:p>
@@ -3737,7 +3738,7 @@
           <a:p>
             <a:pPr algn="ctr"/>
             <a:r>
-              <a:rPr lang="fr-FR" sz="1200" i="1" u="sng" dirty="0" err="1">
+              <a:rPr lang="fr-FR" sz="1200" i="1" dirty="0" err="1">
                 <a:solidFill>
                   <a:srgbClr val="002060"/>
                 </a:solidFill>
@@ -3745,7 +3746,7 @@
               <a:t>Two</a:t>
             </a:r>
             <a:r>
-              <a:rPr lang="fr-FR" sz="1200" i="1" u="sng" dirty="0">
+              <a:rPr lang="fr-FR" sz="1200" i="1" dirty="0">
                 <a:solidFill>
                   <a:srgbClr val="002060"/>
                 </a:solidFill>
@@ -3753,14 +3754,14 @@
               <a:t> possible cluster </a:t>
             </a:r>
             <a:r>
-              <a:rPr lang="fr-FR" sz="1200" i="1" u="sng" dirty="0" err="1">
+              <a:rPr lang="fr-FR" sz="1200" i="1" dirty="0" err="1">
                 <a:solidFill>
                   <a:srgbClr val="002060"/>
                 </a:solidFill>
               </a:rPr>
               <a:t>resolutions</a:t>
             </a:r>
-            <a:endParaRPr lang="fr-FR" sz="1200" i="1" u="sng" dirty="0">
+            <a:endParaRPr lang="fr-FR" sz="1200" i="1" dirty="0">
               <a:solidFill>
                 <a:srgbClr val="002060"/>
               </a:solidFill>
@@ -4222,6 +4223,1051 @@
     <p:extLst>
       <p:ext uri="{BB962C8B-B14F-4D97-AF65-F5344CB8AC3E}">
         <p14:creationId xmlns:p14="http://schemas.microsoft.com/office/powerpoint/2010/main" val="2971349836"/>
+      </p:ext>
+    </p:extLst>
+  </p:cSld>
+  <p:clrMapOvr>
+    <a:masterClrMapping/>
+  </p:clrMapOvr>
+</p:sld>
+</file>
+
+<file path=ppt/slides/slide2.xml><?xml version="1.0" encoding="utf-8"?>
+<p:sld xmlns:a="http://schemas.openxmlformats.org/drawingml/2006/main" xmlns:r="http://schemas.openxmlformats.org/officeDocument/2006/relationships" xmlns:p="http://schemas.openxmlformats.org/presentationml/2006/main">
+  <p:cSld>
+    <p:spTree>
+      <p:nvGrpSpPr>
+        <p:cNvPr id="1" name=""/>
+        <p:cNvGrpSpPr/>
+        <p:nvPr/>
+      </p:nvGrpSpPr>
+      <p:grpSpPr>
+        <a:xfrm>
+          <a:off x="0" y="0"/>
+          <a:ext cx="0" cy="0"/>
+          <a:chOff x="0" y="0"/>
+          <a:chExt cx="0" cy="0"/>
+        </a:xfrm>
+      </p:grpSpPr>
+      <p:sp>
+        <p:nvSpPr>
+          <p:cNvPr id="4" name="Rectangle 3">
+            <a:extLst>
+              <a:ext uri="{FF2B5EF4-FFF2-40B4-BE49-F238E27FC236}">
+                <a16:creationId xmlns:a16="http://schemas.microsoft.com/office/drawing/2014/main" id="{32E7A0E7-C545-4D76-5760-36B6C09B5E89}"/>
+              </a:ext>
+            </a:extLst>
+          </p:cNvPr>
+          <p:cNvSpPr/>
+          <p:nvPr/>
+        </p:nvSpPr>
+        <p:spPr>
+          <a:xfrm>
+            <a:off x="263397" y="752262"/>
+            <a:ext cx="6373506" cy="3564549"/>
+          </a:xfrm>
+          <a:prstGeom prst="rect">
+            <a:avLst/>
+          </a:prstGeom>
+          <a:solidFill>
+            <a:srgbClr val="F7F7F7"/>
+          </a:solidFill>
+          <a:ln>
+            <a:solidFill>
+              <a:schemeClr val="bg1">
+                <a:lumMod val="75000"/>
+              </a:schemeClr>
+            </a:solidFill>
+          </a:ln>
+        </p:spPr>
+        <p:style>
+          <a:lnRef idx="2">
+            <a:schemeClr val="accent1">
+              <a:shade val="50000"/>
+            </a:schemeClr>
+          </a:lnRef>
+          <a:fillRef idx="1">
+            <a:schemeClr val="accent1"/>
+          </a:fillRef>
+          <a:effectRef idx="0">
+            <a:schemeClr val="accent1"/>
+          </a:effectRef>
+          <a:fontRef idx="minor">
+            <a:schemeClr val="lt1"/>
+          </a:fontRef>
+        </p:style>
+        <p:txBody>
+          <a:bodyPr rtlCol="0" anchor="ctr"/>
+          <a:lstStyle/>
+          <a:p>
+            <a:pPr algn="ctr"/>
+            <a:endParaRPr lang="fr-FR"/>
+          </a:p>
+        </p:txBody>
+      </p:sp>
+      <p:sp>
+        <p:nvSpPr>
+          <p:cNvPr id="5" name="Rectangle 4">
+            <a:extLst>
+              <a:ext uri="{FF2B5EF4-FFF2-40B4-BE49-F238E27FC236}">
+                <a16:creationId xmlns:a16="http://schemas.microsoft.com/office/drawing/2014/main" id="{7EAEFC15-5854-A5C1-07B4-A2C72E0CA3A0}"/>
+              </a:ext>
+            </a:extLst>
+          </p:cNvPr>
+          <p:cNvSpPr/>
+          <p:nvPr/>
+        </p:nvSpPr>
+        <p:spPr>
+          <a:xfrm>
+            <a:off x="263397" y="4383352"/>
+            <a:ext cx="6373505" cy="5076586"/>
+          </a:xfrm>
+          <a:prstGeom prst="rect">
+            <a:avLst/>
+          </a:prstGeom>
+          <a:solidFill>
+            <a:srgbClr val="F7F7F7"/>
+          </a:solidFill>
+          <a:ln>
+            <a:solidFill>
+              <a:schemeClr val="bg1">
+                <a:lumMod val="75000"/>
+              </a:schemeClr>
+            </a:solidFill>
+          </a:ln>
+        </p:spPr>
+        <p:style>
+          <a:lnRef idx="2">
+            <a:schemeClr val="accent1">
+              <a:shade val="50000"/>
+            </a:schemeClr>
+          </a:lnRef>
+          <a:fillRef idx="1">
+            <a:schemeClr val="accent1"/>
+          </a:fillRef>
+          <a:effectRef idx="0">
+            <a:schemeClr val="accent1"/>
+          </a:effectRef>
+          <a:fontRef idx="minor">
+            <a:schemeClr val="lt1"/>
+          </a:fontRef>
+        </p:style>
+        <p:txBody>
+          <a:bodyPr rtlCol="0" anchor="ctr"/>
+          <a:lstStyle/>
+          <a:p>
+            <a:pPr algn="ctr"/>
+            <a:endParaRPr lang="fr-FR"/>
+          </a:p>
+        </p:txBody>
+      </p:sp>
+      <p:sp>
+        <p:nvSpPr>
+          <p:cNvPr id="6" name="ZoneTexte 5">
+            <a:extLst>
+              <a:ext uri="{FF2B5EF4-FFF2-40B4-BE49-F238E27FC236}">
+                <a16:creationId xmlns:a16="http://schemas.microsoft.com/office/drawing/2014/main" id="{5144B355-EAF0-A967-554B-BE63746CC96E}"/>
+              </a:ext>
+            </a:extLst>
+          </p:cNvPr>
+          <p:cNvSpPr txBox="1"/>
+          <p:nvPr/>
+        </p:nvSpPr>
+        <p:spPr>
+          <a:xfrm>
+            <a:off x="2764168" y="953599"/>
+            <a:ext cx="3379386" cy="307777"/>
+          </a:xfrm>
+          <a:prstGeom prst="rect">
+            <a:avLst/>
+          </a:prstGeom>
+          <a:solidFill>
+            <a:schemeClr val="accent5">
+              <a:lumMod val="20000"/>
+              <a:lumOff val="80000"/>
+            </a:schemeClr>
+          </a:solidFill>
+        </p:spPr>
+        <p:txBody>
+          <a:bodyPr wrap="square" rtlCol="0">
+            <a:spAutoFit/>
+          </a:bodyPr>
+          <a:lstStyle/>
+          <a:p>
+            <a:pPr algn="ctr"/>
+            <a:r>
+              <a:rPr lang="fr-FR" sz="1400" dirty="0" err="1"/>
+              <a:t>scRNAseq_CITEseq_R_CreateSeuratObject</a:t>
+            </a:r>
+            <a:endParaRPr lang="fr-FR" sz="1400" dirty="0"/>
+          </a:p>
+        </p:txBody>
+      </p:sp>
+      <p:sp>
+        <p:nvSpPr>
+          <p:cNvPr id="7" name="ZoneTexte 6">
+            <a:extLst>
+              <a:ext uri="{FF2B5EF4-FFF2-40B4-BE49-F238E27FC236}">
+                <a16:creationId xmlns:a16="http://schemas.microsoft.com/office/drawing/2014/main" id="{8296DFC5-1DAF-E9A3-6D02-28CF5FF55832}"/>
+              </a:ext>
+            </a:extLst>
+          </p:cNvPr>
+          <p:cNvSpPr txBox="1"/>
+          <p:nvPr/>
+        </p:nvSpPr>
+        <p:spPr>
+          <a:xfrm>
+            <a:off x="2926685" y="1665426"/>
+            <a:ext cx="2737908" cy="307777"/>
+          </a:xfrm>
+          <a:prstGeom prst="rect">
+            <a:avLst/>
+          </a:prstGeom>
+          <a:solidFill>
+            <a:schemeClr val="accent5">
+              <a:lumMod val="20000"/>
+              <a:lumOff val="80000"/>
+            </a:schemeClr>
+          </a:solidFill>
+        </p:spPr>
+        <p:txBody>
+          <a:bodyPr wrap="square" rtlCol="0">
+            <a:spAutoFit/>
+          </a:bodyPr>
+          <a:lstStyle/>
+          <a:p>
+            <a:pPr algn="ctr"/>
+            <a:r>
+              <a:rPr lang="fr-FR" sz="1400" dirty="0" err="1"/>
+              <a:t>scRNAseq_CITEseq_R_FilterData</a:t>
+            </a:r>
+            <a:endParaRPr lang="fr-FR" sz="1400" dirty="0"/>
+          </a:p>
+        </p:txBody>
+      </p:sp>
+      <p:sp>
+        <p:nvSpPr>
+          <p:cNvPr id="8" name="ZoneTexte 7">
+            <a:extLst>
+              <a:ext uri="{FF2B5EF4-FFF2-40B4-BE49-F238E27FC236}">
+                <a16:creationId xmlns:a16="http://schemas.microsoft.com/office/drawing/2014/main" id="{AFC17C26-542D-1D8A-9A2B-AAECA9965B8A}"/>
+              </a:ext>
+            </a:extLst>
+          </p:cNvPr>
+          <p:cNvSpPr txBox="1"/>
+          <p:nvPr/>
+        </p:nvSpPr>
+        <p:spPr>
+          <a:xfrm>
+            <a:off x="465258" y="3079365"/>
+            <a:ext cx="1846148" cy="523220"/>
+          </a:xfrm>
+          <a:prstGeom prst="rect">
+            <a:avLst/>
+          </a:prstGeom>
+          <a:solidFill>
+            <a:schemeClr val="accent5">
+              <a:lumMod val="20000"/>
+              <a:lumOff val="80000"/>
+            </a:schemeClr>
+          </a:solidFill>
+        </p:spPr>
+        <p:txBody>
+          <a:bodyPr wrap="square" rtlCol="0">
+            <a:spAutoFit/>
+          </a:bodyPr>
+          <a:lstStyle/>
+          <a:p>
+            <a:pPr algn="ctr"/>
+            <a:r>
+              <a:rPr lang="fr-FR" sz="1400" dirty="0" err="1"/>
+              <a:t>scRNAseq_CITEseq_R</a:t>
+            </a:r>
+            <a:r>
+              <a:rPr lang="fr-FR" sz="1400" dirty="0"/>
+              <a:t>_</a:t>
+            </a:r>
+          </a:p>
+          <a:p>
+            <a:pPr algn="ctr"/>
+            <a:r>
+              <a:rPr lang="fr-FR" sz="1400" dirty="0" err="1"/>
+              <a:t>BatchEffectCorrection</a:t>
+            </a:r>
+            <a:endParaRPr lang="fr-FR" sz="1400" dirty="0"/>
+          </a:p>
+        </p:txBody>
+      </p:sp>
+      <p:sp>
+        <p:nvSpPr>
+          <p:cNvPr id="9" name="ZoneTexte 8">
+            <a:extLst>
+              <a:ext uri="{FF2B5EF4-FFF2-40B4-BE49-F238E27FC236}">
+                <a16:creationId xmlns:a16="http://schemas.microsoft.com/office/drawing/2014/main" id="{0D97939E-4DA1-828E-F04B-C4C67DF977AC}"/>
+              </a:ext>
+            </a:extLst>
+          </p:cNvPr>
+          <p:cNvSpPr txBox="1"/>
+          <p:nvPr/>
+        </p:nvSpPr>
+        <p:spPr>
+          <a:xfrm>
+            <a:off x="2669424" y="2379482"/>
+            <a:ext cx="3231786" cy="317937"/>
+          </a:xfrm>
+          <a:prstGeom prst="rect">
+            <a:avLst/>
+          </a:prstGeom>
+          <a:solidFill>
+            <a:schemeClr val="accent5">
+              <a:lumMod val="20000"/>
+              <a:lumOff val="80000"/>
+            </a:schemeClr>
+          </a:solidFill>
+        </p:spPr>
+        <p:txBody>
+          <a:bodyPr wrap="square" rtlCol="0">
+            <a:spAutoFit/>
+          </a:bodyPr>
+          <a:lstStyle/>
+          <a:p>
+            <a:pPr algn="ctr"/>
+            <a:r>
+              <a:rPr lang="fr-FR" sz="1400" dirty="0" err="1"/>
+              <a:t>scRNAseq_CITEseq_R_NormalizeData</a:t>
+            </a:r>
+            <a:endParaRPr lang="fr-FR" sz="1400" dirty="0"/>
+          </a:p>
+        </p:txBody>
+      </p:sp>
+      <p:cxnSp>
+        <p:nvCxnSpPr>
+          <p:cNvPr id="10" name="Connecteur droit avec flèche 9">
+            <a:extLst>
+              <a:ext uri="{FF2B5EF4-FFF2-40B4-BE49-F238E27FC236}">
+                <a16:creationId xmlns:a16="http://schemas.microsoft.com/office/drawing/2014/main" id="{923C498B-D4D2-C4FB-FAC1-7B6CFC560DDA}"/>
+              </a:ext>
+            </a:extLst>
+          </p:cNvPr>
+          <p:cNvCxnSpPr>
+            <a:cxnSpLocks/>
+          </p:cNvCxnSpPr>
+          <p:nvPr/>
+        </p:nvCxnSpPr>
+        <p:spPr>
+          <a:xfrm>
+            <a:off x="4327711" y="1312329"/>
+            <a:ext cx="0" cy="298909"/>
+          </a:xfrm>
+          <a:prstGeom prst="straightConnector1">
+            <a:avLst/>
+          </a:prstGeom>
+          <a:ln>
+            <a:tailEnd type="triangle"/>
+          </a:ln>
+        </p:spPr>
+        <p:style>
+          <a:lnRef idx="1">
+            <a:schemeClr val="dk1"/>
+          </a:lnRef>
+          <a:fillRef idx="0">
+            <a:schemeClr val="dk1"/>
+          </a:fillRef>
+          <a:effectRef idx="0">
+            <a:schemeClr val="dk1"/>
+          </a:effectRef>
+          <a:fontRef idx="minor">
+            <a:schemeClr val="tx1"/>
+          </a:fontRef>
+        </p:style>
+      </p:cxnSp>
+      <p:cxnSp>
+        <p:nvCxnSpPr>
+          <p:cNvPr id="11" name="Connecteur droit avec flèche 10">
+            <a:extLst>
+              <a:ext uri="{FF2B5EF4-FFF2-40B4-BE49-F238E27FC236}">
+                <a16:creationId xmlns:a16="http://schemas.microsoft.com/office/drawing/2014/main" id="{8EC0316D-CBFB-77CF-21DF-F1B5FDBFACAB}"/>
+              </a:ext>
+            </a:extLst>
+          </p:cNvPr>
+          <p:cNvCxnSpPr>
+            <a:cxnSpLocks/>
+          </p:cNvCxnSpPr>
+          <p:nvPr/>
+        </p:nvCxnSpPr>
+        <p:spPr>
+          <a:xfrm>
+            <a:off x="4327711" y="2031997"/>
+            <a:ext cx="0" cy="318166"/>
+          </a:xfrm>
+          <a:prstGeom prst="straightConnector1">
+            <a:avLst/>
+          </a:prstGeom>
+          <a:ln>
+            <a:tailEnd type="triangle"/>
+          </a:ln>
+        </p:spPr>
+        <p:style>
+          <a:lnRef idx="1">
+            <a:schemeClr val="dk1"/>
+          </a:lnRef>
+          <a:fillRef idx="0">
+            <a:schemeClr val="dk1"/>
+          </a:fillRef>
+          <a:effectRef idx="0">
+            <a:schemeClr val="dk1"/>
+          </a:effectRef>
+          <a:fontRef idx="minor">
+            <a:schemeClr val="tx1"/>
+          </a:fontRef>
+        </p:style>
+      </p:cxnSp>
+      <p:cxnSp>
+        <p:nvCxnSpPr>
+          <p:cNvPr id="12" name="Connecteur droit avec flèche 11">
+            <a:extLst>
+              <a:ext uri="{FF2B5EF4-FFF2-40B4-BE49-F238E27FC236}">
+                <a16:creationId xmlns:a16="http://schemas.microsoft.com/office/drawing/2014/main" id="{3A1C8FDD-F977-EF61-DD00-94D39074C92D}"/>
+              </a:ext>
+            </a:extLst>
+          </p:cNvPr>
+          <p:cNvCxnSpPr>
+            <a:cxnSpLocks/>
+          </p:cNvCxnSpPr>
+          <p:nvPr/>
+        </p:nvCxnSpPr>
+        <p:spPr>
+          <a:xfrm>
+            <a:off x="4327711" y="2994039"/>
+            <a:ext cx="0" cy="499789"/>
+          </a:xfrm>
+          <a:prstGeom prst="straightConnector1">
+            <a:avLst/>
+          </a:prstGeom>
+          <a:ln>
+            <a:tailEnd type="triangle"/>
+          </a:ln>
+        </p:spPr>
+        <p:style>
+          <a:lnRef idx="1">
+            <a:schemeClr val="dk1"/>
+          </a:lnRef>
+          <a:fillRef idx="0">
+            <a:schemeClr val="dk1"/>
+          </a:fillRef>
+          <a:effectRef idx="0">
+            <a:schemeClr val="dk1"/>
+          </a:effectRef>
+          <a:fontRef idx="minor">
+            <a:schemeClr val="tx1"/>
+          </a:fontRef>
+        </p:style>
+      </p:cxnSp>
+      <p:sp>
+        <p:nvSpPr>
+          <p:cNvPr id="13" name="ZoneTexte 12">
+            <a:extLst>
+              <a:ext uri="{FF2B5EF4-FFF2-40B4-BE49-F238E27FC236}">
+                <a16:creationId xmlns:a16="http://schemas.microsoft.com/office/drawing/2014/main" id="{56C65B24-C69C-C0AB-7090-EB4AAB3ADB4D}"/>
+              </a:ext>
+            </a:extLst>
+          </p:cNvPr>
+          <p:cNvSpPr txBox="1"/>
+          <p:nvPr/>
+        </p:nvSpPr>
+        <p:spPr>
+          <a:xfrm rot="20390314">
+            <a:off x="102228" y="139074"/>
+            <a:ext cx="1464488" cy="738664"/>
+          </a:xfrm>
+          <a:prstGeom prst="rect">
+            <a:avLst/>
+          </a:prstGeom>
+          <a:noFill/>
+        </p:spPr>
+        <p:txBody>
+          <a:bodyPr wrap="square" rtlCol="0">
+            <a:spAutoFit/>
+          </a:bodyPr>
+          <a:lstStyle/>
+          <a:p>
+            <a:r>
+              <a:rPr lang="fr-FR" sz="1400" b="1" dirty="0">
+                <a:solidFill>
+                  <a:srgbClr val="7030A0"/>
+                </a:solidFill>
+              </a:rPr>
+              <a:t>matrix.mtx.gz</a:t>
+            </a:r>
+          </a:p>
+          <a:p>
+            <a:r>
+              <a:rPr lang="fr-FR" sz="1400" b="1" dirty="0">
+                <a:solidFill>
+                  <a:srgbClr val="7030A0"/>
+                </a:solidFill>
+              </a:rPr>
+              <a:t>barcodes.tsv.gz</a:t>
+            </a:r>
+          </a:p>
+          <a:p>
+            <a:r>
+              <a:rPr lang="fr-FR" sz="1400" b="1" dirty="0">
+                <a:solidFill>
+                  <a:srgbClr val="7030A0"/>
+                </a:solidFill>
+              </a:rPr>
+              <a:t>features.tsv.gz</a:t>
+            </a:r>
+          </a:p>
+        </p:txBody>
+      </p:sp>
+      <p:cxnSp>
+        <p:nvCxnSpPr>
+          <p:cNvPr id="14" name="Connecteur : en arc 13">
+            <a:extLst>
+              <a:ext uri="{FF2B5EF4-FFF2-40B4-BE49-F238E27FC236}">
+                <a16:creationId xmlns:a16="http://schemas.microsoft.com/office/drawing/2014/main" id="{3648F7AD-65C7-B256-5754-9622E407B395}"/>
+              </a:ext>
+            </a:extLst>
+          </p:cNvPr>
+          <p:cNvCxnSpPr>
+            <a:cxnSpLocks/>
+          </p:cNvCxnSpPr>
+          <p:nvPr/>
+        </p:nvCxnSpPr>
+        <p:spPr>
+          <a:xfrm>
+            <a:off x="1378424" y="565773"/>
+            <a:ext cx="1299388" cy="592780"/>
+          </a:xfrm>
+          <a:prstGeom prst="curvedConnector3">
+            <a:avLst/>
+          </a:prstGeom>
+          <a:ln>
+            <a:tailEnd type="triangle"/>
+          </a:ln>
+        </p:spPr>
+        <p:style>
+          <a:lnRef idx="1">
+            <a:schemeClr val="dk1"/>
+          </a:lnRef>
+          <a:fillRef idx="0">
+            <a:schemeClr val="dk1"/>
+          </a:fillRef>
+          <a:effectRef idx="0">
+            <a:schemeClr val="dk1"/>
+          </a:effectRef>
+          <a:fontRef idx="minor">
+            <a:schemeClr val="tx1"/>
+          </a:fontRef>
+        </p:style>
+      </p:cxnSp>
+      <p:sp>
+        <p:nvSpPr>
+          <p:cNvPr id="15" name="ZoneTexte 14">
+            <a:extLst>
+              <a:ext uri="{FF2B5EF4-FFF2-40B4-BE49-F238E27FC236}">
+                <a16:creationId xmlns:a16="http://schemas.microsoft.com/office/drawing/2014/main" id="{21F52AC3-4313-D634-164C-AF193A703079}"/>
+              </a:ext>
+            </a:extLst>
+          </p:cNvPr>
+          <p:cNvSpPr txBox="1"/>
+          <p:nvPr/>
+        </p:nvSpPr>
+        <p:spPr>
+          <a:xfrm>
+            <a:off x="4404714" y="177775"/>
+            <a:ext cx="2333070" cy="307777"/>
+          </a:xfrm>
+          <a:prstGeom prst="rect">
+            <a:avLst/>
+          </a:prstGeom>
+          <a:noFill/>
+        </p:spPr>
+        <p:txBody>
+          <a:bodyPr wrap="square" rtlCol="0">
+            <a:spAutoFit/>
+          </a:bodyPr>
+          <a:lstStyle/>
+          <a:p>
+            <a:r>
+              <a:rPr lang="fr-FR" sz="1400" b="1" dirty="0">
+                <a:effectLst>
+                  <a:outerShdw blurRad="38100" dist="38100" dir="2700000" algn="tl">
+                    <a:srgbClr val="000000">
+                      <a:alpha val="43137"/>
+                    </a:srgbClr>
+                  </a:outerShdw>
+                </a:effectLst>
+              </a:rPr>
+              <a:t>Workflow </a:t>
+            </a:r>
+            <a:r>
+              <a:rPr lang="fr-FR" sz="1400" b="1" dirty="0" err="1">
+                <a:effectLst>
+                  <a:outerShdw blurRad="38100" dist="38100" dir="2700000" algn="tl">
+                    <a:srgbClr val="000000">
+                      <a:alpha val="43137"/>
+                    </a:srgbClr>
+                  </a:outerShdw>
+                </a:effectLst>
+              </a:rPr>
+              <a:t>scRNAseq-CITEseq</a:t>
+            </a:r>
+            <a:endParaRPr lang="fr-FR" sz="1400" b="1" dirty="0">
+              <a:effectLst>
+                <a:outerShdw blurRad="38100" dist="38100" dir="2700000" algn="tl">
+                  <a:srgbClr val="000000">
+                    <a:alpha val="43137"/>
+                  </a:srgbClr>
+                </a:outerShdw>
+              </a:effectLst>
+            </a:endParaRPr>
+          </a:p>
+        </p:txBody>
+      </p:sp>
+      <p:sp>
+        <p:nvSpPr>
+          <p:cNvPr id="16" name="ZoneTexte 15">
+            <a:extLst>
+              <a:ext uri="{FF2B5EF4-FFF2-40B4-BE49-F238E27FC236}">
+                <a16:creationId xmlns:a16="http://schemas.microsoft.com/office/drawing/2014/main" id="{5068C85B-D865-5335-AF45-A196374FA0B3}"/>
+              </a:ext>
+            </a:extLst>
+          </p:cNvPr>
+          <p:cNvSpPr txBox="1"/>
+          <p:nvPr/>
+        </p:nvSpPr>
+        <p:spPr>
+          <a:xfrm>
+            <a:off x="2669424" y="2653376"/>
+            <a:ext cx="3231786" cy="276999"/>
+          </a:xfrm>
+          <a:prstGeom prst="rect">
+            <a:avLst/>
+          </a:prstGeom>
+          <a:noFill/>
+        </p:spPr>
+        <p:txBody>
+          <a:bodyPr wrap="square" rtlCol="0">
+            <a:spAutoFit/>
+          </a:bodyPr>
+          <a:lstStyle/>
+          <a:p>
+            <a:pPr algn="ctr"/>
+            <a:r>
+              <a:rPr lang="fr-FR" sz="1200" i="1" dirty="0" err="1">
+                <a:solidFill>
+                  <a:srgbClr val="002060"/>
+                </a:solidFill>
+              </a:rPr>
+              <a:t>with</a:t>
+            </a:r>
+            <a:r>
+              <a:rPr lang="fr-FR" sz="1200" i="1" dirty="0">
+                <a:solidFill>
+                  <a:srgbClr val="002060"/>
+                </a:solidFill>
+              </a:rPr>
+              <a:t> or </a:t>
+            </a:r>
+            <a:r>
+              <a:rPr lang="fr-FR" sz="1200" i="1" dirty="0" err="1">
+                <a:solidFill>
+                  <a:srgbClr val="002060"/>
+                </a:solidFill>
+              </a:rPr>
+              <a:t>without</a:t>
+            </a:r>
+            <a:r>
+              <a:rPr lang="fr-FR" sz="1200" i="1" dirty="0">
+                <a:solidFill>
+                  <a:srgbClr val="002060"/>
+                </a:solidFill>
+              </a:rPr>
+              <a:t> </a:t>
+            </a:r>
+            <a:r>
+              <a:rPr lang="fr-FR" sz="1200" i="1" dirty="0" err="1">
+                <a:solidFill>
+                  <a:srgbClr val="002060"/>
+                </a:solidFill>
+              </a:rPr>
+              <a:t>cell</a:t>
+            </a:r>
+            <a:r>
+              <a:rPr lang="fr-FR" sz="1200" i="1" dirty="0">
+                <a:solidFill>
+                  <a:srgbClr val="002060"/>
+                </a:solidFill>
+              </a:rPr>
+              <a:t> cycle </a:t>
+            </a:r>
+            <a:r>
+              <a:rPr lang="fr-FR" sz="1200" i="1" dirty="0" err="1">
+                <a:solidFill>
+                  <a:srgbClr val="002060"/>
+                </a:solidFill>
+              </a:rPr>
+              <a:t>regression</a:t>
+            </a:r>
+            <a:endParaRPr lang="fr-FR" sz="1200" i="1" dirty="0">
+              <a:solidFill>
+                <a:srgbClr val="002060"/>
+              </a:solidFill>
+            </a:endParaRPr>
+          </a:p>
+        </p:txBody>
+      </p:sp>
+      <p:cxnSp>
+        <p:nvCxnSpPr>
+          <p:cNvPr id="17" name="Connecteur droit avec flèche 16">
+            <a:extLst>
+              <a:ext uri="{FF2B5EF4-FFF2-40B4-BE49-F238E27FC236}">
+                <a16:creationId xmlns:a16="http://schemas.microsoft.com/office/drawing/2014/main" id="{40347F5C-19E0-D52E-CF11-8E0F867FECC1}"/>
+              </a:ext>
+            </a:extLst>
+          </p:cNvPr>
+          <p:cNvCxnSpPr>
+            <a:cxnSpLocks/>
+          </p:cNvCxnSpPr>
+          <p:nvPr/>
+        </p:nvCxnSpPr>
+        <p:spPr>
+          <a:xfrm flipH="1">
+            <a:off x="3262545" y="4210927"/>
+            <a:ext cx="1122373" cy="630269"/>
+          </a:xfrm>
+          <a:prstGeom prst="straightConnector1">
+            <a:avLst/>
+          </a:prstGeom>
+          <a:ln>
+            <a:tailEnd type="triangle"/>
+          </a:ln>
+        </p:spPr>
+        <p:style>
+          <a:lnRef idx="1">
+            <a:schemeClr val="dk1"/>
+          </a:lnRef>
+          <a:fillRef idx="0">
+            <a:schemeClr val="dk1"/>
+          </a:fillRef>
+          <a:effectRef idx="0">
+            <a:schemeClr val="dk1"/>
+          </a:effectRef>
+          <a:fontRef idx="minor">
+            <a:schemeClr val="tx1"/>
+          </a:fontRef>
+        </p:style>
+      </p:cxnSp>
+      <p:cxnSp>
+        <p:nvCxnSpPr>
+          <p:cNvPr id="18" name="Connecteur droit avec flèche 17">
+            <a:extLst>
+              <a:ext uri="{FF2B5EF4-FFF2-40B4-BE49-F238E27FC236}">
+                <a16:creationId xmlns:a16="http://schemas.microsoft.com/office/drawing/2014/main" id="{CD3EF72E-9D48-7E1E-9E8A-3069DA42BF81}"/>
+              </a:ext>
+            </a:extLst>
+          </p:cNvPr>
+          <p:cNvCxnSpPr/>
+          <p:nvPr/>
+        </p:nvCxnSpPr>
+        <p:spPr>
+          <a:xfrm flipH="1">
+            <a:off x="3323961" y="4210927"/>
+            <a:ext cx="1060957" cy="1502974"/>
+          </a:xfrm>
+          <a:prstGeom prst="straightConnector1">
+            <a:avLst/>
+          </a:prstGeom>
+          <a:ln>
+            <a:tailEnd type="triangle"/>
+          </a:ln>
+        </p:spPr>
+        <p:style>
+          <a:lnRef idx="1">
+            <a:schemeClr val="dk1"/>
+          </a:lnRef>
+          <a:fillRef idx="0">
+            <a:schemeClr val="dk1"/>
+          </a:fillRef>
+          <a:effectRef idx="0">
+            <a:schemeClr val="dk1"/>
+          </a:effectRef>
+          <a:fontRef idx="minor">
+            <a:schemeClr val="tx1"/>
+          </a:fontRef>
+        </p:style>
+      </p:cxnSp>
+      <p:cxnSp>
+        <p:nvCxnSpPr>
+          <p:cNvPr id="19" name="Connecteur droit avec flèche 18">
+            <a:extLst>
+              <a:ext uri="{FF2B5EF4-FFF2-40B4-BE49-F238E27FC236}">
+                <a16:creationId xmlns:a16="http://schemas.microsoft.com/office/drawing/2014/main" id="{F13224BA-0194-D0AB-1010-21735CBF0144}"/>
+              </a:ext>
+            </a:extLst>
+          </p:cNvPr>
+          <p:cNvCxnSpPr/>
+          <p:nvPr/>
+        </p:nvCxnSpPr>
+        <p:spPr>
+          <a:xfrm>
+            <a:off x="4384918" y="4214079"/>
+            <a:ext cx="750249" cy="960997"/>
+          </a:xfrm>
+          <a:prstGeom prst="straightConnector1">
+            <a:avLst/>
+          </a:prstGeom>
+          <a:ln>
+            <a:tailEnd type="triangle"/>
+          </a:ln>
+        </p:spPr>
+        <p:style>
+          <a:lnRef idx="1">
+            <a:schemeClr val="dk1"/>
+          </a:lnRef>
+          <a:fillRef idx="0">
+            <a:schemeClr val="dk1"/>
+          </a:fillRef>
+          <a:effectRef idx="0">
+            <a:schemeClr val="dk1"/>
+          </a:effectRef>
+          <a:fontRef idx="minor">
+            <a:schemeClr val="tx1"/>
+          </a:fontRef>
+        </p:style>
+      </p:cxnSp>
+      <p:sp>
+        <p:nvSpPr>
+          <p:cNvPr id="20" name="ZoneTexte 19">
+            <a:extLst>
+              <a:ext uri="{FF2B5EF4-FFF2-40B4-BE49-F238E27FC236}">
+                <a16:creationId xmlns:a16="http://schemas.microsoft.com/office/drawing/2014/main" id="{3D4C968A-0A53-E5CB-E363-54930365A6D1}"/>
+              </a:ext>
+            </a:extLst>
+          </p:cNvPr>
+          <p:cNvSpPr txBox="1"/>
+          <p:nvPr/>
+        </p:nvSpPr>
+        <p:spPr>
+          <a:xfrm rot="16200000">
+            <a:off x="4717138" y="2283330"/>
+            <a:ext cx="3564548" cy="369332"/>
+          </a:xfrm>
+          <a:prstGeom prst="rect">
+            <a:avLst/>
+          </a:prstGeom>
+          <a:noFill/>
+        </p:spPr>
+        <p:txBody>
+          <a:bodyPr wrap="square" rtlCol="0">
+            <a:spAutoFit/>
+          </a:bodyPr>
+          <a:lstStyle/>
+          <a:p>
+            <a:pPr algn="ctr"/>
+            <a:r>
+              <a:rPr lang="fr-FR" b="1" dirty="0">
+                <a:solidFill>
+                  <a:schemeClr val="bg1">
+                    <a:lumMod val="65000"/>
+                  </a:schemeClr>
+                </a:solidFill>
+              </a:rPr>
+              <a:t>DATA CLEANING AND FILTERING</a:t>
+            </a:r>
+          </a:p>
+        </p:txBody>
+      </p:sp>
+      <p:sp>
+        <p:nvSpPr>
+          <p:cNvPr id="21" name="ZoneTexte 20">
+            <a:extLst>
+              <a:ext uri="{FF2B5EF4-FFF2-40B4-BE49-F238E27FC236}">
+                <a16:creationId xmlns:a16="http://schemas.microsoft.com/office/drawing/2014/main" id="{DD3BD272-4F0E-0611-3A42-8C95DA36E7BB}"/>
+              </a:ext>
+            </a:extLst>
+          </p:cNvPr>
+          <p:cNvSpPr txBox="1"/>
+          <p:nvPr/>
+        </p:nvSpPr>
+        <p:spPr>
+          <a:xfrm rot="16200000">
+            <a:off x="5093497" y="7022247"/>
+            <a:ext cx="2825086" cy="369332"/>
+          </a:xfrm>
+          <a:prstGeom prst="rect">
+            <a:avLst/>
+          </a:prstGeom>
+          <a:noFill/>
+        </p:spPr>
+        <p:txBody>
+          <a:bodyPr wrap="square" rtlCol="0">
+            <a:spAutoFit/>
+          </a:bodyPr>
+          <a:lstStyle/>
+          <a:p>
+            <a:r>
+              <a:rPr lang="fr-FR" b="1" dirty="0">
+                <a:solidFill>
+                  <a:schemeClr val="bg1">
+                    <a:lumMod val="65000"/>
+                  </a:schemeClr>
+                </a:solidFill>
+              </a:rPr>
+              <a:t>DOWNSTREAM ANALYSIS</a:t>
+            </a:r>
+          </a:p>
+        </p:txBody>
+      </p:sp>
+      <p:sp>
+        <p:nvSpPr>
+          <p:cNvPr id="22" name="ZoneTexte 21">
+            <a:extLst>
+              <a:ext uri="{FF2B5EF4-FFF2-40B4-BE49-F238E27FC236}">
+                <a16:creationId xmlns:a16="http://schemas.microsoft.com/office/drawing/2014/main" id="{A83E710F-ADEA-8613-26B2-763842EA0D10}"/>
+              </a:ext>
+            </a:extLst>
+          </p:cNvPr>
+          <p:cNvSpPr txBox="1"/>
+          <p:nvPr/>
+        </p:nvSpPr>
+        <p:spPr>
+          <a:xfrm>
+            <a:off x="2652014" y="3575978"/>
+            <a:ext cx="3379385" cy="307777"/>
+          </a:xfrm>
+          <a:prstGeom prst="rect">
+            <a:avLst/>
+          </a:prstGeom>
+          <a:solidFill>
+            <a:schemeClr val="accent5">
+              <a:lumMod val="20000"/>
+              <a:lumOff val="80000"/>
+            </a:schemeClr>
+          </a:solidFill>
+        </p:spPr>
+        <p:txBody>
+          <a:bodyPr wrap="square" rtlCol="0">
+            <a:spAutoFit/>
+          </a:bodyPr>
+          <a:lstStyle/>
+          <a:p>
+            <a:pPr algn="ctr"/>
+            <a:r>
+              <a:rPr lang="fr-FR" sz="1400" dirty="0" err="1"/>
+              <a:t>scRNAseq_CITEseq_R_ReductionDimension</a:t>
+            </a:r>
+            <a:endParaRPr lang="fr-FR" sz="1400" dirty="0"/>
+          </a:p>
+        </p:txBody>
+      </p:sp>
+      <p:cxnSp>
+        <p:nvCxnSpPr>
+          <p:cNvPr id="23" name="Connecteur droit avec flèche 22">
+            <a:extLst>
+              <a:ext uri="{FF2B5EF4-FFF2-40B4-BE49-F238E27FC236}">
+                <a16:creationId xmlns:a16="http://schemas.microsoft.com/office/drawing/2014/main" id="{2754E702-C40B-20CD-D22A-8FD4AEC352DB}"/>
+              </a:ext>
+            </a:extLst>
+          </p:cNvPr>
+          <p:cNvCxnSpPr/>
+          <p:nvPr/>
+        </p:nvCxnSpPr>
+        <p:spPr>
+          <a:xfrm flipH="1">
+            <a:off x="1455373" y="2563454"/>
+            <a:ext cx="1145489" cy="391925"/>
+          </a:xfrm>
+          <a:prstGeom prst="straightConnector1">
+            <a:avLst/>
+          </a:prstGeom>
+          <a:ln>
+            <a:tailEnd type="triangle"/>
+          </a:ln>
+        </p:spPr>
+        <p:style>
+          <a:lnRef idx="1">
+            <a:schemeClr val="dk1"/>
+          </a:lnRef>
+          <a:fillRef idx="0">
+            <a:schemeClr val="dk1"/>
+          </a:fillRef>
+          <a:effectRef idx="0">
+            <a:schemeClr val="dk1"/>
+          </a:effectRef>
+          <a:fontRef idx="minor">
+            <a:schemeClr val="tx1"/>
+          </a:fontRef>
+        </p:style>
+      </p:cxnSp>
+      <p:sp>
+        <p:nvSpPr>
+          <p:cNvPr id="24" name="ZoneTexte 23">
+            <a:extLst>
+              <a:ext uri="{FF2B5EF4-FFF2-40B4-BE49-F238E27FC236}">
+                <a16:creationId xmlns:a16="http://schemas.microsoft.com/office/drawing/2014/main" id="{91DDD279-2F61-E8BA-5F0E-760CB17675FD}"/>
+              </a:ext>
+            </a:extLst>
+          </p:cNvPr>
+          <p:cNvSpPr txBox="1"/>
+          <p:nvPr/>
+        </p:nvSpPr>
+        <p:spPr>
+          <a:xfrm>
+            <a:off x="3214399" y="3838883"/>
+            <a:ext cx="2611192" cy="276999"/>
+          </a:xfrm>
+          <a:prstGeom prst="rect">
+            <a:avLst/>
+          </a:prstGeom>
+          <a:noFill/>
+        </p:spPr>
+        <p:txBody>
+          <a:bodyPr wrap="square" rtlCol="0">
+            <a:spAutoFit/>
+          </a:bodyPr>
+          <a:lstStyle/>
+          <a:p>
+            <a:pPr algn="ctr"/>
+            <a:r>
+              <a:rPr lang="fr-FR" sz="1200" i="1" dirty="0" err="1">
+                <a:solidFill>
+                  <a:srgbClr val="002060"/>
+                </a:solidFill>
+              </a:rPr>
+              <a:t>Three</a:t>
+            </a:r>
+            <a:r>
+              <a:rPr lang="fr-FR" sz="1200" i="1" dirty="0">
+                <a:solidFill>
+                  <a:srgbClr val="002060"/>
+                </a:solidFill>
+              </a:rPr>
+              <a:t> possible cluster </a:t>
+            </a:r>
+            <a:r>
+              <a:rPr lang="fr-FR" sz="1200" i="1" dirty="0" err="1">
+                <a:solidFill>
+                  <a:srgbClr val="002060"/>
+                </a:solidFill>
+              </a:rPr>
+              <a:t>resolutions</a:t>
+            </a:r>
+            <a:endParaRPr lang="fr-FR" sz="1200" i="1" dirty="0">
+              <a:solidFill>
+                <a:srgbClr val="002060"/>
+              </a:solidFill>
+            </a:endParaRPr>
+          </a:p>
+        </p:txBody>
+      </p:sp>
+    </p:spTree>
+    <p:extLst>
+      <p:ext uri="{BB962C8B-B14F-4D97-AF65-F5344CB8AC3E}">
+        <p14:creationId xmlns:p14="http://schemas.microsoft.com/office/powerpoint/2010/main" val="2905202256"/>
       </p:ext>
     </p:extLst>
   </p:cSld>

</xml_diff>

<commit_message>
FULL ANALYSIS - scRNAseq_CITEseq functional - 20/03/23
All scripts tested and functional. 
src1 and src2 files to launch scripts of preprocessing or downstream analysis. src all to launch the global analysis by night.
</commit_message>
<xml_diff>
--- a/README_workflow.pptx
+++ b/README_workflow.pptx
@@ -244,7 +244,7 @@
           <a:p>
             <a:fld id="{9D1EF9BC-167A-4958-9165-27D2C5388731}" type="datetimeFigureOut">
               <a:rPr lang="fr-FR" smtClean="0"/>
-              <a:t>01/12/2022</a:t>
+              <a:t>20/03/2023</a:t>
             </a:fld>
             <a:endParaRPr lang="fr-FR"/>
           </a:p>
@@ -414,7 +414,7 @@
           <a:p>
             <a:fld id="{9D1EF9BC-167A-4958-9165-27D2C5388731}" type="datetimeFigureOut">
               <a:rPr lang="fr-FR" smtClean="0"/>
-              <a:t>01/12/2022</a:t>
+              <a:t>20/03/2023</a:t>
             </a:fld>
             <a:endParaRPr lang="fr-FR"/>
           </a:p>
@@ -594,7 +594,7 @@
           <a:p>
             <a:fld id="{9D1EF9BC-167A-4958-9165-27D2C5388731}" type="datetimeFigureOut">
               <a:rPr lang="fr-FR" smtClean="0"/>
-              <a:t>01/12/2022</a:t>
+              <a:t>20/03/2023</a:t>
             </a:fld>
             <a:endParaRPr lang="fr-FR"/>
           </a:p>
@@ -764,7 +764,7 @@
           <a:p>
             <a:fld id="{9D1EF9BC-167A-4958-9165-27D2C5388731}" type="datetimeFigureOut">
               <a:rPr lang="fr-FR" smtClean="0"/>
-              <a:t>01/12/2022</a:t>
+              <a:t>20/03/2023</a:t>
             </a:fld>
             <a:endParaRPr lang="fr-FR"/>
           </a:p>
@@ -1008,7 +1008,7 @@
           <a:p>
             <a:fld id="{9D1EF9BC-167A-4958-9165-27D2C5388731}" type="datetimeFigureOut">
               <a:rPr lang="fr-FR" smtClean="0"/>
-              <a:t>01/12/2022</a:t>
+              <a:t>20/03/2023</a:t>
             </a:fld>
             <a:endParaRPr lang="fr-FR"/>
           </a:p>
@@ -1240,7 +1240,7 @@
           <a:p>
             <a:fld id="{9D1EF9BC-167A-4958-9165-27D2C5388731}" type="datetimeFigureOut">
               <a:rPr lang="fr-FR" smtClean="0"/>
-              <a:t>01/12/2022</a:t>
+              <a:t>20/03/2023</a:t>
             </a:fld>
             <a:endParaRPr lang="fr-FR"/>
           </a:p>
@@ -1607,7 +1607,7 @@
           <a:p>
             <a:fld id="{9D1EF9BC-167A-4958-9165-27D2C5388731}" type="datetimeFigureOut">
               <a:rPr lang="fr-FR" smtClean="0"/>
-              <a:t>01/12/2022</a:t>
+              <a:t>20/03/2023</a:t>
             </a:fld>
             <a:endParaRPr lang="fr-FR"/>
           </a:p>
@@ -1725,7 +1725,7 @@
           <a:p>
             <a:fld id="{9D1EF9BC-167A-4958-9165-27D2C5388731}" type="datetimeFigureOut">
               <a:rPr lang="fr-FR" smtClean="0"/>
-              <a:t>01/12/2022</a:t>
+              <a:t>20/03/2023</a:t>
             </a:fld>
             <a:endParaRPr lang="fr-FR"/>
           </a:p>
@@ -1820,7 +1820,7 @@
           <a:p>
             <a:fld id="{9D1EF9BC-167A-4958-9165-27D2C5388731}" type="datetimeFigureOut">
               <a:rPr lang="fr-FR" smtClean="0"/>
-              <a:t>01/12/2022</a:t>
+              <a:t>20/03/2023</a:t>
             </a:fld>
             <a:endParaRPr lang="fr-FR"/>
           </a:p>
@@ -2097,7 +2097,7 @@
           <a:p>
             <a:fld id="{9D1EF9BC-167A-4958-9165-27D2C5388731}" type="datetimeFigureOut">
               <a:rPr lang="fr-FR" smtClean="0"/>
-              <a:t>01/12/2022</a:t>
+              <a:t>20/03/2023</a:t>
             </a:fld>
             <a:endParaRPr lang="fr-FR"/>
           </a:p>
@@ -2354,7 +2354,7 @@
           <a:p>
             <a:fld id="{9D1EF9BC-167A-4958-9165-27D2C5388731}" type="datetimeFigureOut">
               <a:rPr lang="fr-FR" smtClean="0"/>
-              <a:t>01/12/2022</a:t>
+              <a:t>20/03/2023</a:t>
             </a:fld>
             <a:endParaRPr lang="fr-FR"/>
           </a:p>
@@ -2567,7 +2567,7 @@
           <a:p>
             <a:fld id="{9D1EF9BC-167A-4958-9165-27D2C5388731}" type="datetimeFigureOut">
               <a:rPr lang="fr-FR" smtClean="0"/>
-              <a:t>01/12/2022</a:t>
+              <a:t>20/03/2023</a:t>
             </a:fld>
             <a:endParaRPr lang="fr-FR"/>
           </a:p>
@@ -4459,7 +4459,7 @@
         </p:nvSpPr>
         <p:spPr>
           <a:xfrm>
-            <a:off x="465258" y="3079365"/>
+            <a:off x="408263" y="2602620"/>
             <a:ext cx="1846148" cy="523220"/>
           </a:xfrm>
           <a:prstGeom prst="rect">
@@ -4936,8 +4936,8 @@
         </p:nvCxnSpPr>
         <p:spPr>
           <a:xfrm flipH="1">
-            <a:off x="3262545" y="4210927"/>
-            <a:ext cx="1122373" cy="630269"/>
+            <a:off x="2926685" y="4210927"/>
+            <a:ext cx="1458233" cy="839414"/>
           </a:xfrm>
           <a:prstGeom prst="straightConnector1">
             <a:avLst/>
@@ -4970,13 +4970,15 @@
               </a:ext>
             </a:extLst>
           </p:cNvPr>
-          <p:cNvCxnSpPr/>
+          <p:cNvCxnSpPr>
+            <a:cxnSpLocks/>
+          </p:cNvCxnSpPr>
           <p:nvPr/>
         </p:nvCxnSpPr>
         <p:spPr>
           <a:xfrm flipH="1">
-            <a:off x="3323961" y="4210927"/>
-            <a:ext cx="1060957" cy="1502974"/>
+            <a:off x="2340677" y="4209783"/>
+            <a:ext cx="2044241" cy="1700558"/>
           </a:xfrm>
           <a:prstGeom prst="straightConnector1">
             <a:avLst/>
@@ -5009,13 +5011,15 @@
               </a:ext>
             </a:extLst>
           </p:cNvPr>
-          <p:cNvCxnSpPr/>
+          <p:cNvCxnSpPr>
+            <a:cxnSpLocks/>
+          </p:cNvCxnSpPr>
           <p:nvPr/>
         </p:nvCxnSpPr>
         <p:spPr>
           <a:xfrm>
             <a:off x="4384918" y="4214079"/>
-            <a:ext cx="750249" cy="960997"/>
+            <a:ext cx="896260" cy="836262"/>
           </a:xfrm>
           <a:prstGeom prst="straightConnector1">
             <a:avLst/>
@@ -5173,13 +5177,15 @@
               </a:ext>
             </a:extLst>
           </p:cNvPr>
-          <p:cNvCxnSpPr/>
+          <p:cNvCxnSpPr>
+            <a:cxnSpLocks/>
+          </p:cNvCxnSpPr>
           <p:nvPr/>
         </p:nvCxnSpPr>
         <p:spPr>
           <a:xfrm flipH="1">
-            <a:off x="1455373" y="2563454"/>
-            <a:ext cx="1145489" cy="391925"/>
+            <a:off x="2340677" y="2563454"/>
+            <a:ext cx="260185" cy="291381"/>
           </a:xfrm>
           <a:prstGeom prst="straightConnector1">
             <a:avLst/>
@@ -5261,6 +5267,531 @@
                 <a:srgbClr val="002060"/>
               </a:solidFill>
             </a:endParaRPr>
+          </a:p>
+        </p:txBody>
+      </p:sp>
+      <p:sp>
+        <p:nvSpPr>
+          <p:cNvPr id="2" name="ZoneTexte 1">
+            <a:extLst>
+              <a:ext uri="{FF2B5EF4-FFF2-40B4-BE49-F238E27FC236}">
+                <a16:creationId xmlns:a16="http://schemas.microsoft.com/office/drawing/2014/main" id="{CF2E967C-6E8C-2C2A-524D-276CA5482291}"/>
+              </a:ext>
+            </a:extLst>
+          </p:cNvPr>
+          <p:cNvSpPr txBox="1"/>
+          <p:nvPr/>
+        </p:nvSpPr>
+        <p:spPr>
+          <a:xfrm>
+            <a:off x="479443" y="4824580"/>
+            <a:ext cx="2447242" cy="523220"/>
+          </a:xfrm>
+          <a:prstGeom prst="rect">
+            <a:avLst/>
+          </a:prstGeom>
+          <a:solidFill>
+            <a:schemeClr val="accent5">
+              <a:lumMod val="20000"/>
+              <a:lumOff val="80000"/>
+            </a:schemeClr>
+          </a:solidFill>
+        </p:spPr>
+        <p:txBody>
+          <a:bodyPr wrap="square" rtlCol="0">
+            <a:spAutoFit/>
+          </a:bodyPr>
+          <a:lstStyle/>
+          <a:p>
+            <a:pPr algn="ctr"/>
+            <a:r>
+              <a:rPr lang="fr-FR" sz="1400" dirty="0" err="1"/>
+              <a:t>scRNAseq_CITEseq_R</a:t>
+            </a:r>
+            <a:r>
+              <a:rPr lang="fr-FR" sz="1400" dirty="0"/>
+              <a:t>_</a:t>
+            </a:r>
+          </a:p>
+          <a:p>
+            <a:pPr algn="ctr"/>
+            <a:r>
+              <a:rPr lang="fr-FR" sz="1400" dirty="0" err="1"/>
+              <a:t>DWNS_ClustersStatistics</a:t>
+            </a:r>
+            <a:endParaRPr lang="fr-FR" sz="1400" dirty="0"/>
+          </a:p>
+        </p:txBody>
+      </p:sp>
+      <p:sp>
+        <p:nvSpPr>
+          <p:cNvPr id="3" name="ZoneTexte 2">
+            <a:extLst>
+              <a:ext uri="{FF2B5EF4-FFF2-40B4-BE49-F238E27FC236}">
+                <a16:creationId xmlns:a16="http://schemas.microsoft.com/office/drawing/2014/main" id="{D4C6679D-965D-93FA-922E-21D4F5930A65}"/>
+              </a:ext>
+            </a:extLst>
+          </p:cNvPr>
+          <p:cNvSpPr txBox="1"/>
+          <p:nvPr/>
+        </p:nvSpPr>
+        <p:spPr>
+          <a:xfrm>
+            <a:off x="1357810" y="7142259"/>
+            <a:ext cx="2447242" cy="523220"/>
+          </a:xfrm>
+          <a:prstGeom prst="rect">
+            <a:avLst/>
+          </a:prstGeom>
+          <a:solidFill>
+            <a:schemeClr val="accent5">
+              <a:lumMod val="20000"/>
+              <a:lumOff val="80000"/>
+            </a:schemeClr>
+          </a:solidFill>
+        </p:spPr>
+        <p:txBody>
+          <a:bodyPr wrap="square" rtlCol="0">
+            <a:spAutoFit/>
+          </a:bodyPr>
+          <a:lstStyle/>
+          <a:p>
+            <a:pPr algn="ctr"/>
+            <a:r>
+              <a:rPr lang="fr-FR" sz="1400" dirty="0" err="1"/>
+              <a:t>scRNAseq_CITEseq_R_DWNS</a:t>
+            </a:r>
+            <a:r>
+              <a:rPr lang="fr-FR" sz="1400" dirty="0"/>
+              <a:t>_</a:t>
+            </a:r>
+          </a:p>
+          <a:p>
+            <a:pPr algn="ctr"/>
+            <a:r>
+              <a:rPr lang="fr-FR" sz="1400" dirty="0"/>
+              <a:t>PathwaysAnalysis_n1</a:t>
+            </a:r>
+          </a:p>
+        </p:txBody>
+      </p:sp>
+      <p:sp>
+        <p:nvSpPr>
+          <p:cNvPr id="25" name="ZoneTexte 24">
+            <a:extLst>
+              <a:ext uri="{FF2B5EF4-FFF2-40B4-BE49-F238E27FC236}">
+                <a16:creationId xmlns:a16="http://schemas.microsoft.com/office/drawing/2014/main" id="{322E8AC0-6B4B-DF04-266E-0DFDDE3EE379}"/>
+              </a:ext>
+            </a:extLst>
+          </p:cNvPr>
+          <p:cNvSpPr txBox="1"/>
+          <p:nvPr/>
+        </p:nvSpPr>
+        <p:spPr>
+          <a:xfrm>
+            <a:off x="4234249" y="5177466"/>
+            <a:ext cx="2307966" cy="523220"/>
+          </a:xfrm>
+          <a:prstGeom prst="rect">
+            <a:avLst/>
+          </a:prstGeom>
+          <a:solidFill>
+            <a:schemeClr val="accent5">
+              <a:lumMod val="20000"/>
+              <a:lumOff val="80000"/>
+            </a:schemeClr>
+          </a:solidFill>
+        </p:spPr>
+        <p:txBody>
+          <a:bodyPr wrap="square" rtlCol="0">
+            <a:spAutoFit/>
+          </a:bodyPr>
+          <a:lstStyle/>
+          <a:p>
+            <a:pPr algn="ctr"/>
+            <a:r>
+              <a:rPr lang="fr-FR" sz="1400" dirty="0" err="1"/>
+              <a:t>scRNAseq_CITEseq_R_DWNS_CompareConditions_GO</a:t>
+            </a:r>
+            <a:endParaRPr lang="fr-FR" sz="1400" dirty="0"/>
+          </a:p>
+        </p:txBody>
+      </p:sp>
+      <p:sp>
+        <p:nvSpPr>
+          <p:cNvPr id="26" name="ZoneTexte 25">
+            <a:extLst>
+              <a:ext uri="{FF2B5EF4-FFF2-40B4-BE49-F238E27FC236}">
+                <a16:creationId xmlns:a16="http://schemas.microsoft.com/office/drawing/2014/main" id="{7800B3DB-41B1-CFEA-3406-6E44E91F991F}"/>
+              </a:ext>
+            </a:extLst>
+          </p:cNvPr>
+          <p:cNvSpPr txBox="1"/>
+          <p:nvPr/>
+        </p:nvSpPr>
+        <p:spPr>
+          <a:xfrm>
+            <a:off x="4062788" y="6442845"/>
+            <a:ext cx="2204781" cy="523220"/>
+          </a:xfrm>
+          <a:prstGeom prst="rect">
+            <a:avLst/>
+          </a:prstGeom>
+          <a:solidFill>
+            <a:schemeClr val="accent5">
+              <a:lumMod val="20000"/>
+              <a:lumOff val="80000"/>
+            </a:schemeClr>
+          </a:solidFill>
+        </p:spPr>
+        <p:txBody>
+          <a:bodyPr wrap="square" rtlCol="0">
+            <a:spAutoFit/>
+          </a:bodyPr>
+          <a:lstStyle/>
+          <a:p>
+            <a:pPr algn="ctr"/>
+            <a:r>
+              <a:rPr lang="fr-FR" sz="1400" dirty="0" err="1"/>
+              <a:t>scRNAseq_CITEseq_R</a:t>
+            </a:r>
+            <a:r>
+              <a:rPr lang="fr-FR" sz="1400" dirty="0"/>
+              <a:t>_</a:t>
+            </a:r>
+          </a:p>
+          <a:p>
+            <a:pPr algn="ctr"/>
+            <a:r>
+              <a:rPr lang="fr-FR" sz="1400" dirty="0" err="1"/>
+              <a:t>DWNS_CorrelationADTRNA</a:t>
+            </a:r>
+            <a:endParaRPr lang="fr-FR" sz="1400" dirty="0"/>
+          </a:p>
+        </p:txBody>
+      </p:sp>
+      <p:sp>
+        <p:nvSpPr>
+          <p:cNvPr id="27" name="ZoneTexte 26">
+            <a:extLst>
+              <a:ext uri="{FF2B5EF4-FFF2-40B4-BE49-F238E27FC236}">
+                <a16:creationId xmlns:a16="http://schemas.microsoft.com/office/drawing/2014/main" id="{65FA9C48-C060-8C0B-644E-BBCECC4C7415}"/>
+              </a:ext>
+            </a:extLst>
+          </p:cNvPr>
+          <p:cNvSpPr txBox="1"/>
+          <p:nvPr/>
+        </p:nvSpPr>
+        <p:spPr>
+          <a:xfrm>
+            <a:off x="1365593" y="7913871"/>
+            <a:ext cx="2447242" cy="523220"/>
+          </a:xfrm>
+          <a:prstGeom prst="rect">
+            <a:avLst/>
+          </a:prstGeom>
+          <a:solidFill>
+            <a:schemeClr val="accent5">
+              <a:lumMod val="20000"/>
+              <a:lumOff val="80000"/>
+            </a:schemeClr>
+          </a:solidFill>
+        </p:spPr>
+        <p:txBody>
+          <a:bodyPr wrap="square" rtlCol="0">
+            <a:spAutoFit/>
+          </a:bodyPr>
+          <a:lstStyle/>
+          <a:p>
+            <a:pPr algn="ctr"/>
+            <a:r>
+              <a:rPr lang="fr-FR" sz="1400" dirty="0" err="1"/>
+              <a:t>scRNAseq_CITEseq_R_DWNS</a:t>
+            </a:r>
+            <a:r>
+              <a:rPr lang="fr-FR" sz="1400" dirty="0"/>
+              <a:t>_</a:t>
+            </a:r>
+          </a:p>
+          <a:p>
+            <a:pPr algn="ctr"/>
+            <a:r>
+              <a:rPr lang="fr-FR" sz="1400" dirty="0"/>
+              <a:t>PathwaysAnalysis_n2</a:t>
+            </a:r>
+          </a:p>
+        </p:txBody>
+      </p:sp>
+      <p:sp>
+        <p:nvSpPr>
+          <p:cNvPr id="28" name="ZoneTexte 27">
+            <a:extLst>
+              <a:ext uri="{FF2B5EF4-FFF2-40B4-BE49-F238E27FC236}">
+                <a16:creationId xmlns:a16="http://schemas.microsoft.com/office/drawing/2014/main" id="{BD6EB8CF-66EB-AE8F-6037-8CF0029B6277}"/>
+              </a:ext>
+            </a:extLst>
+          </p:cNvPr>
+          <p:cNvSpPr txBox="1"/>
+          <p:nvPr/>
+        </p:nvSpPr>
+        <p:spPr>
+          <a:xfrm>
+            <a:off x="1368785" y="8654623"/>
+            <a:ext cx="2447242" cy="523220"/>
+          </a:xfrm>
+          <a:prstGeom prst="rect">
+            <a:avLst/>
+          </a:prstGeom>
+          <a:solidFill>
+            <a:schemeClr val="accent5">
+              <a:lumMod val="20000"/>
+              <a:lumOff val="80000"/>
+            </a:schemeClr>
+          </a:solidFill>
+        </p:spPr>
+        <p:txBody>
+          <a:bodyPr wrap="square" rtlCol="0">
+            <a:spAutoFit/>
+          </a:bodyPr>
+          <a:lstStyle/>
+          <a:p>
+            <a:pPr algn="ctr"/>
+            <a:r>
+              <a:rPr lang="fr-FR" sz="1400" dirty="0" err="1"/>
+              <a:t>scRNAseq_CITEseq_R_DWNS</a:t>
+            </a:r>
+            <a:r>
+              <a:rPr lang="fr-FR" sz="1400" dirty="0"/>
+              <a:t>_</a:t>
+            </a:r>
+          </a:p>
+          <a:p>
+            <a:pPr algn="ctr"/>
+            <a:r>
+              <a:rPr lang="fr-FR" sz="1400" dirty="0"/>
+              <a:t>PathwaysAnalysis_n3</a:t>
+            </a:r>
+          </a:p>
+        </p:txBody>
+      </p:sp>
+      <p:sp>
+        <p:nvSpPr>
+          <p:cNvPr id="29" name="ZoneTexte 28">
+            <a:extLst>
+              <a:ext uri="{FF2B5EF4-FFF2-40B4-BE49-F238E27FC236}">
+                <a16:creationId xmlns:a16="http://schemas.microsoft.com/office/drawing/2014/main" id="{D77ABAA6-B5B2-2C1C-D06B-B6E9A8696F13}"/>
+              </a:ext>
+            </a:extLst>
+          </p:cNvPr>
+          <p:cNvSpPr txBox="1"/>
+          <p:nvPr/>
+        </p:nvSpPr>
+        <p:spPr>
+          <a:xfrm>
+            <a:off x="618719" y="5910450"/>
+            <a:ext cx="2307966" cy="523220"/>
+          </a:xfrm>
+          <a:prstGeom prst="rect">
+            <a:avLst/>
+          </a:prstGeom>
+          <a:solidFill>
+            <a:schemeClr val="accent5">
+              <a:lumMod val="20000"/>
+              <a:lumOff val="80000"/>
+            </a:schemeClr>
+          </a:solidFill>
+        </p:spPr>
+        <p:txBody>
+          <a:bodyPr wrap="square" rtlCol="0">
+            <a:spAutoFit/>
+          </a:bodyPr>
+          <a:lstStyle/>
+          <a:p>
+            <a:pPr algn="ctr"/>
+            <a:r>
+              <a:rPr lang="fr-FR" sz="1400" dirty="0" err="1"/>
+              <a:t>scRNAseq_CITEseq_R_DWNS_ClustersInvestigation_GO</a:t>
+            </a:r>
+            <a:endParaRPr lang="fr-FR" sz="1400" dirty="0"/>
+          </a:p>
+        </p:txBody>
+      </p:sp>
+      <p:sp>
+        <p:nvSpPr>
+          <p:cNvPr id="30" name="ZoneTexte 29">
+            <a:extLst>
+              <a:ext uri="{FF2B5EF4-FFF2-40B4-BE49-F238E27FC236}">
+                <a16:creationId xmlns:a16="http://schemas.microsoft.com/office/drawing/2014/main" id="{CF03AB72-7A62-4689-EADE-D28CEEB9A996}"/>
+              </a:ext>
+            </a:extLst>
+          </p:cNvPr>
+          <p:cNvSpPr txBox="1"/>
+          <p:nvPr/>
+        </p:nvSpPr>
+        <p:spPr>
+          <a:xfrm>
+            <a:off x="420231" y="3406392"/>
+            <a:ext cx="1904497" cy="738664"/>
+          </a:xfrm>
+          <a:prstGeom prst="rect">
+            <a:avLst/>
+          </a:prstGeom>
+          <a:solidFill>
+            <a:schemeClr val="accent5">
+              <a:lumMod val="20000"/>
+              <a:lumOff val="80000"/>
+            </a:schemeClr>
+          </a:solidFill>
+        </p:spPr>
+        <p:txBody>
+          <a:bodyPr wrap="square" rtlCol="0">
+            <a:spAutoFit/>
+          </a:bodyPr>
+          <a:lstStyle/>
+          <a:p>
+            <a:pPr algn="ctr"/>
+            <a:r>
+              <a:rPr lang="fr-FR" sz="1400" dirty="0" err="1"/>
+              <a:t>scRNAseq_CITEseq_R_GenomePosition_GeneNameCountMatrix</a:t>
+            </a:r>
+            <a:endParaRPr lang="fr-FR" sz="1400" dirty="0"/>
+          </a:p>
+        </p:txBody>
+      </p:sp>
+      <p:cxnSp>
+        <p:nvCxnSpPr>
+          <p:cNvPr id="35" name="Connecteur droit avec flèche 34">
+            <a:extLst>
+              <a:ext uri="{FF2B5EF4-FFF2-40B4-BE49-F238E27FC236}">
+                <a16:creationId xmlns:a16="http://schemas.microsoft.com/office/drawing/2014/main" id="{7B396E8E-E6B9-1F8D-1BD4-98BD1E289E00}"/>
+              </a:ext>
+            </a:extLst>
+          </p:cNvPr>
+          <p:cNvCxnSpPr>
+            <a:cxnSpLocks/>
+          </p:cNvCxnSpPr>
+          <p:nvPr/>
+        </p:nvCxnSpPr>
+        <p:spPr>
+          <a:xfrm flipH="1">
+            <a:off x="2724944" y="4209674"/>
+            <a:ext cx="1659974" cy="2932585"/>
+          </a:xfrm>
+          <a:prstGeom prst="straightConnector1">
+            <a:avLst/>
+          </a:prstGeom>
+          <a:ln>
+            <a:tailEnd type="triangle"/>
+          </a:ln>
+        </p:spPr>
+        <p:style>
+          <a:lnRef idx="1">
+            <a:schemeClr val="dk1"/>
+          </a:lnRef>
+          <a:fillRef idx="0">
+            <a:schemeClr val="dk1"/>
+          </a:fillRef>
+          <a:effectRef idx="0">
+            <a:schemeClr val="dk1"/>
+          </a:effectRef>
+          <a:fontRef idx="minor">
+            <a:schemeClr val="tx1"/>
+          </a:fontRef>
+        </p:style>
+      </p:cxnSp>
+      <p:sp>
+        <p:nvSpPr>
+          <p:cNvPr id="47" name="Forme libre : forme 46">
+            <a:extLst>
+              <a:ext uri="{FF2B5EF4-FFF2-40B4-BE49-F238E27FC236}">
+                <a16:creationId xmlns:a16="http://schemas.microsoft.com/office/drawing/2014/main" id="{4C809AAC-B427-9DFE-54A2-DD67D581C865}"/>
+              </a:ext>
+            </a:extLst>
+          </p:cNvPr>
+          <p:cNvSpPr/>
+          <p:nvPr/>
+        </p:nvSpPr>
+        <p:spPr>
+          <a:xfrm>
+            <a:off x="4023360" y="4233454"/>
+            <a:ext cx="381354" cy="2126706"/>
+          </a:xfrm>
+          <a:custGeom>
+            <a:avLst/>
+            <a:gdLst>
+              <a:gd name="connsiteX0" fmla="*/ 335280 w 335280"/>
+              <a:gd name="connsiteY0" fmla="*/ 0 h 2123440"/>
+              <a:gd name="connsiteX1" fmla="*/ 20320 w 335280"/>
+              <a:gd name="connsiteY1" fmla="*/ 1056640 h 2123440"/>
+              <a:gd name="connsiteX2" fmla="*/ 0 w 335280"/>
+              <a:gd name="connsiteY2" fmla="*/ 1859280 h 2123440"/>
+              <a:gd name="connsiteX3" fmla="*/ 264160 w 335280"/>
+              <a:gd name="connsiteY3" fmla="*/ 2123440 h 2123440"/>
+            </a:gdLst>
+            <a:ahLst/>
+            <a:cxnLst>
+              <a:cxn ang="0">
+                <a:pos x="connsiteX0" y="connsiteY0"/>
+              </a:cxn>
+              <a:cxn ang="0">
+                <a:pos x="connsiteX1" y="connsiteY1"/>
+              </a:cxn>
+              <a:cxn ang="0">
+                <a:pos x="connsiteX2" y="connsiteY2"/>
+              </a:cxn>
+              <a:cxn ang="0">
+                <a:pos x="connsiteX3" y="connsiteY3"/>
+              </a:cxn>
+            </a:cxnLst>
+            <a:rect l="l" t="t" r="r" b="b"/>
+            <a:pathLst>
+              <a:path w="335280" h="2123440">
+                <a:moveTo>
+                  <a:pt x="335280" y="0"/>
+                </a:moveTo>
+                <a:lnTo>
+                  <a:pt x="20320" y="1056640"/>
+                </a:lnTo>
+                <a:lnTo>
+                  <a:pt x="0" y="1859280"/>
+                </a:lnTo>
+                <a:lnTo>
+                  <a:pt x="264160" y="2123440"/>
+                </a:lnTo>
+              </a:path>
+            </a:pathLst>
+          </a:custGeom>
+          <a:noFill/>
+          <a:ln w="6350">
+            <a:solidFill>
+              <a:schemeClr val="tx1"/>
+            </a:solidFill>
+            <a:headEnd type="none" w="med" len="med"/>
+            <a:tailEnd type="triangle" w="med" len="med"/>
+          </a:ln>
+        </p:spPr>
+        <p:style>
+          <a:lnRef idx="2">
+            <a:schemeClr val="accent1">
+              <a:shade val="50000"/>
+            </a:schemeClr>
+          </a:lnRef>
+          <a:fillRef idx="1">
+            <a:schemeClr val="accent1"/>
+          </a:fillRef>
+          <a:effectRef idx="0">
+            <a:schemeClr val="accent1"/>
+          </a:effectRef>
+          <a:fontRef idx="minor">
+            <a:schemeClr val="lt1"/>
+          </a:fontRef>
+        </p:style>
+        <p:txBody>
+          <a:bodyPr rtlCol="0" anchor="ctr"/>
+          <a:lstStyle/>
+          <a:p>
+            <a:pPr algn="ctr"/>
+            <a:endParaRPr lang="fr-FR"/>
           </a:p>
         </p:txBody>
       </p:sp>

</xml_diff>

<commit_message>
UPDATE README and README_worflow
All analyses described (scRNAseq, scATACseq, bulkATACseq, compare scATACseq and bulkATACseq).
</commit_message>
<xml_diff>
--- a/README_workflow.pptx
+++ b/README_workflow.pptx
@@ -5,8 +5,10 @@
     <p:sldMasterId id="2147483660" r:id="rId1"/>
   </p:sldMasterIdLst>
   <p:sldIdLst>
-    <p:sldId id="256" r:id="rId2"/>
-    <p:sldId id="257" r:id="rId3"/>
+    <p:sldId id="257" r:id="rId2"/>
+    <p:sldId id="256" r:id="rId3"/>
+    <p:sldId id="258" r:id="rId4"/>
+    <p:sldId id="259" r:id="rId5"/>
   </p:sldIdLst>
   <p:sldSz cx="6858000" cy="9906000" type="A4"/>
   <p:notesSz cx="6858000" cy="9144000"/>
@@ -244,7 +246,7 @@
           <a:p>
             <a:fld id="{9D1EF9BC-167A-4958-9165-27D2C5388731}" type="datetimeFigureOut">
               <a:rPr lang="fr-FR" smtClean="0"/>
-              <a:t>20/03/2023</a:t>
+              <a:t>18/04/2023</a:t>
             </a:fld>
             <a:endParaRPr lang="fr-FR"/>
           </a:p>
@@ -414,7 +416,7 @@
           <a:p>
             <a:fld id="{9D1EF9BC-167A-4958-9165-27D2C5388731}" type="datetimeFigureOut">
               <a:rPr lang="fr-FR" smtClean="0"/>
-              <a:t>20/03/2023</a:t>
+              <a:t>18/04/2023</a:t>
             </a:fld>
             <a:endParaRPr lang="fr-FR"/>
           </a:p>
@@ -594,7 +596,7 @@
           <a:p>
             <a:fld id="{9D1EF9BC-167A-4958-9165-27D2C5388731}" type="datetimeFigureOut">
               <a:rPr lang="fr-FR" smtClean="0"/>
-              <a:t>20/03/2023</a:t>
+              <a:t>18/04/2023</a:t>
             </a:fld>
             <a:endParaRPr lang="fr-FR"/>
           </a:p>
@@ -764,7 +766,7 @@
           <a:p>
             <a:fld id="{9D1EF9BC-167A-4958-9165-27D2C5388731}" type="datetimeFigureOut">
               <a:rPr lang="fr-FR" smtClean="0"/>
-              <a:t>20/03/2023</a:t>
+              <a:t>18/04/2023</a:t>
             </a:fld>
             <a:endParaRPr lang="fr-FR"/>
           </a:p>
@@ -1008,7 +1010,7 @@
           <a:p>
             <a:fld id="{9D1EF9BC-167A-4958-9165-27D2C5388731}" type="datetimeFigureOut">
               <a:rPr lang="fr-FR" smtClean="0"/>
-              <a:t>20/03/2023</a:t>
+              <a:t>18/04/2023</a:t>
             </a:fld>
             <a:endParaRPr lang="fr-FR"/>
           </a:p>
@@ -1240,7 +1242,7 @@
           <a:p>
             <a:fld id="{9D1EF9BC-167A-4958-9165-27D2C5388731}" type="datetimeFigureOut">
               <a:rPr lang="fr-FR" smtClean="0"/>
-              <a:t>20/03/2023</a:t>
+              <a:t>18/04/2023</a:t>
             </a:fld>
             <a:endParaRPr lang="fr-FR"/>
           </a:p>
@@ -1607,7 +1609,7 @@
           <a:p>
             <a:fld id="{9D1EF9BC-167A-4958-9165-27D2C5388731}" type="datetimeFigureOut">
               <a:rPr lang="fr-FR" smtClean="0"/>
-              <a:t>20/03/2023</a:t>
+              <a:t>18/04/2023</a:t>
             </a:fld>
             <a:endParaRPr lang="fr-FR"/>
           </a:p>
@@ -1725,7 +1727,7 @@
           <a:p>
             <a:fld id="{9D1EF9BC-167A-4958-9165-27D2C5388731}" type="datetimeFigureOut">
               <a:rPr lang="fr-FR" smtClean="0"/>
-              <a:t>20/03/2023</a:t>
+              <a:t>18/04/2023</a:t>
             </a:fld>
             <a:endParaRPr lang="fr-FR"/>
           </a:p>
@@ -1820,7 +1822,7 @@
           <a:p>
             <a:fld id="{9D1EF9BC-167A-4958-9165-27D2C5388731}" type="datetimeFigureOut">
               <a:rPr lang="fr-FR" smtClean="0"/>
-              <a:t>20/03/2023</a:t>
+              <a:t>18/04/2023</a:t>
             </a:fld>
             <a:endParaRPr lang="fr-FR"/>
           </a:p>
@@ -2097,7 +2099,7 @@
           <a:p>
             <a:fld id="{9D1EF9BC-167A-4958-9165-27D2C5388731}" type="datetimeFigureOut">
               <a:rPr lang="fr-FR" smtClean="0"/>
-              <a:t>20/03/2023</a:t>
+              <a:t>18/04/2023</a:t>
             </a:fld>
             <a:endParaRPr lang="fr-FR"/>
           </a:p>
@@ -2354,7 +2356,7 @@
           <a:p>
             <a:fld id="{9D1EF9BC-167A-4958-9165-27D2C5388731}" type="datetimeFigureOut">
               <a:rPr lang="fr-FR" smtClean="0"/>
-              <a:t>20/03/2023</a:t>
+              <a:t>18/04/2023</a:t>
             </a:fld>
             <a:endParaRPr lang="fr-FR"/>
           </a:p>
@@ -2567,7 +2569,7 @@
           <a:p>
             <a:fld id="{9D1EF9BC-167A-4958-9165-27D2C5388731}" type="datetimeFigureOut">
               <a:rPr lang="fr-FR" smtClean="0"/>
-              <a:t>20/03/2023</a:t>
+              <a:t>18/04/2023</a:t>
             </a:fld>
             <a:endParaRPr lang="fr-FR"/>
           </a:p>
@@ -2974,1283 +2976,6 @@
       </p:grpSpPr>
       <p:sp>
         <p:nvSpPr>
-          <p:cNvPr id="12" name="Rectangle 11">
-            <a:extLst>
-              <a:ext uri="{FF2B5EF4-FFF2-40B4-BE49-F238E27FC236}">
-                <a16:creationId xmlns:a16="http://schemas.microsoft.com/office/drawing/2014/main" id="{546374D4-535C-6913-48BE-FEB00EC1EEEC}"/>
-              </a:ext>
-            </a:extLst>
-          </p:cNvPr>
-          <p:cNvSpPr/>
-          <p:nvPr/>
-        </p:nvSpPr>
-        <p:spPr>
-          <a:xfrm>
-            <a:off x="263397" y="752262"/>
-            <a:ext cx="6373506" cy="4502644"/>
-          </a:xfrm>
-          <a:prstGeom prst="rect">
-            <a:avLst/>
-          </a:prstGeom>
-          <a:solidFill>
-            <a:srgbClr val="F7F7F7"/>
-          </a:solidFill>
-          <a:ln>
-            <a:solidFill>
-              <a:schemeClr val="bg1">
-                <a:lumMod val="75000"/>
-              </a:schemeClr>
-            </a:solidFill>
-          </a:ln>
-        </p:spPr>
-        <p:style>
-          <a:lnRef idx="2">
-            <a:schemeClr val="accent1">
-              <a:shade val="50000"/>
-            </a:schemeClr>
-          </a:lnRef>
-          <a:fillRef idx="1">
-            <a:schemeClr val="accent1"/>
-          </a:fillRef>
-          <a:effectRef idx="0">
-            <a:schemeClr val="accent1"/>
-          </a:effectRef>
-          <a:fontRef idx="minor">
-            <a:schemeClr val="lt1"/>
-          </a:fontRef>
-        </p:style>
-        <p:txBody>
-          <a:bodyPr rtlCol="0" anchor="ctr"/>
-          <a:lstStyle/>
-          <a:p>
-            <a:pPr algn="ctr"/>
-            <a:endParaRPr lang="fr-FR"/>
-          </a:p>
-        </p:txBody>
-      </p:sp>
-      <p:sp>
-        <p:nvSpPr>
-          <p:cNvPr id="2" name="Rectangle 1">
-            <a:extLst>
-              <a:ext uri="{FF2B5EF4-FFF2-40B4-BE49-F238E27FC236}">
-                <a16:creationId xmlns:a16="http://schemas.microsoft.com/office/drawing/2014/main" id="{7E9FD109-DA13-79B5-0C2C-B07B49BEB124}"/>
-              </a:ext>
-            </a:extLst>
-          </p:cNvPr>
-          <p:cNvSpPr/>
-          <p:nvPr/>
-        </p:nvSpPr>
-        <p:spPr>
-          <a:xfrm>
-            <a:off x="263397" y="5363326"/>
-            <a:ext cx="6373505" cy="4096612"/>
-          </a:xfrm>
-          <a:prstGeom prst="rect">
-            <a:avLst/>
-          </a:prstGeom>
-          <a:solidFill>
-            <a:srgbClr val="F7F7F7"/>
-          </a:solidFill>
-          <a:ln>
-            <a:solidFill>
-              <a:schemeClr val="bg1">
-                <a:lumMod val="75000"/>
-              </a:schemeClr>
-            </a:solidFill>
-          </a:ln>
-        </p:spPr>
-        <p:style>
-          <a:lnRef idx="2">
-            <a:schemeClr val="accent1">
-              <a:shade val="50000"/>
-            </a:schemeClr>
-          </a:lnRef>
-          <a:fillRef idx="1">
-            <a:schemeClr val="accent1"/>
-          </a:fillRef>
-          <a:effectRef idx="0">
-            <a:schemeClr val="accent1"/>
-          </a:effectRef>
-          <a:fontRef idx="minor">
-            <a:schemeClr val="lt1"/>
-          </a:fontRef>
-        </p:style>
-        <p:txBody>
-          <a:bodyPr rtlCol="0" anchor="ctr"/>
-          <a:lstStyle/>
-          <a:p>
-            <a:pPr algn="ctr"/>
-            <a:endParaRPr lang="fr-FR"/>
-          </a:p>
-        </p:txBody>
-      </p:sp>
-      <p:sp>
-        <p:nvSpPr>
-          <p:cNvPr id="4" name="ZoneTexte 3">
-            <a:extLst>
-              <a:ext uri="{FF2B5EF4-FFF2-40B4-BE49-F238E27FC236}">
-                <a16:creationId xmlns:a16="http://schemas.microsoft.com/office/drawing/2014/main" id="{BF0B8EFB-8208-3132-FA69-639DCAC96D36}"/>
-              </a:ext>
-            </a:extLst>
-          </p:cNvPr>
-          <p:cNvSpPr txBox="1"/>
-          <p:nvPr/>
-        </p:nvSpPr>
-        <p:spPr>
-          <a:xfrm>
-            <a:off x="1156871" y="953599"/>
-            <a:ext cx="2463487" cy="292388"/>
-          </a:xfrm>
-          <a:prstGeom prst="rect">
-            <a:avLst/>
-          </a:prstGeom>
-          <a:solidFill>
-            <a:schemeClr val="accent5">
-              <a:lumMod val="20000"/>
-              <a:lumOff val="80000"/>
-            </a:schemeClr>
-          </a:solidFill>
-        </p:spPr>
-        <p:txBody>
-          <a:bodyPr wrap="square" rtlCol="0">
-            <a:spAutoFit/>
-          </a:bodyPr>
-          <a:lstStyle/>
-          <a:p>
-            <a:pPr algn="ctr"/>
-            <a:r>
-              <a:rPr lang="fr-FR" sz="1300" dirty="0" err="1"/>
-              <a:t>scATACseq_R_CreateSeuratObject</a:t>
-            </a:r>
-            <a:endParaRPr lang="fr-FR" sz="1300" dirty="0"/>
-          </a:p>
-        </p:txBody>
-      </p:sp>
-      <p:sp>
-        <p:nvSpPr>
-          <p:cNvPr id="5" name="ZoneTexte 4">
-            <a:extLst>
-              <a:ext uri="{FF2B5EF4-FFF2-40B4-BE49-F238E27FC236}">
-                <a16:creationId xmlns:a16="http://schemas.microsoft.com/office/drawing/2014/main" id="{E248E638-639C-21B3-42AB-47371284C5B8}"/>
-              </a:ext>
-            </a:extLst>
-          </p:cNvPr>
-          <p:cNvSpPr txBox="1"/>
-          <p:nvPr/>
-        </p:nvSpPr>
-        <p:spPr>
-          <a:xfrm>
-            <a:off x="1308775" y="1758563"/>
-            <a:ext cx="2159678" cy="292388"/>
-          </a:xfrm>
-          <a:prstGeom prst="rect">
-            <a:avLst/>
-          </a:prstGeom>
-          <a:solidFill>
-            <a:schemeClr val="accent5">
-              <a:lumMod val="20000"/>
-              <a:lumOff val="80000"/>
-            </a:schemeClr>
-          </a:solidFill>
-        </p:spPr>
-        <p:txBody>
-          <a:bodyPr wrap="square" rtlCol="0">
-            <a:spAutoFit/>
-          </a:bodyPr>
-          <a:lstStyle/>
-          <a:p>
-            <a:pPr algn="ctr"/>
-            <a:r>
-              <a:rPr lang="fr-FR" sz="1300" dirty="0" err="1"/>
-              <a:t>scATACseq_R_QualityControl</a:t>
-            </a:r>
-            <a:endParaRPr lang="fr-FR" sz="1300" dirty="0"/>
-          </a:p>
-        </p:txBody>
-      </p:sp>
-      <p:sp>
-        <p:nvSpPr>
-          <p:cNvPr id="6" name="ZoneTexte 5">
-            <a:extLst>
-              <a:ext uri="{FF2B5EF4-FFF2-40B4-BE49-F238E27FC236}">
-                <a16:creationId xmlns:a16="http://schemas.microsoft.com/office/drawing/2014/main" id="{88BE4869-4CB7-D0E9-D4E2-292ADF3D1E3D}"/>
-              </a:ext>
-            </a:extLst>
-          </p:cNvPr>
-          <p:cNvSpPr txBox="1"/>
-          <p:nvPr/>
-        </p:nvSpPr>
-        <p:spPr>
-          <a:xfrm>
-            <a:off x="842643" y="2563527"/>
-            <a:ext cx="3091942" cy="292388"/>
-          </a:xfrm>
-          <a:prstGeom prst="rect">
-            <a:avLst/>
-          </a:prstGeom>
-          <a:solidFill>
-            <a:schemeClr val="accent5">
-              <a:lumMod val="20000"/>
-              <a:lumOff val="80000"/>
-            </a:schemeClr>
-          </a:solidFill>
-        </p:spPr>
-        <p:txBody>
-          <a:bodyPr wrap="square" rtlCol="0">
-            <a:spAutoFit/>
-          </a:bodyPr>
-          <a:lstStyle/>
-          <a:p>
-            <a:pPr algn="ctr"/>
-            <a:r>
-              <a:rPr lang="fr-FR" sz="1300" dirty="0" err="1"/>
-              <a:t>scATACseq_R_MergeObjectsCommonPeaks</a:t>
-            </a:r>
-            <a:endParaRPr lang="fr-FR" sz="1300" dirty="0"/>
-          </a:p>
-        </p:txBody>
-      </p:sp>
-      <p:sp>
-        <p:nvSpPr>
-          <p:cNvPr id="7" name="ZoneTexte 6">
-            <a:extLst>
-              <a:ext uri="{FF2B5EF4-FFF2-40B4-BE49-F238E27FC236}">
-                <a16:creationId xmlns:a16="http://schemas.microsoft.com/office/drawing/2014/main" id="{311864EF-FC06-CF64-37AA-633BD0DB0A72}"/>
-              </a:ext>
-            </a:extLst>
-          </p:cNvPr>
-          <p:cNvSpPr txBox="1"/>
-          <p:nvPr/>
-        </p:nvSpPr>
-        <p:spPr>
-          <a:xfrm>
-            <a:off x="1260149" y="3368491"/>
-            <a:ext cx="2256931" cy="292388"/>
-          </a:xfrm>
-          <a:prstGeom prst="rect">
-            <a:avLst/>
-          </a:prstGeom>
-          <a:solidFill>
-            <a:schemeClr val="accent5">
-              <a:lumMod val="20000"/>
-              <a:lumOff val="80000"/>
-            </a:schemeClr>
-          </a:solidFill>
-        </p:spPr>
-        <p:txBody>
-          <a:bodyPr wrap="square" rtlCol="0">
-            <a:spAutoFit/>
-          </a:bodyPr>
-          <a:lstStyle/>
-          <a:p>
-            <a:pPr algn="ctr"/>
-            <a:r>
-              <a:rPr lang="fr-FR" sz="1300" dirty="0" err="1"/>
-              <a:t>scATACseq_R_AddAnnotations</a:t>
-            </a:r>
-            <a:endParaRPr lang="fr-FR" sz="1300" dirty="0"/>
-          </a:p>
-        </p:txBody>
-      </p:sp>
-      <p:sp>
-        <p:nvSpPr>
-          <p:cNvPr id="8" name="ZoneTexte 7">
-            <a:extLst>
-              <a:ext uri="{FF2B5EF4-FFF2-40B4-BE49-F238E27FC236}">
-                <a16:creationId xmlns:a16="http://schemas.microsoft.com/office/drawing/2014/main" id="{B19CCBE3-E779-E58C-47D6-602925EA445A}"/>
-              </a:ext>
-            </a:extLst>
-          </p:cNvPr>
-          <p:cNvSpPr txBox="1"/>
-          <p:nvPr/>
-        </p:nvSpPr>
-        <p:spPr>
-          <a:xfrm>
-            <a:off x="994877" y="4147899"/>
-            <a:ext cx="2787475" cy="292388"/>
-          </a:xfrm>
-          <a:prstGeom prst="rect">
-            <a:avLst/>
-          </a:prstGeom>
-          <a:solidFill>
-            <a:schemeClr val="accent5">
-              <a:lumMod val="20000"/>
-              <a:lumOff val="80000"/>
-            </a:schemeClr>
-          </a:solidFill>
-        </p:spPr>
-        <p:txBody>
-          <a:bodyPr wrap="square" rtlCol="0">
-            <a:spAutoFit/>
-          </a:bodyPr>
-          <a:lstStyle/>
-          <a:p>
-            <a:pPr algn="ctr"/>
-            <a:r>
-              <a:rPr lang="fr-FR" sz="1300" dirty="0" err="1"/>
-              <a:t>scATACseq_R_NormalizationReduction</a:t>
-            </a:r>
-            <a:endParaRPr lang="fr-FR" sz="1300" dirty="0"/>
-          </a:p>
-        </p:txBody>
-      </p:sp>
-      <p:cxnSp>
-        <p:nvCxnSpPr>
-          <p:cNvPr id="13" name="Connecteur droit avec flèche 12">
-            <a:extLst>
-              <a:ext uri="{FF2B5EF4-FFF2-40B4-BE49-F238E27FC236}">
-                <a16:creationId xmlns:a16="http://schemas.microsoft.com/office/drawing/2014/main" id="{83270018-513E-58B4-9E02-4E813F3E3210}"/>
-              </a:ext>
-            </a:extLst>
-          </p:cNvPr>
-          <p:cNvCxnSpPr>
-            <a:cxnSpLocks/>
-          </p:cNvCxnSpPr>
-          <p:nvPr/>
-        </p:nvCxnSpPr>
-        <p:spPr>
-          <a:xfrm>
-            <a:off x="2410807" y="1302610"/>
-            <a:ext cx="0" cy="435632"/>
-          </a:xfrm>
-          <a:prstGeom prst="straightConnector1">
-            <a:avLst/>
-          </a:prstGeom>
-          <a:ln>
-            <a:tailEnd type="triangle"/>
-          </a:ln>
-        </p:spPr>
-        <p:style>
-          <a:lnRef idx="1">
-            <a:schemeClr val="dk1"/>
-          </a:lnRef>
-          <a:fillRef idx="0">
-            <a:schemeClr val="dk1"/>
-          </a:fillRef>
-          <a:effectRef idx="0">
-            <a:schemeClr val="dk1"/>
-          </a:effectRef>
-          <a:fontRef idx="minor">
-            <a:schemeClr val="tx1"/>
-          </a:fontRef>
-        </p:style>
-      </p:cxnSp>
-      <p:cxnSp>
-        <p:nvCxnSpPr>
-          <p:cNvPr id="14" name="Connecteur droit avec flèche 13">
-            <a:extLst>
-              <a:ext uri="{FF2B5EF4-FFF2-40B4-BE49-F238E27FC236}">
-                <a16:creationId xmlns:a16="http://schemas.microsoft.com/office/drawing/2014/main" id="{5AF8F9D9-4FA1-65C9-3C17-5D7CB5AB2A12}"/>
-              </a:ext>
-            </a:extLst>
-          </p:cNvPr>
-          <p:cNvCxnSpPr>
-            <a:cxnSpLocks/>
-          </p:cNvCxnSpPr>
-          <p:nvPr/>
-        </p:nvCxnSpPr>
-        <p:spPr>
-          <a:xfrm>
-            <a:off x="2410807" y="2117734"/>
-            <a:ext cx="0" cy="435632"/>
-          </a:xfrm>
-          <a:prstGeom prst="straightConnector1">
-            <a:avLst/>
-          </a:prstGeom>
-          <a:ln>
-            <a:tailEnd type="triangle"/>
-          </a:ln>
-        </p:spPr>
-        <p:style>
-          <a:lnRef idx="1">
-            <a:schemeClr val="dk1"/>
-          </a:lnRef>
-          <a:fillRef idx="0">
-            <a:schemeClr val="dk1"/>
-          </a:fillRef>
-          <a:effectRef idx="0">
-            <a:schemeClr val="dk1"/>
-          </a:effectRef>
-          <a:fontRef idx="minor">
-            <a:schemeClr val="tx1"/>
-          </a:fontRef>
-        </p:style>
-      </p:cxnSp>
-      <p:cxnSp>
-        <p:nvCxnSpPr>
-          <p:cNvPr id="15" name="Connecteur droit avec flèche 14">
-            <a:extLst>
-              <a:ext uri="{FF2B5EF4-FFF2-40B4-BE49-F238E27FC236}">
-                <a16:creationId xmlns:a16="http://schemas.microsoft.com/office/drawing/2014/main" id="{1921FC85-2E0C-2A78-BB91-C968FA1DCB0D}"/>
-              </a:ext>
-            </a:extLst>
-          </p:cNvPr>
-          <p:cNvCxnSpPr>
-            <a:cxnSpLocks/>
-          </p:cNvCxnSpPr>
-          <p:nvPr/>
-        </p:nvCxnSpPr>
-        <p:spPr>
-          <a:xfrm>
-            <a:off x="2410807" y="2912538"/>
-            <a:ext cx="0" cy="435632"/>
-          </a:xfrm>
-          <a:prstGeom prst="straightConnector1">
-            <a:avLst/>
-          </a:prstGeom>
-          <a:ln>
-            <a:tailEnd type="triangle"/>
-          </a:ln>
-        </p:spPr>
-        <p:style>
-          <a:lnRef idx="1">
-            <a:schemeClr val="dk1"/>
-          </a:lnRef>
-          <a:fillRef idx="0">
-            <a:schemeClr val="dk1"/>
-          </a:fillRef>
-          <a:effectRef idx="0">
-            <a:schemeClr val="dk1"/>
-          </a:effectRef>
-          <a:fontRef idx="minor">
-            <a:schemeClr val="tx1"/>
-          </a:fontRef>
-        </p:style>
-      </p:cxnSp>
-      <p:cxnSp>
-        <p:nvCxnSpPr>
-          <p:cNvPr id="16" name="Connecteur droit avec flèche 15">
-            <a:extLst>
-              <a:ext uri="{FF2B5EF4-FFF2-40B4-BE49-F238E27FC236}">
-                <a16:creationId xmlns:a16="http://schemas.microsoft.com/office/drawing/2014/main" id="{84C8DB8F-CCC0-6F20-5B88-25ABCE36EC21}"/>
-              </a:ext>
-            </a:extLst>
-          </p:cNvPr>
-          <p:cNvCxnSpPr>
-            <a:cxnSpLocks/>
-          </p:cNvCxnSpPr>
-          <p:nvPr/>
-        </p:nvCxnSpPr>
-        <p:spPr>
-          <a:xfrm>
-            <a:off x="2410807" y="3717502"/>
-            <a:ext cx="0" cy="435632"/>
-          </a:xfrm>
-          <a:prstGeom prst="straightConnector1">
-            <a:avLst/>
-          </a:prstGeom>
-          <a:ln>
-            <a:tailEnd type="triangle"/>
-          </a:ln>
-        </p:spPr>
-        <p:style>
-          <a:lnRef idx="1">
-            <a:schemeClr val="dk1"/>
-          </a:lnRef>
-          <a:fillRef idx="0">
-            <a:schemeClr val="dk1"/>
-          </a:fillRef>
-          <a:effectRef idx="0">
-            <a:schemeClr val="dk1"/>
-          </a:effectRef>
-          <a:fontRef idx="minor">
-            <a:schemeClr val="tx1"/>
-          </a:fontRef>
-        </p:style>
-      </p:cxnSp>
-      <p:sp>
-        <p:nvSpPr>
-          <p:cNvPr id="17" name="ZoneTexte 16">
-            <a:extLst>
-              <a:ext uri="{FF2B5EF4-FFF2-40B4-BE49-F238E27FC236}">
-                <a16:creationId xmlns:a16="http://schemas.microsoft.com/office/drawing/2014/main" id="{2B31C3F0-11AA-7B19-0857-DD5E263922D9}"/>
-              </a:ext>
-            </a:extLst>
-          </p:cNvPr>
-          <p:cNvSpPr txBox="1"/>
-          <p:nvPr/>
-        </p:nvSpPr>
-        <p:spPr>
-          <a:xfrm rot="20616044">
-            <a:off x="5931" y="2169261"/>
-            <a:ext cx="1197591" cy="523220"/>
-          </a:xfrm>
-          <a:prstGeom prst="rect">
-            <a:avLst/>
-          </a:prstGeom>
-          <a:noFill/>
-        </p:spPr>
-        <p:txBody>
-          <a:bodyPr wrap="square" rtlCol="0">
-            <a:spAutoFit/>
-          </a:bodyPr>
-          <a:lstStyle/>
-          <a:p>
-            <a:r>
-              <a:rPr lang="fr-FR" sz="1400" b="1" dirty="0">
-                <a:solidFill>
-                  <a:srgbClr val="7030A0"/>
-                </a:solidFill>
-              </a:rPr>
-              <a:t>hg38_annotations_gr.rds</a:t>
-            </a:r>
-          </a:p>
-        </p:txBody>
-      </p:sp>
-      <p:sp>
-        <p:nvSpPr>
-          <p:cNvPr id="21" name="ZoneTexte 20">
-            <a:extLst>
-              <a:ext uri="{FF2B5EF4-FFF2-40B4-BE49-F238E27FC236}">
-                <a16:creationId xmlns:a16="http://schemas.microsoft.com/office/drawing/2014/main" id="{40CE1592-F872-04E1-4AB1-C411BF296373}"/>
-              </a:ext>
-            </a:extLst>
-          </p:cNvPr>
-          <p:cNvSpPr txBox="1"/>
-          <p:nvPr/>
-        </p:nvSpPr>
-        <p:spPr>
-          <a:xfrm rot="20628894">
-            <a:off x="131505" y="-107109"/>
-            <a:ext cx="1464488" cy="738664"/>
-          </a:xfrm>
-          <a:prstGeom prst="rect">
-            <a:avLst/>
-          </a:prstGeom>
-          <a:noFill/>
-        </p:spPr>
-        <p:txBody>
-          <a:bodyPr wrap="square" rtlCol="0">
-            <a:spAutoFit/>
-          </a:bodyPr>
-          <a:lstStyle/>
-          <a:p>
-            <a:r>
-              <a:rPr lang="fr-FR" sz="1400" b="1" dirty="0">
-                <a:solidFill>
-                  <a:srgbClr val="7030A0"/>
-                </a:solidFill>
-              </a:rPr>
-              <a:t>.h5</a:t>
-            </a:r>
-          </a:p>
-          <a:p>
-            <a:r>
-              <a:rPr lang="fr-FR" sz="1400" b="1" dirty="0">
-                <a:solidFill>
-                  <a:srgbClr val="7030A0"/>
-                </a:solidFill>
-              </a:rPr>
-              <a:t>singlecell.csv</a:t>
-            </a:r>
-          </a:p>
-          <a:p>
-            <a:r>
-              <a:rPr lang="fr-FR" sz="1400" b="1" dirty="0">
-                <a:solidFill>
-                  <a:srgbClr val="7030A0"/>
-                </a:solidFill>
-              </a:rPr>
-              <a:t>fragments.tsv.gz</a:t>
-            </a:r>
-          </a:p>
-        </p:txBody>
-      </p:sp>
-      <p:cxnSp>
-        <p:nvCxnSpPr>
-          <p:cNvPr id="22" name="Connecteur : en arc 21">
-            <a:extLst>
-              <a:ext uri="{FF2B5EF4-FFF2-40B4-BE49-F238E27FC236}">
-                <a16:creationId xmlns:a16="http://schemas.microsoft.com/office/drawing/2014/main" id="{FD0764AF-D94D-3F7B-671F-FA222BD3EA84}"/>
-              </a:ext>
-            </a:extLst>
-          </p:cNvPr>
-          <p:cNvCxnSpPr>
-            <a:cxnSpLocks/>
-            <a:endCxn id="7" idx="1"/>
-          </p:cNvCxnSpPr>
-          <p:nvPr/>
-        </p:nvCxnSpPr>
-        <p:spPr>
-          <a:xfrm>
-            <a:off x="422365" y="2689153"/>
-            <a:ext cx="837784" cy="825532"/>
-          </a:xfrm>
-          <a:prstGeom prst="curvedConnector3">
-            <a:avLst>
-              <a:gd name="adj1" fmla="val 50000"/>
-            </a:avLst>
-          </a:prstGeom>
-          <a:ln>
-            <a:tailEnd type="triangle"/>
-          </a:ln>
-        </p:spPr>
-        <p:style>
-          <a:lnRef idx="1">
-            <a:schemeClr val="dk1"/>
-          </a:lnRef>
-          <a:fillRef idx="0">
-            <a:schemeClr val="dk1"/>
-          </a:fillRef>
-          <a:effectRef idx="0">
-            <a:schemeClr val="dk1"/>
-          </a:effectRef>
-          <a:fontRef idx="minor">
-            <a:schemeClr val="tx1"/>
-          </a:fontRef>
-        </p:style>
-      </p:cxnSp>
-      <p:cxnSp>
-        <p:nvCxnSpPr>
-          <p:cNvPr id="24" name="Connecteur : en arc 23">
-            <a:extLst>
-              <a:ext uri="{FF2B5EF4-FFF2-40B4-BE49-F238E27FC236}">
-                <a16:creationId xmlns:a16="http://schemas.microsoft.com/office/drawing/2014/main" id="{4BD99294-18F3-0201-EC48-1A2C130C49C5}"/>
-              </a:ext>
-            </a:extLst>
-          </p:cNvPr>
-          <p:cNvCxnSpPr>
-            <a:cxnSpLocks/>
-            <a:endCxn id="4" idx="1"/>
-          </p:cNvCxnSpPr>
-          <p:nvPr/>
-        </p:nvCxnSpPr>
-        <p:spPr>
-          <a:xfrm>
-            <a:off x="637004" y="672991"/>
-            <a:ext cx="519867" cy="426802"/>
-          </a:xfrm>
-          <a:prstGeom prst="curvedConnector3">
-            <a:avLst>
-              <a:gd name="adj1" fmla="val 50000"/>
-            </a:avLst>
-          </a:prstGeom>
-          <a:ln>
-            <a:tailEnd type="triangle"/>
-          </a:ln>
-        </p:spPr>
-        <p:style>
-          <a:lnRef idx="1">
-            <a:schemeClr val="dk1"/>
-          </a:lnRef>
-          <a:fillRef idx="0">
-            <a:schemeClr val="dk1"/>
-          </a:fillRef>
-          <a:effectRef idx="0">
-            <a:schemeClr val="dk1"/>
-          </a:effectRef>
-          <a:fontRef idx="minor">
-            <a:schemeClr val="tx1"/>
-          </a:fontRef>
-        </p:style>
-      </p:cxnSp>
-      <p:sp>
-        <p:nvSpPr>
-          <p:cNvPr id="26" name="ZoneTexte 25">
-            <a:extLst>
-              <a:ext uri="{FF2B5EF4-FFF2-40B4-BE49-F238E27FC236}">
-                <a16:creationId xmlns:a16="http://schemas.microsoft.com/office/drawing/2014/main" id="{65B612E5-1CFD-9CCF-7EA0-1F78D922BAFE}"/>
-              </a:ext>
-            </a:extLst>
-          </p:cNvPr>
-          <p:cNvSpPr txBox="1"/>
-          <p:nvPr/>
-        </p:nvSpPr>
-        <p:spPr>
-          <a:xfrm>
-            <a:off x="4974608" y="177775"/>
-            <a:ext cx="1763176" cy="307777"/>
-          </a:xfrm>
-          <a:prstGeom prst="rect">
-            <a:avLst/>
-          </a:prstGeom>
-          <a:noFill/>
-        </p:spPr>
-        <p:txBody>
-          <a:bodyPr wrap="square" rtlCol="0">
-            <a:spAutoFit/>
-          </a:bodyPr>
-          <a:lstStyle/>
-          <a:p>
-            <a:r>
-              <a:rPr lang="fr-FR" sz="1400" b="1" dirty="0">
-                <a:effectLst>
-                  <a:outerShdw blurRad="38100" dist="38100" dir="2700000" algn="tl">
-                    <a:srgbClr val="000000">
-                      <a:alpha val="43137"/>
-                    </a:srgbClr>
-                  </a:outerShdw>
-                </a:effectLst>
-              </a:rPr>
-              <a:t>Workflow </a:t>
-            </a:r>
-            <a:r>
-              <a:rPr lang="fr-FR" sz="1400" b="1" dirty="0" err="1">
-                <a:effectLst>
-                  <a:outerShdw blurRad="38100" dist="38100" dir="2700000" algn="tl">
-                    <a:srgbClr val="000000">
-                      <a:alpha val="43137"/>
-                    </a:srgbClr>
-                  </a:outerShdw>
-                </a:effectLst>
-              </a:rPr>
-              <a:t>scATACseq</a:t>
-            </a:r>
-            <a:endParaRPr lang="fr-FR" sz="1400" b="1" dirty="0">
-              <a:effectLst>
-                <a:outerShdw blurRad="38100" dist="38100" dir="2700000" algn="tl">
-                  <a:srgbClr val="000000">
-                    <a:alpha val="43137"/>
-                  </a:srgbClr>
-                </a:outerShdw>
-              </a:effectLst>
-            </a:endParaRPr>
-          </a:p>
-        </p:txBody>
-      </p:sp>
-      <p:sp>
-        <p:nvSpPr>
-          <p:cNvPr id="27" name="ZoneTexte 26">
-            <a:extLst>
-              <a:ext uri="{FF2B5EF4-FFF2-40B4-BE49-F238E27FC236}">
-                <a16:creationId xmlns:a16="http://schemas.microsoft.com/office/drawing/2014/main" id="{3377F037-A9A6-A286-FDC7-7FBEE69B4AE5}"/>
-              </a:ext>
-            </a:extLst>
-          </p:cNvPr>
-          <p:cNvSpPr txBox="1"/>
-          <p:nvPr/>
-        </p:nvSpPr>
-        <p:spPr>
-          <a:xfrm>
-            <a:off x="1428545" y="4466252"/>
-            <a:ext cx="2153845" cy="276999"/>
-          </a:xfrm>
-          <a:prstGeom prst="rect">
-            <a:avLst/>
-          </a:prstGeom>
-          <a:noFill/>
-        </p:spPr>
-        <p:txBody>
-          <a:bodyPr wrap="square" rtlCol="0">
-            <a:spAutoFit/>
-          </a:bodyPr>
-          <a:lstStyle/>
-          <a:p>
-            <a:pPr algn="ctr"/>
-            <a:r>
-              <a:rPr lang="fr-FR" sz="1200" i="1" dirty="0" err="1">
-                <a:solidFill>
-                  <a:srgbClr val="002060"/>
-                </a:solidFill>
-              </a:rPr>
-              <a:t>Two</a:t>
-            </a:r>
-            <a:r>
-              <a:rPr lang="fr-FR" sz="1200" i="1" dirty="0">
-                <a:solidFill>
-                  <a:srgbClr val="002060"/>
-                </a:solidFill>
-              </a:rPr>
-              <a:t> possible cluster </a:t>
-            </a:r>
-            <a:r>
-              <a:rPr lang="fr-FR" sz="1200" i="1" dirty="0" err="1">
-                <a:solidFill>
-                  <a:srgbClr val="002060"/>
-                </a:solidFill>
-              </a:rPr>
-              <a:t>resolutions</a:t>
-            </a:r>
-            <a:endParaRPr lang="fr-FR" sz="1200" i="1" dirty="0">
-              <a:solidFill>
-                <a:srgbClr val="002060"/>
-              </a:solidFill>
-            </a:endParaRPr>
-          </a:p>
-        </p:txBody>
-      </p:sp>
-      <p:cxnSp>
-        <p:nvCxnSpPr>
-          <p:cNvPr id="29" name="Connecteur droit avec flèche 28">
-            <a:extLst>
-              <a:ext uri="{FF2B5EF4-FFF2-40B4-BE49-F238E27FC236}">
-                <a16:creationId xmlns:a16="http://schemas.microsoft.com/office/drawing/2014/main" id="{BC0F1E8E-20C5-B3D6-8DBB-244479CCED98}"/>
-              </a:ext>
-            </a:extLst>
-          </p:cNvPr>
-          <p:cNvCxnSpPr>
-            <a:cxnSpLocks/>
-          </p:cNvCxnSpPr>
-          <p:nvPr/>
-        </p:nvCxnSpPr>
-        <p:spPr>
-          <a:xfrm flipH="1">
-            <a:off x="1339188" y="4864922"/>
-            <a:ext cx="1122373" cy="630269"/>
-          </a:xfrm>
-          <a:prstGeom prst="straightConnector1">
-            <a:avLst/>
-          </a:prstGeom>
-          <a:ln>
-            <a:tailEnd type="triangle"/>
-          </a:ln>
-        </p:spPr>
-        <p:style>
-          <a:lnRef idx="1">
-            <a:schemeClr val="dk1"/>
-          </a:lnRef>
-          <a:fillRef idx="0">
-            <a:schemeClr val="dk1"/>
-          </a:fillRef>
-          <a:effectRef idx="0">
-            <a:schemeClr val="dk1"/>
-          </a:effectRef>
-          <a:fontRef idx="minor">
-            <a:schemeClr val="tx1"/>
-          </a:fontRef>
-        </p:style>
-      </p:cxnSp>
-      <p:cxnSp>
-        <p:nvCxnSpPr>
-          <p:cNvPr id="32" name="Connecteur droit avec flèche 31">
-            <a:extLst>
-              <a:ext uri="{FF2B5EF4-FFF2-40B4-BE49-F238E27FC236}">
-                <a16:creationId xmlns:a16="http://schemas.microsoft.com/office/drawing/2014/main" id="{E1153E48-3A12-8F19-E3F3-F9336BE496A8}"/>
-              </a:ext>
-            </a:extLst>
-          </p:cNvPr>
-          <p:cNvCxnSpPr/>
-          <p:nvPr/>
-        </p:nvCxnSpPr>
-        <p:spPr>
-          <a:xfrm flipH="1">
-            <a:off x="1400604" y="4864922"/>
-            <a:ext cx="1060957" cy="1502974"/>
-          </a:xfrm>
-          <a:prstGeom prst="straightConnector1">
-            <a:avLst/>
-          </a:prstGeom>
-          <a:ln>
-            <a:tailEnd type="triangle"/>
-          </a:ln>
-        </p:spPr>
-        <p:style>
-          <a:lnRef idx="1">
-            <a:schemeClr val="dk1"/>
-          </a:lnRef>
-          <a:fillRef idx="0">
-            <a:schemeClr val="dk1"/>
-          </a:fillRef>
-          <a:effectRef idx="0">
-            <a:schemeClr val="dk1"/>
-          </a:effectRef>
-          <a:fontRef idx="minor">
-            <a:schemeClr val="tx1"/>
-          </a:fontRef>
-        </p:style>
-      </p:cxnSp>
-      <p:cxnSp>
-        <p:nvCxnSpPr>
-          <p:cNvPr id="34" name="Connecteur droit avec flèche 33">
-            <a:extLst>
-              <a:ext uri="{FF2B5EF4-FFF2-40B4-BE49-F238E27FC236}">
-                <a16:creationId xmlns:a16="http://schemas.microsoft.com/office/drawing/2014/main" id="{B6F50F6C-D5DA-D995-98C1-BF8F1B0B6005}"/>
-              </a:ext>
-            </a:extLst>
-          </p:cNvPr>
-          <p:cNvCxnSpPr/>
-          <p:nvPr/>
-        </p:nvCxnSpPr>
-        <p:spPr>
-          <a:xfrm>
-            <a:off x="2461561" y="4868074"/>
-            <a:ext cx="750249" cy="960997"/>
-          </a:xfrm>
-          <a:prstGeom prst="straightConnector1">
-            <a:avLst/>
-          </a:prstGeom>
-          <a:ln>
-            <a:tailEnd type="triangle"/>
-          </a:ln>
-        </p:spPr>
-        <p:style>
-          <a:lnRef idx="1">
-            <a:schemeClr val="dk1"/>
-          </a:lnRef>
-          <a:fillRef idx="0">
-            <a:schemeClr val="dk1"/>
-          </a:fillRef>
-          <a:effectRef idx="0">
-            <a:schemeClr val="dk1"/>
-          </a:effectRef>
-          <a:fontRef idx="minor">
-            <a:schemeClr val="tx1"/>
-          </a:fontRef>
-        </p:style>
-      </p:cxnSp>
-      <p:sp>
-        <p:nvSpPr>
-          <p:cNvPr id="3" name="ZoneTexte 2">
-            <a:extLst>
-              <a:ext uri="{FF2B5EF4-FFF2-40B4-BE49-F238E27FC236}">
-                <a16:creationId xmlns:a16="http://schemas.microsoft.com/office/drawing/2014/main" id="{C67CD655-A3A1-8FF8-F432-53088F320D1E}"/>
-              </a:ext>
-            </a:extLst>
-          </p:cNvPr>
-          <p:cNvSpPr txBox="1"/>
-          <p:nvPr/>
-        </p:nvSpPr>
-        <p:spPr>
-          <a:xfrm rot="16200000">
-            <a:off x="4695366" y="2986060"/>
-            <a:ext cx="3564548" cy="369332"/>
-          </a:xfrm>
-          <a:prstGeom prst="rect">
-            <a:avLst/>
-          </a:prstGeom>
-          <a:noFill/>
-        </p:spPr>
-        <p:txBody>
-          <a:bodyPr wrap="square" rtlCol="0">
-            <a:spAutoFit/>
-          </a:bodyPr>
-          <a:lstStyle/>
-          <a:p>
-            <a:pPr algn="ctr"/>
-            <a:r>
-              <a:rPr lang="fr-FR" b="1" dirty="0">
-                <a:solidFill>
-                  <a:schemeClr val="bg1">
-                    <a:lumMod val="65000"/>
-                  </a:schemeClr>
-                </a:solidFill>
-              </a:rPr>
-              <a:t>DATA CLEANING AND FILTERING</a:t>
-            </a:r>
-          </a:p>
-        </p:txBody>
-      </p:sp>
-      <p:sp>
-        <p:nvSpPr>
-          <p:cNvPr id="18" name="ZoneTexte 17">
-            <a:extLst>
-              <a:ext uri="{FF2B5EF4-FFF2-40B4-BE49-F238E27FC236}">
-                <a16:creationId xmlns:a16="http://schemas.microsoft.com/office/drawing/2014/main" id="{03935B7D-30C8-E939-932E-F2CC802BB209}"/>
-              </a:ext>
-            </a:extLst>
-          </p:cNvPr>
-          <p:cNvSpPr txBox="1"/>
-          <p:nvPr/>
-        </p:nvSpPr>
-        <p:spPr>
-          <a:xfrm rot="16200000">
-            <a:off x="5065097" y="7226966"/>
-            <a:ext cx="2825086" cy="369332"/>
-          </a:xfrm>
-          <a:prstGeom prst="rect">
-            <a:avLst/>
-          </a:prstGeom>
-          <a:noFill/>
-        </p:spPr>
-        <p:txBody>
-          <a:bodyPr wrap="square" rtlCol="0">
-            <a:spAutoFit/>
-          </a:bodyPr>
-          <a:lstStyle/>
-          <a:p>
-            <a:r>
-              <a:rPr lang="fr-FR" b="1" dirty="0">
-                <a:solidFill>
-                  <a:schemeClr val="bg1">
-                    <a:lumMod val="65000"/>
-                  </a:schemeClr>
-                </a:solidFill>
-              </a:rPr>
-              <a:t>DOWNSTREAM ANALYSIS</a:t>
-            </a:r>
-          </a:p>
-        </p:txBody>
-      </p:sp>
-      <p:sp>
-        <p:nvSpPr>
-          <p:cNvPr id="28" name="ZoneTexte 27">
-            <a:extLst>
-              <a:ext uri="{FF2B5EF4-FFF2-40B4-BE49-F238E27FC236}">
-                <a16:creationId xmlns:a16="http://schemas.microsoft.com/office/drawing/2014/main" id="{DAAD2884-6CFF-7560-BD2C-9BD199B8C3B1}"/>
-              </a:ext>
-            </a:extLst>
-          </p:cNvPr>
-          <p:cNvSpPr txBox="1"/>
-          <p:nvPr/>
-        </p:nvSpPr>
-        <p:spPr>
-          <a:xfrm>
-            <a:off x="3684991" y="954667"/>
-            <a:ext cx="2776768" cy="292388"/>
-          </a:xfrm>
-          <a:prstGeom prst="rect">
-            <a:avLst/>
-          </a:prstGeom>
-          <a:solidFill>
-            <a:schemeClr val="accent5">
-              <a:lumMod val="20000"/>
-              <a:lumOff val="80000"/>
-            </a:schemeClr>
-          </a:solidFill>
-        </p:spPr>
-        <p:txBody>
-          <a:bodyPr wrap="square" rtlCol="0">
-            <a:spAutoFit/>
-          </a:bodyPr>
-          <a:lstStyle/>
-          <a:p>
-            <a:pPr algn="ctr"/>
-            <a:r>
-              <a:rPr lang="fr-FR" sz="1300" dirty="0" err="1"/>
-              <a:t>scATACseq_SKMK_CreateSeuratObject</a:t>
-            </a:r>
-            <a:endParaRPr lang="fr-FR" sz="1300" dirty="0"/>
-          </a:p>
-        </p:txBody>
-      </p:sp>
-      <p:sp>
-        <p:nvSpPr>
-          <p:cNvPr id="30" name="ZoneTexte 29">
-            <a:extLst>
-              <a:ext uri="{FF2B5EF4-FFF2-40B4-BE49-F238E27FC236}">
-                <a16:creationId xmlns:a16="http://schemas.microsoft.com/office/drawing/2014/main" id="{FDF58D45-8E7B-E926-D651-AE17D7A6079B}"/>
-              </a:ext>
-            </a:extLst>
-          </p:cNvPr>
-          <p:cNvSpPr txBox="1"/>
-          <p:nvPr/>
-        </p:nvSpPr>
-        <p:spPr>
-          <a:xfrm>
-            <a:off x="3684991" y="1748402"/>
-            <a:ext cx="2424494" cy="292388"/>
-          </a:xfrm>
-          <a:prstGeom prst="rect">
-            <a:avLst/>
-          </a:prstGeom>
-          <a:solidFill>
-            <a:schemeClr val="accent5">
-              <a:lumMod val="20000"/>
-              <a:lumOff val="80000"/>
-            </a:schemeClr>
-          </a:solidFill>
-        </p:spPr>
-        <p:txBody>
-          <a:bodyPr wrap="square" rtlCol="0">
-            <a:spAutoFit/>
-          </a:bodyPr>
-          <a:lstStyle/>
-          <a:p>
-            <a:pPr algn="ctr"/>
-            <a:r>
-              <a:rPr lang="fr-FR" sz="1300" dirty="0" err="1"/>
-              <a:t>scATACseq_SKMK_QualityControl</a:t>
-            </a:r>
-            <a:endParaRPr lang="fr-FR" sz="1300" dirty="0"/>
-          </a:p>
-        </p:txBody>
-      </p:sp>
-      <p:cxnSp>
-        <p:nvCxnSpPr>
-          <p:cNvPr id="31" name="Connecteur droit avec flèche 30">
-            <a:extLst>
-              <a:ext uri="{FF2B5EF4-FFF2-40B4-BE49-F238E27FC236}">
-                <a16:creationId xmlns:a16="http://schemas.microsoft.com/office/drawing/2014/main" id="{2F62E2C9-485C-98E1-7F81-CE92F3D6554C}"/>
-              </a:ext>
-            </a:extLst>
-          </p:cNvPr>
-          <p:cNvCxnSpPr>
-            <a:cxnSpLocks/>
-          </p:cNvCxnSpPr>
-          <p:nvPr/>
-        </p:nvCxnSpPr>
-        <p:spPr>
-          <a:xfrm>
-            <a:off x="4897238" y="1302610"/>
-            <a:ext cx="0" cy="435632"/>
-          </a:xfrm>
-          <a:prstGeom prst="straightConnector1">
-            <a:avLst/>
-          </a:prstGeom>
-          <a:ln>
-            <a:tailEnd type="triangle"/>
-          </a:ln>
-        </p:spPr>
-        <p:style>
-          <a:lnRef idx="1">
-            <a:schemeClr val="dk1"/>
-          </a:lnRef>
-          <a:fillRef idx="0">
-            <a:schemeClr val="dk1"/>
-          </a:fillRef>
-          <a:effectRef idx="0">
-            <a:schemeClr val="dk1"/>
-          </a:effectRef>
-          <a:fontRef idx="minor">
-            <a:schemeClr val="tx1"/>
-          </a:fontRef>
-        </p:style>
-      </p:cxnSp>
-      <p:cxnSp>
-        <p:nvCxnSpPr>
-          <p:cNvPr id="39" name="Connecteur droit avec flèche 38">
-            <a:extLst>
-              <a:ext uri="{FF2B5EF4-FFF2-40B4-BE49-F238E27FC236}">
-                <a16:creationId xmlns:a16="http://schemas.microsoft.com/office/drawing/2014/main" id="{A64E7C46-C14D-5355-1C12-8928E1F7FCAF}"/>
-              </a:ext>
-            </a:extLst>
-          </p:cNvPr>
-          <p:cNvCxnSpPr>
-            <a:cxnSpLocks/>
-          </p:cNvCxnSpPr>
-          <p:nvPr/>
-        </p:nvCxnSpPr>
-        <p:spPr>
-          <a:xfrm flipH="1">
-            <a:off x="4028916" y="2117734"/>
-            <a:ext cx="892514" cy="502415"/>
-          </a:xfrm>
-          <a:prstGeom prst="straightConnector1">
-            <a:avLst/>
-          </a:prstGeom>
-          <a:ln>
-            <a:tailEnd type="triangle"/>
-          </a:ln>
-        </p:spPr>
-        <p:style>
-          <a:lnRef idx="1">
-            <a:schemeClr val="dk1"/>
-          </a:lnRef>
-          <a:fillRef idx="0">
-            <a:schemeClr val="dk1"/>
-          </a:fillRef>
-          <a:effectRef idx="0">
-            <a:schemeClr val="dk1"/>
-          </a:effectRef>
-          <a:fontRef idx="minor">
-            <a:schemeClr val="tx1"/>
-          </a:fontRef>
-        </p:style>
-      </p:cxnSp>
-      <p:cxnSp>
-        <p:nvCxnSpPr>
-          <p:cNvPr id="40" name="Connecteur droit avec flèche 39">
-            <a:extLst>
-              <a:ext uri="{FF2B5EF4-FFF2-40B4-BE49-F238E27FC236}">
-                <a16:creationId xmlns:a16="http://schemas.microsoft.com/office/drawing/2014/main" id="{479E8DEF-7AEB-5273-5818-87AA283F17C2}"/>
-              </a:ext>
-            </a:extLst>
-          </p:cNvPr>
-          <p:cNvCxnSpPr>
-            <a:cxnSpLocks/>
-          </p:cNvCxnSpPr>
-          <p:nvPr/>
-        </p:nvCxnSpPr>
-        <p:spPr>
-          <a:xfrm>
-            <a:off x="2457125" y="4864922"/>
-            <a:ext cx="347183" cy="3019660"/>
-          </a:xfrm>
-          <a:prstGeom prst="straightConnector1">
-            <a:avLst/>
-          </a:prstGeom>
-          <a:ln>
-            <a:tailEnd type="triangle"/>
-          </a:ln>
-        </p:spPr>
-        <p:style>
-          <a:lnRef idx="1">
-            <a:schemeClr val="dk1"/>
-          </a:lnRef>
-          <a:fillRef idx="0">
-            <a:schemeClr val="dk1"/>
-          </a:fillRef>
-          <a:effectRef idx="0">
-            <a:schemeClr val="dk1"/>
-          </a:effectRef>
-          <a:fontRef idx="minor">
-            <a:schemeClr val="tx1"/>
-          </a:fontRef>
-        </p:style>
-      </p:cxnSp>
-      <p:cxnSp>
-        <p:nvCxnSpPr>
-          <p:cNvPr id="42" name="Connecteur droit avec flèche 41">
-            <a:extLst>
-              <a:ext uri="{FF2B5EF4-FFF2-40B4-BE49-F238E27FC236}">
-                <a16:creationId xmlns:a16="http://schemas.microsoft.com/office/drawing/2014/main" id="{C6DF2B37-79F5-52B9-20AD-7F4F8DCD20ED}"/>
-              </a:ext>
-            </a:extLst>
-          </p:cNvPr>
-          <p:cNvCxnSpPr>
-            <a:cxnSpLocks/>
-          </p:cNvCxnSpPr>
-          <p:nvPr/>
-        </p:nvCxnSpPr>
-        <p:spPr>
-          <a:xfrm>
-            <a:off x="2455220" y="4866616"/>
-            <a:ext cx="2357754" cy="1000872"/>
-          </a:xfrm>
-          <a:prstGeom prst="straightConnector1">
-            <a:avLst/>
-          </a:prstGeom>
-          <a:ln>
-            <a:tailEnd type="triangle"/>
-          </a:ln>
-        </p:spPr>
-        <p:style>
-          <a:lnRef idx="1">
-            <a:schemeClr val="dk1"/>
-          </a:lnRef>
-          <a:fillRef idx="0">
-            <a:schemeClr val="dk1"/>
-          </a:fillRef>
-          <a:effectRef idx="0">
-            <a:schemeClr val="dk1"/>
-          </a:effectRef>
-          <a:fontRef idx="minor">
-            <a:schemeClr val="tx1"/>
-          </a:fontRef>
-        </p:style>
-      </p:cxnSp>
-    </p:spTree>
-    <p:extLst>
-      <p:ext uri="{BB962C8B-B14F-4D97-AF65-F5344CB8AC3E}">
-        <p14:creationId xmlns:p14="http://schemas.microsoft.com/office/powerpoint/2010/main" val="2971349836"/>
-      </p:ext>
-    </p:extLst>
-  </p:cSld>
-  <p:clrMapOvr>
-    <a:masterClrMapping/>
-  </p:clrMapOvr>
-</p:sld>
-</file>
-
-<file path=ppt/slides/slide2.xml><?xml version="1.0" encoding="utf-8"?>
-<p:sld xmlns:a="http://schemas.openxmlformats.org/drawingml/2006/main" xmlns:r="http://schemas.openxmlformats.org/officeDocument/2006/relationships" xmlns:p="http://schemas.openxmlformats.org/presentationml/2006/main">
-  <p:cSld>
-    <p:spTree>
-      <p:nvGrpSpPr>
-        <p:cNvPr id="1" name=""/>
-        <p:cNvGrpSpPr/>
-        <p:nvPr/>
-      </p:nvGrpSpPr>
-      <p:grpSpPr>
-        <a:xfrm>
-          <a:off x="0" y="0"/>
-          <a:ext cx="0" cy="0"/>
-          <a:chOff x="0" y="0"/>
-          <a:chExt cx="0" cy="0"/>
-        </a:xfrm>
-      </p:grpSpPr>
-      <p:sp>
-        <p:nvSpPr>
           <p:cNvPr id="4" name="Rectangle 3">
             <a:extLst>
               <a:ext uri="{FF2B5EF4-FFF2-40B4-BE49-F238E27FC236}">
@@ -5799,6 +4524,3143 @@
     <p:extLst>
       <p:ext uri="{BB962C8B-B14F-4D97-AF65-F5344CB8AC3E}">
         <p14:creationId xmlns:p14="http://schemas.microsoft.com/office/powerpoint/2010/main" val="2905202256"/>
+      </p:ext>
+    </p:extLst>
+  </p:cSld>
+  <p:clrMapOvr>
+    <a:masterClrMapping/>
+  </p:clrMapOvr>
+</p:sld>
+</file>
+
+<file path=ppt/slides/slide2.xml><?xml version="1.0" encoding="utf-8"?>
+<p:sld xmlns:a="http://schemas.openxmlformats.org/drawingml/2006/main" xmlns:r="http://schemas.openxmlformats.org/officeDocument/2006/relationships" xmlns:p="http://schemas.openxmlformats.org/presentationml/2006/main">
+  <p:cSld>
+    <p:spTree>
+      <p:nvGrpSpPr>
+        <p:cNvPr id="1" name=""/>
+        <p:cNvGrpSpPr/>
+        <p:nvPr/>
+      </p:nvGrpSpPr>
+      <p:grpSpPr>
+        <a:xfrm>
+          <a:off x="0" y="0"/>
+          <a:ext cx="0" cy="0"/>
+          <a:chOff x="0" y="0"/>
+          <a:chExt cx="0" cy="0"/>
+        </a:xfrm>
+      </p:grpSpPr>
+      <p:sp>
+        <p:nvSpPr>
+          <p:cNvPr id="12" name="Rectangle 11">
+            <a:extLst>
+              <a:ext uri="{FF2B5EF4-FFF2-40B4-BE49-F238E27FC236}">
+                <a16:creationId xmlns:a16="http://schemas.microsoft.com/office/drawing/2014/main" id="{546374D4-535C-6913-48BE-FEB00EC1EEEC}"/>
+              </a:ext>
+            </a:extLst>
+          </p:cNvPr>
+          <p:cNvSpPr/>
+          <p:nvPr/>
+        </p:nvSpPr>
+        <p:spPr>
+          <a:xfrm>
+            <a:off x="263397" y="752262"/>
+            <a:ext cx="6373506" cy="4502644"/>
+          </a:xfrm>
+          <a:prstGeom prst="rect">
+            <a:avLst/>
+          </a:prstGeom>
+          <a:solidFill>
+            <a:srgbClr val="F7F7F7"/>
+          </a:solidFill>
+          <a:ln>
+            <a:solidFill>
+              <a:schemeClr val="bg1">
+                <a:lumMod val="75000"/>
+              </a:schemeClr>
+            </a:solidFill>
+          </a:ln>
+        </p:spPr>
+        <p:style>
+          <a:lnRef idx="2">
+            <a:schemeClr val="accent1">
+              <a:shade val="50000"/>
+            </a:schemeClr>
+          </a:lnRef>
+          <a:fillRef idx="1">
+            <a:schemeClr val="accent1"/>
+          </a:fillRef>
+          <a:effectRef idx="0">
+            <a:schemeClr val="accent1"/>
+          </a:effectRef>
+          <a:fontRef idx="minor">
+            <a:schemeClr val="lt1"/>
+          </a:fontRef>
+        </p:style>
+        <p:txBody>
+          <a:bodyPr rtlCol="0" anchor="ctr"/>
+          <a:lstStyle/>
+          <a:p>
+            <a:pPr algn="ctr"/>
+            <a:endParaRPr lang="fr-FR"/>
+          </a:p>
+        </p:txBody>
+      </p:sp>
+      <p:sp>
+        <p:nvSpPr>
+          <p:cNvPr id="2" name="Rectangle 1">
+            <a:extLst>
+              <a:ext uri="{FF2B5EF4-FFF2-40B4-BE49-F238E27FC236}">
+                <a16:creationId xmlns:a16="http://schemas.microsoft.com/office/drawing/2014/main" id="{7E9FD109-DA13-79B5-0C2C-B07B49BEB124}"/>
+              </a:ext>
+            </a:extLst>
+          </p:cNvPr>
+          <p:cNvSpPr/>
+          <p:nvPr/>
+        </p:nvSpPr>
+        <p:spPr>
+          <a:xfrm>
+            <a:off x="263397" y="5363326"/>
+            <a:ext cx="6373505" cy="4096612"/>
+          </a:xfrm>
+          <a:prstGeom prst="rect">
+            <a:avLst/>
+          </a:prstGeom>
+          <a:solidFill>
+            <a:srgbClr val="F7F7F7"/>
+          </a:solidFill>
+          <a:ln>
+            <a:solidFill>
+              <a:schemeClr val="bg1">
+                <a:lumMod val="75000"/>
+              </a:schemeClr>
+            </a:solidFill>
+          </a:ln>
+        </p:spPr>
+        <p:style>
+          <a:lnRef idx="2">
+            <a:schemeClr val="accent1">
+              <a:shade val="50000"/>
+            </a:schemeClr>
+          </a:lnRef>
+          <a:fillRef idx="1">
+            <a:schemeClr val="accent1"/>
+          </a:fillRef>
+          <a:effectRef idx="0">
+            <a:schemeClr val="accent1"/>
+          </a:effectRef>
+          <a:fontRef idx="minor">
+            <a:schemeClr val="lt1"/>
+          </a:fontRef>
+        </p:style>
+        <p:txBody>
+          <a:bodyPr rtlCol="0" anchor="ctr"/>
+          <a:lstStyle/>
+          <a:p>
+            <a:pPr algn="ctr"/>
+            <a:endParaRPr lang="fr-FR"/>
+          </a:p>
+        </p:txBody>
+      </p:sp>
+      <p:sp>
+        <p:nvSpPr>
+          <p:cNvPr id="4" name="ZoneTexte 3">
+            <a:extLst>
+              <a:ext uri="{FF2B5EF4-FFF2-40B4-BE49-F238E27FC236}">
+                <a16:creationId xmlns:a16="http://schemas.microsoft.com/office/drawing/2014/main" id="{BF0B8EFB-8208-3132-FA69-639DCAC96D36}"/>
+              </a:ext>
+            </a:extLst>
+          </p:cNvPr>
+          <p:cNvSpPr txBox="1"/>
+          <p:nvPr/>
+        </p:nvSpPr>
+        <p:spPr>
+          <a:xfrm>
+            <a:off x="1156871" y="953599"/>
+            <a:ext cx="2463487" cy="292388"/>
+          </a:xfrm>
+          <a:prstGeom prst="rect">
+            <a:avLst/>
+          </a:prstGeom>
+          <a:solidFill>
+            <a:schemeClr val="accent5">
+              <a:lumMod val="20000"/>
+              <a:lumOff val="80000"/>
+            </a:schemeClr>
+          </a:solidFill>
+        </p:spPr>
+        <p:txBody>
+          <a:bodyPr wrap="square" rtlCol="0">
+            <a:spAutoFit/>
+          </a:bodyPr>
+          <a:lstStyle/>
+          <a:p>
+            <a:pPr algn="ctr"/>
+            <a:r>
+              <a:rPr lang="fr-FR" sz="1300" dirty="0" err="1"/>
+              <a:t>scATACseq_R_CreateSeuratObject</a:t>
+            </a:r>
+            <a:endParaRPr lang="fr-FR" sz="1300" dirty="0"/>
+          </a:p>
+        </p:txBody>
+      </p:sp>
+      <p:sp>
+        <p:nvSpPr>
+          <p:cNvPr id="5" name="ZoneTexte 4">
+            <a:extLst>
+              <a:ext uri="{FF2B5EF4-FFF2-40B4-BE49-F238E27FC236}">
+                <a16:creationId xmlns:a16="http://schemas.microsoft.com/office/drawing/2014/main" id="{E248E638-639C-21B3-42AB-47371284C5B8}"/>
+              </a:ext>
+            </a:extLst>
+          </p:cNvPr>
+          <p:cNvSpPr txBox="1"/>
+          <p:nvPr/>
+        </p:nvSpPr>
+        <p:spPr>
+          <a:xfrm>
+            <a:off x="1308775" y="1758563"/>
+            <a:ext cx="2159678" cy="292388"/>
+          </a:xfrm>
+          <a:prstGeom prst="rect">
+            <a:avLst/>
+          </a:prstGeom>
+          <a:solidFill>
+            <a:schemeClr val="accent5">
+              <a:lumMod val="20000"/>
+              <a:lumOff val="80000"/>
+            </a:schemeClr>
+          </a:solidFill>
+        </p:spPr>
+        <p:txBody>
+          <a:bodyPr wrap="square" rtlCol="0">
+            <a:spAutoFit/>
+          </a:bodyPr>
+          <a:lstStyle/>
+          <a:p>
+            <a:pPr algn="ctr"/>
+            <a:r>
+              <a:rPr lang="fr-FR" sz="1300" dirty="0" err="1"/>
+              <a:t>scATACseq_R_QualityControl</a:t>
+            </a:r>
+            <a:endParaRPr lang="fr-FR" sz="1300" dirty="0"/>
+          </a:p>
+        </p:txBody>
+      </p:sp>
+      <p:sp>
+        <p:nvSpPr>
+          <p:cNvPr id="6" name="ZoneTexte 5">
+            <a:extLst>
+              <a:ext uri="{FF2B5EF4-FFF2-40B4-BE49-F238E27FC236}">
+                <a16:creationId xmlns:a16="http://schemas.microsoft.com/office/drawing/2014/main" id="{88BE4869-4CB7-D0E9-D4E2-292ADF3D1E3D}"/>
+              </a:ext>
+            </a:extLst>
+          </p:cNvPr>
+          <p:cNvSpPr txBox="1"/>
+          <p:nvPr/>
+        </p:nvSpPr>
+        <p:spPr>
+          <a:xfrm>
+            <a:off x="816021" y="3136518"/>
+            <a:ext cx="3091942" cy="292388"/>
+          </a:xfrm>
+          <a:prstGeom prst="rect">
+            <a:avLst/>
+          </a:prstGeom>
+          <a:solidFill>
+            <a:schemeClr val="accent5">
+              <a:lumMod val="20000"/>
+              <a:lumOff val="80000"/>
+            </a:schemeClr>
+          </a:solidFill>
+        </p:spPr>
+        <p:txBody>
+          <a:bodyPr wrap="square" rtlCol="0">
+            <a:spAutoFit/>
+          </a:bodyPr>
+          <a:lstStyle/>
+          <a:p>
+            <a:pPr algn="ctr"/>
+            <a:r>
+              <a:rPr lang="fr-FR" sz="1300" dirty="0" err="1"/>
+              <a:t>scATACseq_R_MergeObjectsCommonPeaks</a:t>
+            </a:r>
+            <a:endParaRPr lang="fr-FR" sz="1300" dirty="0"/>
+          </a:p>
+        </p:txBody>
+      </p:sp>
+      <p:sp>
+        <p:nvSpPr>
+          <p:cNvPr id="7" name="ZoneTexte 6">
+            <a:extLst>
+              <a:ext uri="{FF2B5EF4-FFF2-40B4-BE49-F238E27FC236}">
+                <a16:creationId xmlns:a16="http://schemas.microsoft.com/office/drawing/2014/main" id="{311864EF-FC06-CF64-37AA-633BD0DB0A72}"/>
+              </a:ext>
+            </a:extLst>
+          </p:cNvPr>
+          <p:cNvSpPr txBox="1"/>
+          <p:nvPr/>
+        </p:nvSpPr>
+        <p:spPr>
+          <a:xfrm>
+            <a:off x="1253022" y="3854639"/>
+            <a:ext cx="2256931" cy="292388"/>
+          </a:xfrm>
+          <a:prstGeom prst="rect">
+            <a:avLst/>
+          </a:prstGeom>
+          <a:solidFill>
+            <a:schemeClr val="accent5">
+              <a:lumMod val="20000"/>
+              <a:lumOff val="80000"/>
+            </a:schemeClr>
+          </a:solidFill>
+        </p:spPr>
+        <p:txBody>
+          <a:bodyPr wrap="square" rtlCol="0">
+            <a:spAutoFit/>
+          </a:bodyPr>
+          <a:lstStyle/>
+          <a:p>
+            <a:pPr algn="ctr"/>
+            <a:r>
+              <a:rPr lang="fr-FR" sz="1300" dirty="0" err="1"/>
+              <a:t>scATACseq_R_AddAnnotations</a:t>
+            </a:r>
+            <a:endParaRPr lang="fr-FR" sz="1300" dirty="0"/>
+          </a:p>
+        </p:txBody>
+      </p:sp>
+      <p:sp>
+        <p:nvSpPr>
+          <p:cNvPr id="8" name="ZoneTexte 7">
+            <a:extLst>
+              <a:ext uri="{FF2B5EF4-FFF2-40B4-BE49-F238E27FC236}">
+                <a16:creationId xmlns:a16="http://schemas.microsoft.com/office/drawing/2014/main" id="{B19CCBE3-E779-E58C-47D6-602925EA445A}"/>
+              </a:ext>
+            </a:extLst>
+          </p:cNvPr>
+          <p:cNvSpPr txBox="1"/>
+          <p:nvPr/>
+        </p:nvSpPr>
+        <p:spPr>
+          <a:xfrm>
+            <a:off x="994876" y="4531042"/>
+            <a:ext cx="2787475" cy="292388"/>
+          </a:xfrm>
+          <a:prstGeom prst="rect">
+            <a:avLst/>
+          </a:prstGeom>
+          <a:solidFill>
+            <a:schemeClr val="accent5">
+              <a:lumMod val="20000"/>
+              <a:lumOff val="80000"/>
+            </a:schemeClr>
+          </a:solidFill>
+        </p:spPr>
+        <p:txBody>
+          <a:bodyPr wrap="square" rtlCol="0">
+            <a:spAutoFit/>
+          </a:bodyPr>
+          <a:lstStyle/>
+          <a:p>
+            <a:pPr algn="ctr"/>
+            <a:r>
+              <a:rPr lang="fr-FR" sz="1300" dirty="0" err="1"/>
+              <a:t>scATACseq_R_NormalizationReduction</a:t>
+            </a:r>
+            <a:endParaRPr lang="fr-FR" sz="1300" dirty="0"/>
+          </a:p>
+        </p:txBody>
+      </p:sp>
+      <p:cxnSp>
+        <p:nvCxnSpPr>
+          <p:cNvPr id="13" name="Connecteur droit avec flèche 12">
+            <a:extLst>
+              <a:ext uri="{FF2B5EF4-FFF2-40B4-BE49-F238E27FC236}">
+                <a16:creationId xmlns:a16="http://schemas.microsoft.com/office/drawing/2014/main" id="{83270018-513E-58B4-9E02-4E813F3E3210}"/>
+              </a:ext>
+            </a:extLst>
+          </p:cNvPr>
+          <p:cNvCxnSpPr>
+            <a:cxnSpLocks/>
+          </p:cNvCxnSpPr>
+          <p:nvPr/>
+        </p:nvCxnSpPr>
+        <p:spPr>
+          <a:xfrm>
+            <a:off x="2410807" y="1302610"/>
+            <a:ext cx="0" cy="435632"/>
+          </a:xfrm>
+          <a:prstGeom prst="straightConnector1">
+            <a:avLst/>
+          </a:prstGeom>
+          <a:ln>
+            <a:tailEnd type="triangle"/>
+          </a:ln>
+        </p:spPr>
+        <p:style>
+          <a:lnRef idx="1">
+            <a:schemeClr val="dk1"/>
+          </a:lnRef>
+          <a:fillRef idx="0">
+            <a:schemeClr val="dk1"/>
+          </a:fillRef>
+          <a:effectRef idx="0">
+            <a:schemeClr val="dk1"/>
+          </a:effectRef>
+          <a:fontRef idx="minor">
+            <a:schemeClr val="tx1"/>
+          </a:fontRef>
+        </p:style>
+      </p:cxnSp>
+      <p:cxnSp>
+        <p:nvCxnSpPr>
+          <p:cNvPr id="14" name="Connecteur droit avec flèche 13">
+            <a:extLst>
+              <a:ext uri="{FF2B5EF4-FFF2-40B4-BE49-F238E27FC236}">
+                <a16:creationId xmlns:a16="http://schemas.microsoft.com/office/drawing/2014/main" id="{5AF8F9D9-4FA1-65C9-3C17-5D7CB5AB2A12}"/>
+              </a:ext>
+            </a:extLst>
+          </p:cNvPr>
+          <p:cNvCxnSpPr>
+            <a:cxnSpLocks/>
+          </p:cNvCxnSpPr>
+          <p:nvPr/>
+        </p:nvCxnSpPr>
+        <p:spPr>
+          <a:xfrm>
+            <a:off x="2410807" y="2117734"/>
+            <a:ext cx="0" cy="885850"/>
+          </a:xfrm>
+          <a:prstGeom prst="straightConnector1">
+            <a:avLst/>
+          </a:prstGeom>
+          <a:ln>
+            <a:tailEnd type="triangle"/>
+          </a:ln>
+        </p:spPr>
+        <p:style>
+          <a:lnRef idx="1">
+            <a:schemeClr val="dk1"/>
+          </a:lnRef>
+          <a:fillRef idx="0">
+            <a:schemeClr val="dk1"/>
+          </a:fillRef>
+          <a:effectRef idx="0">
+            <a:schemeClr val="dk1"/>
+          </a:effectRef>
+          <a:fontRef idx="minor">
+            <a:schemeClr val="tx1"/>
+          </a:fontRef>
+        </p:style>
+      </p:cxnSp>
+      <p:cxnSp>
+        <p:nvCxnSpPr>
+          <p:cNvPr id="15" name="Connecteur droit avec flèche 14">
+            <a:extLst>
+              <a:ext uri="{FF2B5EF4-FFF2-40B4-BE49-F238E27FC236}">
+                <a16:creationId xmlns:a16="http://schemas.microsoft.com/office/drawing/2014/main" id="{1921FC85-2E0C-2A78-BB91-C968FA1DCB0D}"/>
+              </a:ext>
+            </a:extLst>
+          </p:cNvPr>
+          <p:cNvCxnSpPr>
+            <a:cxnSpLocks/>
+          </p:cNvCxnSpPr>
+          <p:nvPr/>
+        </p:nvCxnSpPr>
+        <p:spPr>
+          <a:xfrm>
+            <a:off x="2410807" y="3412029"/>
+            <a:ext cx="0" cy="435632"/>
+          </a:xfrm>
+          <a:prstGeom prst="straightConnector1">
+            <a:avLst/>
+          </a:prstGeom>
+          <a:ln>
+            <a:tailEnd type="triangle"/>
+          </a:ln>
+        </p:spPr>
+        <p:style>
+          <a:lnRef idx="1">
+            <a:schemeClr val="dk1"/>
+          </a:lnRef>
+          <a:fillRef idx="0">
+            <a:schemeClr val="dk1"/>
+          </a:fillRef>
+          <a:effectRef idx="0">
+            <a:schemeClr val="dk1"/>
+          </a:effectRef>
+          <a:fontRef idx="minor">
+            <a:schemeClr val="tx1"/>
+          </a:fontRef>
+        </p:style>
+      </p:cxnSp>
+      <p:cxnSp>
+        <p:nvCxnSpPr>
+          <p:cNvPr id="16" name="Connecteur droit avec flèche 15">
+            <a:extLst>
+              <a:ext uri="{FF2B5EF4-FFF2-40B4-BE49-F238E27FC236}">
+                <a16:creationId xmlns:a16="http://schemas.microsoft.com/office/drawing/2014/main" id="{84C8DB8F-CCC0-6F20-5B88-25ABCE36EC21}"/>
+              </a:ext>
+            </a:extLst>
+          </p:cNvPr>
+          <p:cNvCxnSpPr>
+            <a:cxnSpLocks/>
+          </p:cNvCxnSpPr>
+          <p:nvPr/>
+        </p:nvCxnSpPr>
+        <p:spPr>
+          <a:xfrm>
+            <a:off x="2410807" y="4095410"/>
+            <a:ext cx="0" cy="435632"/>
+          </a:xfrm>
+          <a:prstGeom prst="straightConnector1">
+            <a:avLst/>
+          </a:prstGeom>
+          <a:ln>
+            <a:tailEnd type="triangle"/>
+          </a:ln>
+        </p:spPr>
+        <p:style>
+          <a:lnRef idx="1">
+            <a:schemeClr val="dk1"/>
+          </a:lnRef>
+          <a:fillRef idx="0">
+            <a:schemeClr val="dk1"/>
+          </a:fillRef>
+          <a:effectRef idx="0">
+            <a:schemeClr val="dk1"/>
+          </a:effectRef>
+          <a:fontRef idx="minor">
+            <a:schemeClr val="tx1"/>
+          </a:fontRef>
+        </p:style>
+      </p:cxnSp>
+      <p:sp>
+        <p:nvSpPr>
+          <p:cNvPr id="17" name="ZoneTexte 16">
+            <a:extLst>
+              <a:ext uri="{FF2B5EF4-FFF2-40B4-BE49-F238E27FC236}">
+                <a16:creationId xmlns:a16="http://schemas.microsoft.com/office/drawing/2014/main" id="{2B31C3F0-11AA-7B19-0857-DD5E263922D9}"/>
+              </a:ext>
+            </a:extLst>
+          </p:cNvPr>
+          <p:cNvSpPr txBox="1"/>
+          <p:nvPr/>
+        </p:nvSpPr>
+        <p:spPr>
+          <a:xfrm rot="20616044">
+            <a:off x="-2983" y="2415247"/>
+            <a:ext cx="1197591" cy="523220"/>
+          </a:xfrm>
+          <a:prstGeom prst="rect">
+            <a:avLst/>
+          </a:prstGeom>
+          <a:noFill/>
+        </p:spPr>
+        <p:txBody>
+          <a:bodyPr wrap="square" rtlCol="0">
+            <a:spAutoFit/>
+          </a:bodyPr>
+          <a:lstStyle/>
+          <a:p>
+            <a:r>
+              <a:rPr lang="fr-FR" sz="1400" b="1" dirty="0">
+                <a:solidFill>
+                  <a:srgbClr val="7030A0"/>
+                </a:solidFill>
+              </a:rPr>
+              <a:t>hg38_annotations_gr.rds</a:t>
+            </a:r>
+          </a:p>
+        </p:txBody>
+      </p:sp>
+      <p:sp>
+        <p:nvSpPr>
+          <p:cNvPr id="21" name="ZoneTexte 20">
+            <a:extLst>
+              <a:ext uri="{FF2B5EF4-FFF2-40B4-BE49-F238E27FC236}">
+                <a16:creationId xmlns:a16="http://schemas.microsoft.com/office/drawing/2014/main" id="{40CE1592-F872-04E1-4AB1-C411BF296373}"/>
+              </a:ext>
+            </a:extLst>
+          </p:cNvPr>
+          <p:cNvSpPr txBox="1"/>
+          <p:nvPr/>
+        </p:nvSpPr>
+        <p:spPr>
+          <a:xfrm rot="20628894">
+            <a:off x="131505" y="-107109"/>
+            <a:ext cx="1464488" cy="738664"/>
+          </a:xfrm>
+          <a:prstGeom prst="rect">
+            <a:avLst/>
+          </a:prstGeom>
+          <a:noFill/>
+        </p:spPr>
+        <p:txBody>
+          <a:bodyPr wrap="square" rtlCol="0">
+            <a:spAutoFit/>
+          </a:bodyPr>
+          <a:lstStyle/>
+          <a:p>
+            <a:r>
+              <a:rPr lang="fr-FR" sz="1400" b="1" dirty="0">
+                <a:solidFill>
+                  <a:srgbClr val="7030A0"/>
+                </a:solidFill>
+              </a:rPr>
+              <a:t>.h5</a:t>
+            </a:r>
+          </a:p>
+          <a:p>
+            <a:r>
+              <a:rPr lang="fr-FR" sz="1400" b="1" dirty="0">
+                <a:solidFill>
+                  <a:srgbClr val="7030A0"/>
+                </a:solidFill>
+              </a:rPr>
+              <a:t>singlecell.csv</a:t>
+            </a:r>
+          </a:p>
+          <a:p>
+            <a:r>
+              <a:rPr lang="fr-FR" sz="1400" b="1" dirty="0">
+                <a:solidFill>
+                  <a:srgbClr val="7030A0"/>
+                </a:solidFill>
+              </a:rPr>
+              <a:t>fragments.tsv.gz</a:t>
+            </a:r>
+          </a:p>
+        </p:txBody>
+      </p:sp>
+      <p:cxnSp>
+        <p:nvCxnSpPr>
+          <p:cNvPr id="22" name="Connecteur : en arc 21">
+            <a:extLst>
+              <a:ext uri="{FF2B5EF4-FFF2-40B4-BE49-F238E27FC236}">
+                <a16:creationId xmlns:a16="http://schemas.microsoft.com/office/drawing/2014/main" id="{FD0764AF-D94D-3F7B-671F-FA222BD3EA84}"/>
+              </a:ext>
+            </a:extLst>
+          </p:cNvPr>
+          <p:cNvCxnSpPr>
+            <a:cxnSpLocks/>
+            <a:endCxn id="7" idx="1"/>
+          </p:cNvCxnSpPr>
+          <p:nvPr/>
+        </p:nvCxnSpPr>
+        <p:spPr>
+          <a:xfrm rot="16200000" flipH="1">
+            <a:off x="293323" y="3041134"/>
+            <a:ext cx="978704" cy="940694"/>
+          </a:xfrm>
+          <a:prstGeom prst="curvedConnector2">
+            <a:avLst/>
+          </a:prstGeom>
+          <a:ln>
+            <a:tailEnd type="triangle"/>
+          </a:ln>
+        </p:spPr>
+        <p:style>
+          <a:lnRef idx="1">
+            <a:schemeClr val="dk1"/>
+          </a:lnRef>
+          <a:fillRef idx="0">
+            <a:schemeClr val="dk1"/>
+          </a:fillRef>
+          <a:effectRef idx="0">
+            <a:schemeClr val="dk1"/>
+          </a:effectRef>
+          <a:fontRef idx="minor">
+            <a:schemeClr val="tx1"/>
+          </a:fontRef>
+        </p:style>
+      </p:cxnSp>
+      <p:cxnSp>
+        <p:nvCxnSpPr>
+          <p:cNvPr id="24" name="Connecteur : en arc 23">
+            <a:extLst>
+              <a:ext uri="{FF2B5EF4-FFF2-40B4-BE49-F238E27FC236}">
+                <a16:creationId xmlns:a16="http://schemas.microsoft.com/office/drawing/2014/main" id="{4BD99294-18F3-0201-EC48-1A2C130C49C5}"/>
+              </a:ext>
+            </a:extLst>
+          </p:cNvPr>
+          <p:cNvCxnSpPr>
+            <a:cxnSpLocks/>
+            <a:endCxn id="4" idx="1"/>
+          </p:cNvCxnSpPr>
+          <p:nvPr/>
+        </p:nvCxnSpPr>
+        <p:spPr>
+          <a:xfrm>
+            <a:off x="637004" y="672991"/>
+            <a:ext cx="519867" cy="426802"/>
+          </a:xfrm>
+          <a:prstGeom prst="curvedConnector3">
+            <a:avLst>
+              <a:gd name="adj1" fmla="val 50000"/>
+            </a:avLst>
+          </a:prstGeom>
+          <a:ln>
+            <a:tailEnd type="triangle"/>
+          </a:ln>
+        </p:spPr>
+        <p:style>
+          <a:lnRef idx="1">
+            <a:schemeClr val="dk1"/>
+          </a:lnRef>
+          <a:fillRef idx="0">
+            <a:schemeClr val="dk1"/>
+          </a:fillRef>
+          <a:effectRef idx="0">
+            <a:schemeClr val="dk1"/>
+          </a:effectRef>
+          <a:fontRef idx="minor">
+            <a:schemeClr val="tx1"/>
+          </a:fontRef>
+        </p:style>
+      </p:cxnSp>
+      <p:sp>
+        <p:nvSpPr>
+          <p:cNvPr id="26" name="ZoneTexte 25">
+            <a:extLst>
+              <a:ext uri="{FF2B5EF4-FFF2-40B4-BE49-F238E27FC236}">
+                <a16:creationId xmlns:a16="http://schemas.microsoft.com/office/drawing/2014/main" id="{65B612E5-1CFD-9CCF-7EA0-1F78D922BAFE}"/>
+              </a:ext>
+            </a:extLst>
+          </p:cNvPr>
+          <p:cNvSpPr txBox="1"/>
+          <p:nvPr/>
+        </p:nvSpPr>
+        <p:spPr>
+          <a:xfrm>
+            <a:off x="4974608" y="177775"/>
+            <a:ext cx="1763176" cy="307777"/>
+          </a:xfrm>
+          <a:prstGeom prst="rect">
+            <a:avLst/>
+          </a:prstGeom>
+          <a:noFill/>
+        </p:spPr>
+        <p:txBody>
+          <a:bodyPr wrap="square" rtlCol="0">
+            <a:spAutoFit/>
+          </a:bodyPr>
+          <a:lstStyle/>
+          <a:p>
+            <a:r>
+              <a:rPr lang="fr-FR" sz="1400" b="1" dirty="0">
+                <a:effectLst>
+                  <a:outerShdw blurRad="38100" dist="38100" dir="2700000" algn="tl">
+                    <a:srgbClr val="000000">
+                      <a:alpha val="43137"/>
+                    </a:srgbClr>
+                  </a:outerShdw>
+                </a:effectLst>
+              </a:rPr>
+              <a:t>Workflow </a:t>
+            </a:r>
+            <a:r>
+              <a:rPr lang="fr-FR" sz="1400" b="1" dirty="0" err="1">
+                <a:effectLst>
+                  <a:outerShdw blurRad="38100" dist="38100" dir="2700000" algn="tl">
+                    <a:srgbClr val="000000">
+                      <a:alpha val="43137"/>
+                    </a:srgbClr>
+                  </a:outerShdw>
+                </a:effectLst>
+              </a:rPr>
+              <a:t>scATACseq</a:t>
+            </a:r>
+            <a:endParaRPr lang="fr-FR" sz="1400" b="1" dirty="0">
+              <a:effectLst>
+                <a:outerShdw blurRad="38100" dist="38100" dir="2700000" algn="tl">
+                  <a:srgbClr val="000000">
+                    <a:alpha val="43137"/>
+                  </a:srgbClr>
+                </a:outerShdw>
+              </a:effectLst>
+            </a:endParaRPr>
+          </a:p>
+        </p:txBody>
+      </p:sp>
+      <p:cxnSp>
+        <p:nvCxnSpPr>
+          <p:cNvPr id="29" name="Connecteur droit avec flèche 28">
+            <a:extLst>
+              <a:ext uri="{FF2B5EF4-FFF2-40B4-BE49-F238E27FC236}">
+                <a16:creationId xmlns:a16="http://schemas.microsoft.com/office/drawing/2014/main" id="{BC0F1E8E-20C5-B3D6-8DBB-244479CCED98}"/>
+              </a:ext>
+            </a:extLst>
+          </p:cNvPr>
+          <p:cNvCxnSpPr>
+            <a:cxnSpLocks/>
+          </p:cNvCxnSpPr>
+          <p:nvPr/>
+        </p:nvCxnSpPr>
+        <p:spPr>
+          <a:xfrm>
+            <a:off x="2461561" y="4864922"/>
+            <a:ext cx="1184631" cy="3504378"/>
+          </a:xfrm>
+          <a:prstGeom prst="straightConnector1">
+            <a:avLst/>
+          </a:prstGeom>
+          <a:ln>
+            <a:tailEnd type="triangle"/>
+          </a:ln>
+        </p:spPr>
+        <p:style>
+          <a:lnRef idx="1">
+            <a:schemeClr val="dk1"/>
+          </a:lnRef>
+          <a:fillRef idx="0">
+            <a:schemeClr val="dk1"/>
+          </a:fillRef>
+          <a:effectRef idx="0">
+            <a:schemeClr val="dk1"/>
+          </a:effectRef>
+          <a:fontRef idx="minor">
+            <a:schemeClr val="tx1"/>
+          </a:fontRef>
+        </p:style>
+      </p:cxnSp>
+      <p:cxnSp>
+        <p:nvCxnSpPr>
+          <p:cNvPr id="32" name="Connecteur droit avec flèche 31">
+            <a:extLst>
+              <a:ext uri="{FF2B5EF4-FFF2-40B4-BE49-F238E27FC236}">
+                <a16:creationId xmlns:a16="http://schemas.microsoft.com/office/drawing/2014/main" id="{E1153E48-3A12-8F19-E3F3-F9336BE496A8}"/>
+              </a:ext>
+            </a:extLst>
+          </p:cNvPr>
+          <p:cNvCxnSpPr/>
+          <p:nvPr/>
+        </p:nvCxnSpPr>
+        <p:spPr>
+          <a:xfrm flipH="1">
+            <a:off x="1400604" y="4864922"/>
+            <a:ext cx="1060957" cy="1502974"/>
+          </a:xfrm>
+          <a:prstGeom prst="straightConnector1">
+            <a:avLst/>
+          </a:prstGeom>
+          <a:ln>
+            <a:tailEnd type="triangle"/>
+          </a:ln>
+        </p:spPr>
+        <p:style>
+          <a:lnRef idx="1">
+            <a:schemeClr val="dk1"/>
+          </a:lnRef>
+          <a:fillRef idx="0">
+            <a:schemeClr val="dk1"/>
+          </a:fillRef>
+          <a:effectRef idx="0">
+            <a:schemeClr val="dk1"/>
+          </a:effectRef>
+          <a:fontRef idx="minor">
+            <a:schemeClr val="tx1"/>
+          </a:fontRef>
+        </p:style>
+      </p:cxnSp>
+      <p:cxnSp>
+        <p:nvCxnSpPr>
+          <p:cNvPr id="34" name="Connecteur droit avec flèche 33">
+            <a:extLst>
+              <a:ext uri="{FF2B5EF4-FFF2-40B4-BE49-F238E27FC236}">
+                <a16:creationId xmlns:a16="http://schemas.microsoft.com/office/drawing/2014/main" id="{B6F50F6C-D5DA-D995-98C1-BF8F1B0B6005}"/>
+              </a:ext>
+            </a:extLst>
+          </p:cNvPr>
+          <p:cNvCxnSpPr>
+            <a:cxnSpLocks/>
+          </p:cNvCxnSpPr>
+          <p:nvPr/>
+        </p:nvCxnSpPr>
+        <p:spPr>
+          <a:xfrm>
+            <a:off x="2461561" y="4868074"/>
+            <a:ext cx="1721470" cy="2033100"/>
+          </a:xfrm>
+          <a:prstGeom prst="straightConnector1">
+            <a:avLst/>
+          </a:prstGeom>
+          <a:ln>
+            <a:tailEnd type="triangle"/>
+          </a:ln>
+        </p:spPr>
+        <p:style>
+          <a:lnRef idx="1">
+            <a:schemeClr val="dk1"/>
+          </a:lnRef>
+          <a:fillRef idx="0">
+            <a:schemeClr val="dk1"/>
+          </a:fillRef>
+          <a:effectRef idx="0">
+            <a:schemeClr val="dk1"/>
+          </a:effectRef>
+          <a:fontRef idx="minor">
+            <a:schemeClr val="tx1"/>
+          </a:fontRef>
+        </p:style>
+      </p:cxnSp>
+      <p:sp>
+        <p:nvSpPr>
+          <p:cNvPr id="3" name="ZoneTexte 2">
+            <a:extLst>
+              <a:ext uri="{FF2B5EF4-FFF2-40B4-BE49-F238E27FC236}">
+                <a16:creationId xmlns:a16="http://schemas.microsoft.com/office/drawing/2014/main" id="{C67CD655-A3A1-8FF8-F432-53088F320D1E}"/>
+              </a:ext>
+            </a:extLst>
+          </p:cNvPr>
+          <p:cNvSpPr txBox="1"/>
+          <p:nvPr/>
+        </p:nvSpPr>
+        <p:spPr>
+          <a:xfrm rot="16200000">
+            <a:off x="4695366" y="2986060"/>
+            <a:ext cx="3564548" cy="369332"/>
+          </a:xfrm>
+          <a:prstGeom prst="rect">
+            <a:avLst/>
+          </a:prstGeom>
+          <a:noFill/>
+        </p:spPr>
+        <p:txBody>
+          <a:bodyPr wrap="square" rtlCol="0">
+            <a:spAutoFit/>
+          </a:bodyPr>
+          <a:lstStyle/>
+          <a:p>
+            <a:pPr algn="ctr"/>
+            <a:r>
+              <a:rPr lang="fr-FR" b="1" dirty="0">
+                <a:solidFill>
+                  <a:schemeClr val="bg1">
+                    <a:lumMod val="65000"/>
+                  </a:schemeClr>
+                </a:solidFill>
+              </a:rPr>
+              <a:t>DATA CLEANING AND FILTERING</a:t>
+            </a:r>
+          </a:p>
+        </p:txBody>
+      </p:sp>
+      <p:sp>
+        <p:nvSpPr>
+          <p:cNvPr id="18" name="ZoneTexte 17">
+            <a:extLst>
+              <a:ext uri="{FF2B5EF4-FFF2-40B4-BE49-F238E27FC236}">
+                <a16:creationId xmlns:a16="http://schemas.microsoft.com/office/drawing/2014/main" id="{03935B7D-30C8-E939-932E-F2CC802BB209}"/>
+              </a:ext>
+            </a:extLst>
+          </p:cNvPr>
+          <p:cNvSpPr txBox="1"/>
+          <p:nvPr/>
+        </p:nvSpPr>
+        <p:spPr>
+          <a:xfrm rot="16200000">
+            <a:off x="5065097" y="7226966"/>
+            <a:ext cx="2825086" cy="369332"/>
+          </a:xfrm>
+          <a:prstGeom prst="rect">
+            <a:avLst/>
+          </a:prstGeom>
+          <a:noFill/>
+        </p:spPr>
+        <p:txBody>
+          <a:bodyPr wrap="square" rtlCol="0">
+            <a:spAutoFit/>
+          </a:bodyPr>
+          <a:lstStyle/>
+          <a:p>
+            <a:r>
+              <a:rPr lang="fr-FR" b="1" dirty="0">
+                <a:solidFill>
+                  <a:schemeClr val="bg1">
+                    <a:lumMod val="65000"/>
+                  </a:schemeClr>
+                </a:solidFill>
+              </a:rPr>
+              <a:t>DOWNSTREAM ANALYSIS</a:t>
+            </a:r>
+          </a:p>
+        </p:txBody>
+      </p:sp>
+      <p:sp>
+        <p:nvSpPr>
+          <p:cNvPr id="28" name="ZoneTexte 27">
+            <a:extLst>
+              <a:ext uri="{FF2B5EF4-FFF2-40B4-BE49-F238E27FC236}">
+                <a16:creationId xmlns:a16="http://schemas.microsoft.com/office/drawing/2014/main" id="{DAAD2884-6CFF-7560-BD2C-9BD199B8C3B1}"/>
+              </a:ext>
+            </a:extLst>
+          </p:cNvPr>
+          <p:cNvSpPr txBox="1"/>
+          <p:nvPr/>
+        </p:nvSpPr>
+        <p:spPr>
+          <a:xfrm>
+            <a:off x="3684991" y="954667"/>
+            <a:ext cx="2776768" cy="292388"/>
+          </a:xfrm>
+          <a:prstGeom prst="rect">
+            <a:avLst/>
+          </a:prstGeom>
+          <a:solidFill>
+            <a:schemeClr val="accent5">
+              <a:lumMod val="20000"/>
+              <a:lumOff val="80000"/>
+            </a:schemeClr>
+          </a:solidFill>
+        </p:spPr>
+        <p:txBody>
+          <a:bodyPr wrap="square" rtlCol="0">
+            <a:spAutoFit/>
+          </a:bodyPr>
+          <a:lstStyle/>
+          <a:p>
+            <a:pPr algn="ctr"/>
+            <a:r>
+              <a:rPr lang="fr-FR" sz="1300" dirty="0" err="1"/>
+              <a:t>scATACseq_SKMK_CreateSeuratObject</a:t>
+            </a:r>
+            <a:endParaRPr lang="fr-FR" sz="1300" dirty="0"/>
+          </a:p>
+        </p:txBody>
+      </p:sp>
+      <p:sp>
+        <p:nvSpPr>
+          <p:cNvPr id="30" name="ZoneTexte 29">
+            <a:extLst>
+              <a:ext uri="{FF2B5EF4-FFF2-40B4-BE49-F238E27FC236}">
+                <a16:creationId xmlns:a16="http://schemas.microsoft.com/office/drawing/2014/main" id="{FDF58D45-8E7B-E926-D651-AE17D7A6079B}"/>
+              </a:ext>
+            </a:extLst>
+          </p:cNvPr>
+          <p:cNvSpPr txBox="1"/>
+          <p:nvPr/>
+        </p:nvSpPr>
+        <p:spPr>
+          <a:xfrm>
+            <a:off x="3684991" y="1748402"/>
+            <a:ext cx="2424494" cy="292388"/>
+          </a:xfrm>
+          <a:prstGeom prst="rect">
+            <a:avLst/>
+          </a:prstGeom>
+          <a:solidFill>
+            <a:schemeClr val="accent5">
+              <a:lumMod val="20000"/>
+              <a:lumOff val="80000"/>
+            </a:schemeClr>
+          </a:solidFill>
+        </p:spPr>
+        <p:txBody>
+          <a:bodyPr wrap="square" rtlCol="0">
+            <a:spAutoFit/>
+          </a:bodyPr>
+          <a:lstStyle/>
+          <a:p>
+            <a:pPr algn="ctr"/>
+            <a:r>
+              <a:rPr lang="fr-FR" sz="1300" dirty="0" err="1"/>
+              <a:t>scATACseq_SKMK_QualityControl</a:t>
+            </a:r>
+            <a:endParaRPr lang="fr-FR" sz="1300" dirty="0"/>
+          </a:p>
+        </p:txBody>
+      </p:sp>
+      <p:cxnSp>
+        <p:nvCxnSpPr>
+          <p:cNvPr id="31" name="Connecteur droit avec flèche 30">
+            <a:extLst>
+              <a:ext uri="{FF2B5EF4-FFF2-40B4-BE49-F238E27FC236}">
+                <a16:creationId xmlns:a16="http://schemas.microsoft.com/office/drawing/2014/main" id="{2F62E2C9-485C-98E1-7F81-CE92F3D6554C}"/>
+              </a:ext>
+            </a:extLst>
+          </p:cNvPr>
+          <p:cNvCxnSpPr>
+            <a:cxnSpLocks/>
+          </p:cNvCxnSpPr>
+          <p:nvPr/>
+        </p:nvCxnSpPr>
+        <p:spPr>
+          <a:xfrm>
+            <a:off x="4897238" y="1302610"/>
+            <a:ext cx="0" cy="435632"/>
+          </a:xfrm>
+          <a:prstGeom prst="straightConnector1">
+            <a:avLst/>
+          </a:prstGeom>
+          <a:ln>
+            <a:tailEnd type="triangle"/>
+          </a:ln>
+        </p:spPr>
+        <p:style>
+          <a:lnRef idx="1">
+            <a:schemeClr val="dk1"/>
+          </a:lnRef>
+          <a:fillRef idx="0">
+            <a:schemeClr val="dk1"/>
+          </a:fillRef>
+          <a:effectRef idx="0">
+            <a:schemeClr val="dk1"/>
+          </a:effectRef>
+          <a:fontRef idx="minor">
+            <a:schemeClr val="tx1"/>
+          </a:fontRef>
+        </p:style>
+      </p:cxnSp>
+      <p:cxnSp>
+        <p:nvCxnSpPr>
+          <p:cNvPr id="39" name="Connecteur droit avec flèche 38">
+            <a:extLst>
+              <a:ext uri="{FF2B5EF4-FFF2-40B4-BE49-F238E27FC236}">
+                <a16:creationId xmlns:a16="http://schemas.microsoft.com/office/drawing/2014/main" id="{A64E7C46-C14D-5355-1C12-8928E1F7FCAF}"/>
+              </a:ext>
+            </a:extLst>
+          </p:cNvPr>
+          <p:cNvCxnSpPr>
+            <a:cxnSpLocks/>
+          </p:cNvCxnSpPr>
+          <p:nvPr/>
+        </p:nvCxnSpPr>
+        <p:spPr>
+          <a:xfrm flipH="1">
+            <a:off x="4519280" y="2122123"/>
+            <a:ext cx="377958" cy="313766"/>
+          </a:xfrm>
+          <a:prstGeom prst="straightConnector1">
+            <a:avLst/>
+          </a:prstGeom>
+          <a:ln>
+            <a:tailEnd type="triangle"/>
+          </a:ln>
+        </p:spPr>
+        <p:style>
+          <a:lnRef idx="1">
+            <a:schemeClr val="dk1"/>
+          </a:lnRef>
+          <a:fillRef idx="0">
+            <a:schemeClr val="dk1"/>
+          </a:fillRef>
+          <a:effectRef idx="0">
+            <a:schemeClr val="dk1"/>
+          </a:effectRef>
+          <a:fontRef idx="minor">
+            <a:schemeClr val="tx1"/>
+          </a:fontRef>
+        </p:style>
+      </p:cxnSp>
+      <p:cxnSp>
+        <p:nvCxnSpPr>
+          <p:cNvPr id="40" name="Connecteur droit avec flèche 39">
+            <a:extLst>
+              <a:ext uri="{FF2B5EF4-FFF2-40B4-BE49-F238E27FC236}">
+                <a16:creationId xmlns:a16="http://schemas.microsoft.com/office/drawing/2014/main" id="{479E8DEF-7AEB-5273-5818-87AA283F17C2}"/>
+              </a:ext>
+            </a:extLst>
+          </p:cNvPr>
+          <p:cNvCxnSpPr>
+            <a:cxnSpLocks/>
+          </p:cNvCxnSpPr>
+          <p:nvPr/>
+        </p:nvCxnSpPr>
+        <p:spPr>
+          <a:xfrm>
+            <a:off x="2457125" y="4864922"/>
+            <a:ext cx="279584" cy="3407681"/>
+          </a:xfrm>
+          <a:prstGeom prst="straightConnector1">
+            <a:avLst/>
+          </a:prstGeom>
+          <a:ln>
+            <a:tailEnd type="triangle"/>
+          </a:ln>
+        </p:spPr>
+        <p:style>
+          <a:lnRef idx="1">
+            <a:schemeClr val="dk1"/>
+          </a:lnRef>
+          <a:fillRef idx="0">
+            <a:schemeClr val="dk1"/>
+          </a:fillRef>
+          <a:effectRef idx="0">
+            <a:schemeClr val="dk1"/>
+          </a:effectRef>
+          <a:fontRef idx="minor">
+            <a:schemeClr val="tx1"/>
+          </a:fontRef>
+        </p:style>
+      </p:cxnSp>
+      <p:cxnSp>
+        <p:nvCxnSpPr>
+          <p:cNvPr id="42" name="Connecteur droit avec flèche 41">
+            <a:extLst>
+              <a:ext uri="{FF2B5EF4-FFF2-40B4-BE49-F238E27FC236}">
+                <a16:creationId xmlns:a16="http://schemas.microsoft.com/office/drawing/2014/main" id="{C6DF2B37-79F5-52B9-20AD-7F4F8DCD20ED}"/>
+              </a:ext>
+            </a:extLst>
+          </p:cNvPr>
+          <p:cNvCxnSpPr>
+            <a:cxnSpLocks/>
+          </p:cNvCxnSpPr>
+          <p:nvPr/>
+        </p:nvCxnSpPr>
+        <p:spPr>
+          <a:xfrm>
+            <a:off x="2455220" y="4866616"/>
+            <a:ext cx="2116284" cy="947361"/>
+          </a:xfrm>
+          <a:prstGeom prst="straightConnector1">
+            <a:avLst/>
+          </a:prstGeom>
+          <a:ln>
+            <a:tailEnd type="triangle"/>
+          </a:ln>
+        </p:spPr>
+        <p:style>
+          <a:lnRef idx="1">
+            <a:schemeClr val="dk1"/>
+          </a:lnRef>
+          <a:fillRef idx="0">
+            <a:schemeClr val="dk1"/>
+          </a:fillRef>
+          <a:effectRef idx="0">
+            <a:schemeClr val="dk1"/>
+          </a:effectRef>
+          <a:fontRef idx="minor">
+            <a:schemeClr val="tx1"/>
+          </a:fontRef>
+        </p:style>
+      </p:cxnSp>
+      <p:sp>
+        <p:nvSpPr>
+          <p:cNvPr id="9" name="ZoneTexte 8">
+            <a:extLst>
+              <a:ext uri="{FF2B5EF4-FFF2-40B4-BE49-F238E27FC236}">
+                <a16:creationId xmlns:a16="http://schemas.microsoft.com/office/drawing/2014/main" id="{A3D36365-EED8-E65F-01C1-15692673136A}"/>
+              </a:ext>
+            </a:extLst>
+          </p:cNvPr>
+          <p:cNvSpPr txBox="1"/>
+          <p:nvPr/>
+        </p:nvSpPr>
+        <p:spPr>
+          <a:xfrm>
+            <a:off x="2966222" y="2496484"/>
+            <a:ext cx="2961943" cy="292388"/>
+          </a:xfrm>
+          <a:prstGeom prst="rect">
+            <a:avLst/>
+          </a:prstGeom>
+          <a:solidFill>
+            <a:schemeClr val="accent5">
+              <a:lumMod val="20000"/>
+              <a:lumOff val="80000"/>
+            </a:schemeClr>
+          </a:solidFill>
+        </p:spPr>
+        <p:txBody>
+          <a:bodyPr wrap="square" rtlCol="0">
+            <a:spAutoFit/>
+          </a:bodyPr>
+          <a:lstStyle/>
+          <a:p>
+            <a:pPr algn="ctr"/>
+            <a:r>
+              <a:rPr lang="fr-FR" sz="1300" dirty="0" err="1"/>
+              <a:t>scATACseq_R-SKMK_ReportCreateQuality</a:t>
+            </a:r>
+            <a:endParaRPr lang="fr-FR" sz="1300" dirty="0"/>
+          </a:p>
+        </p:txBody>
+      </p:sp>
+      <p:cxnSp>
+        <p:nvCxnSpPr>
+          <p:cNvPr id="20" name="Connecteur droit avec flèche 19">
+            <a:extLst>
+              <a:ext uri="{FF2B5EF4-FFF2-40B4-BE49-F238E27FC236}">
+                <a16:creationId xmlns:a16="http://schemas.microsoft.com/office/drawing/2014/main" id="{4441BDE4-78EC-58BA-15DC-AB669CB74073}"/>
+              </a:ext>
+            </a:extLst>
+          </p:cNvPr>
+          <p:cNvCxnSpPr>
+            <a:cxnSpLocks/>
+          </p:cNvCxnSpPr>
+          <p:nvPr/>
+        </p:nvCxnSpPr>
+        <p:spPr>
+          <a:xfrm flipH="1">
+            <a:off x="3429000" y="2858700"/>
+            <a:ext cx="327882" cy="178864"/>
+          </a:xfrm>
+          <a:prstGeom prst="straightConnector1">
+            <a:avLst/>
+          </a:prstGeom>
+          <a:ln>
+            <a:tailEnd type="triangle"/>
+          </a:ln>
+        </p:spPr>
+        <p:style>
+          <a:lnRef idx="1">
+            <a:schemeClr val="dk1"/>
+          </a:lnRef>
+          <a:fillRef idx="0">
+            <a:schemeClr val="dk1"/>
+          </a:fillRef>
+          <a:effectRef idx="0">
+            <a:schemeClr val="dk1"/>
+          </a:effectRef>
+          <a:fontRef idx="minor">
+            <a:schemeClr val="tx1"/>
+          </a:fontRef>
+        </p:style>
+      </p:cxnSp>
+      <p:sp>
+        <p:nvSpPr>
+          <p:cNvPr id="35" name="ZoneTexte 34">
+            <a:extLst>
+              <a:ext uri="{FF2B5EF4-FFF2-40B4-BE49-F238E27FC236}">
+                <a16:creationId xmlns:a16="http://schemas.microsoft.com/office/drawing/2014/main" id="{7FF0A812-D534-8F95-196E-79A8C17A3A00}"/>
+              </a:ext>
+            </a:extLst>
+          </p:cNvPr>
+          <p:cNvSpPr txBox="1"/>
+          <p:nvPr/>
+        </p:nvSpPr>
+        <p:spPr>
+          <a:xfrm>
+            <a:off x="4418149" y="5910674"/>
+            <a:ext cx="1737659" cy="492443"/>
+          </a:xfrm>
+          <a:prstGeom prst="rect">
+            <a:avLst/>
+          </a:prstGeom>
+          <a:solidFill>
+            <a:schemeClr val="accent5">
+              <a:lumMod val="20000"/>
+              <a:lumOff val="80000"/>
+            </a:schemeClr>
+          </a:solidFill>
+        </p:spPr>
+        <p:txBody>
+          <a:bodyPr wrap="square" rtlCol="0">
+            <a:spAutoFit/>
+          </a:bodyPr>
+          <a:lstStyle/>
+          <a:p>
+            <a:pPr algn="ctr"/>
+            <a:r>
+              <a:rPr lang="fr-FR" sz="1300" dirty="0" err="1"/>
+              <a:t>scATACseq_R_DWNS</a:t>
+            </a:r>
+            <a:r>
+              <a:rPr lang="fr-FR" sz="1300" dirty="0"/>
+              <a:t>_</a:t>
+            </a:r>
+          </a:p>
+          <a:p>
+            <a:pPr algn="ctr"/>
+            <a:r>
+              <a:rPr lang="fr-FR" sz="1300" dirty="0" err="1"/>
+              <a:t>CellsPeaksStatistics</a:t>
+            </a:r>
+            <a:endParaRPr lang="fr-FR" sz="1300" dirty="0"/>
+          </a:p>
+        </p:txBody>
+      </p:sp>
+      <p:sp>
+        <p:nvSpPr>
+          <p:cNvPr id="36" name="ZoneTexte 35">
+            <a:extLst>
+              <a:ext uri="{FF2B5EF4-FFF2-40B4-BE49-F238E27FC236}">
+                <a16:creationId xmlns:a16="http://schemas.microsoft.com/office/drawing/2014/main" id="{58B5D9A4-6373-1F7B-4EFE-D349D81967DF}"/>
+              </a:ext>
+            </a:extLst>
+          </p:cNvPr>
+          <p:cNvSpPr txBox="1"/>
+          <p:nvPr/>
+        </p:nvSpPr>
+        <p:spPr>
+          <a:xfrm>
+            <a:off x="3978247" y="6950465"/>
+            <a:ext cx="2039578" cy="492443"/>
+          </a:xfrm>
+          <a:prstGeom prst="rect">
+            <a:avLst/>
+          </a:prstGeom>
+          <a:solidFill>
+            <a:schemeClr val="accent5">
+              <a:lumMod val="20000"/>
+              <a:lumOff val="80000"/>
+            </a:schemeClr>
+          </a:solidFill>
+        </p:spPr>
+        <p:txBody>
+          <a:bodyPr wrap="square" rtlCol="0">
+            <a:spAutoFit/>
+          </a:bodyPr>
+          <a:lstStyle/>
+          <a:p>
+            <a:pPr algn="ctr"/>
+            <a:r>
+              <a:rPr lang="fr-FR" sz="1300" dirty="0" err="1"/>
+              <a:t>scATACseq_R_DWNS</a:t>
+            </a:r>
+            <a:r>
+              <a:rPr lang="fr-FR" sz="1300" dirty="0"/>
+              <a:t>_</a:t>
+            </a:r>
+          </a:p>
+          <a:p>
+            <a:pPr algn="ctr"/>
+            <a:r>
+              <a:rPr lang="fr-FR" sz="1300" dirty="0" err="1"/>
+              <a:t>ClustersInvestigation_Stat</a:t>
+            </a:r>
+            <a:endParaRPr lang="fr-FR" sz="1300" dirty="0"/>
+          </a:p>
+        </p:txBody>
+      </p:sp>
+      <p:sp>
+        <p:nvSpPr>
+          <p:cNvPr id="37" name="ZoneTexte 36">
+            <a:extLst>
+              <a:ext uri="{FF2B5EF4-FFF2-40B4-BE49-F238E27FC236}">
+                <a16:creationId xmlns:a16="http://schemas.microsoft.com/office/drawing/2014/main" id="{A15DD0B3-C7CF-4978-BBAC-3586C0717E9F}"/>
+              </a:ext>
+            </a:extLst>
+          </p:cNvPr>
+          <p:cNvSpPr txBox="1"/>
+          <p:nvPr/>
+        </p:nvSpPr>
+        <p:spPr>
+          <a:xfrm>
+            <a:off x="1109717" y="8340281"/>
+            <a:ext cx="2039578" cy="492443"/>
+          </a:xfrm>
+          <a:prstGeom prst="rect">
+            <a:avLst/>
+          </a:prstGeom>
+          <a:solidFill>
+            <a:schemeClr val="accent5">
+              <a:lumMod val="20000"/>
+              <a:lumOff val="80000"/>
+            </a:schemeClr>
+          </a:solidFill>
+        </p:spPr>
+        <p:txBody>
+          <a:bodyPr wrap="square" rtlCol="0">
+            <a:spAutoFit/>
+          </a:bodyPr>
+          <a:lstStyle/>
+          <a:p>
+            <a:pPr algn="ctr"/>
+            <a:r>
+              <a:rPr lang="fr-FR" sz="1300" dirty="0" err="1"/>
+              <a:t>scATACseq_R_DWNS</a:t>
+            </a:r>
+            <a:r>
+              <a:rPr lang="fr-FR" sz="1300" dirty="0"/>
+              <a:t>_</a:t>
+            </a:r>
+          </a:p>
+          <a:p>
+            <a:pPr algn="ctr"/>
+            <a:r>
+              <a:rPr lang="fr-FR" sz="1300" dirty="0" err="1"/>
+              <a:t>ClustersInvestigation_DA</a:t>
+            </a:r>
+            <a:endParaRPr lang="fr-FR" sz="1300" dirty="0"/>
+          </a:p>
+        </p:txBody>
+      </p:sp>
+      <p:sp>
+        <p:nvSpPr>
+          <p:cNvPr id="38" name="ZoneTexte 37">
+            <a:extLst>
+              <a:ext uri="{FF2B5EF4-FFF2-40B4-BE49-F238E27FC236}">
+                <a16:creationId xmlns:a16="http://schemas.microsoft.com/office/drawing/2014/main" id="{2C7B2316-19B2-BFDC-C145-A1F865F2853E}"/>
+              </a:ext>
+            </a:extLst>
+          </p:cNvPr>
+          <p:cNvSpPr txBox="1"/>
+          <p:nvPr/>
+        </p:nvSpPr>
+        <p:spPr>
+          <a:xfrm>
+            <a:off x="408975" y="6440458"/>
+            <a:ext cx="2022746" cy="492443"/>
+          </a:xfrm>
+          <a:prstGeom prst="rect">
+            <a:avLst/>
+          </a:prstGeom>
+          <a:solidFill>
+            <a:schemeClr val="accent5">
+              <a:lumMod val="20000"/>
+              <a:lumOff val="80000"/>
+            </a:schemeClr>
+          </a:solidFill>
+        </p:spPr>
+        <p:txBody>
+          <a:bodyPr wrap="square" rtlCol="0">
+            <a:spAutoFit/>
+          </a:bodyPr>
+          <a:lstStyle/>
+          <a:p>
+            <a:pPr algn="ctr"/>
+            <a:r>
+              <a:rPr lang="fr-FR" sz="1300" dirty="0" err="1"/>
+              <a:t>scATACseq_R_DWNS</a:t>
+            </a:r>
+            <a:r>
+              <a:rPr lang="fr-FR" sz="1300" dirty="0"/>
+              <a:t>_</a:t>
+            </a:r>
+          </a:p>
+          <a:p>
+            <a:pPr algn="ctr"/>
+            <a:r>
+              <a:rPr lang="fr-FR" sz="1300" dirty="0" err="1"/>
+              <a:t>CompareConditions_DA</a:t>
+            </a:r>
+            <a:endParaRPr lang="fr-FR" sz="1300" dirty="0"/>
+          </a:p>
+        </p:txBody>
+      </p:sp>
+      <p:sp>
+        <p:nvSpPr>
+          <p:cNvPr id="41" name="ZoneTexte 40">
+            <a:extLst>
+              <a:ext uri="{FF2B5EF4-FFF2-40B4-BE49-F238E27FC236}">
+                <a16:creationId xmlns:a16="http://schemas.microsoft.com/office/drawing/2014/main" id="{253D20FC-8BEE-D6AD-877D-2E50D0C3350E}"/>
+              </a:ext>
+            </a:extLst>
+          </p:cNvPr>
+          <p:cNvSpPr txBox="1"/>
+          <p:nvPr/>
+        </p:nvSpPr>
+        <p:spPr>
+          <a:xfrm>
+            <a:off x="3528728" y="8420455"/>
+            <a:ext cx="2179413" cy="492443"/>
+          </a:xfrm>
+          <a:prstGeom prst="rect">
+            <a:avLst/>
+          </a:prstGeom>
+          <a:solidFill>
+            <a:schemeClr val="accent5">
+              <a:lumMod val="20000"/>
+              <a:lumOff val="80000"/>
+            </a:schemeClr>
+          </a:solidFill>
+        </p:spPr>
+        <p:txBody>
+          <a:bodyPr wrap="square" rtlCol="0">
+            <a:spAutoFit/>
+          </a:bodyPr>
+          <a:lstStyle/>
+          <a:p>
+            <a:pPr algn="ctr"/>
+            <a:r>
+              <a:rPr lang="fr-FR" sz="1300" dirty="0" err="1"/>
+              <a:t>scATACseq_R_DWNS</a:t>
+            </a:r>
+            <a:r>
+              <a:rPr lang="fr-FR" sz="1300" dirty="0"/>
+              <a:t>_</a:t>
+            </a:r>
+          </a:p>
+          <a:p>
+            <a:pPr algn="ctr"/>
+            <a:r>
+              <a:rPr lang="fr-FR" sz="1300" dirty="0" err="1"/>
+              <a:t>GeneActivity_GeneCoverage</a:t>
+            </a:r>
+            <a:endParaRPr lang="fr-FR" sz="1300" dirty="0"/>
+          </a:p>
+        </p:txBody>
+      </p:sp>
+      <p:cxnSp>
+        <p:nvCxnSpPr>
+          <p:cNvPr id="48" name="Connecteur droit avec flèche 47">
+            <a:extLst>
+              <a:ext uri="{FF2B5EF4-FFF2-40B4-BE49-F238E27FC236}">
+                <a16:creationId xmlns:a16="http://schemas.microsoft.com/office/drawing/2014/main" id="{5D8F689B-B2B4-C674-38BC-A3C28FD329D3}"/>
+              </a:ext>
+            </a:extLst>
+          </p:cNvPr>
+          <p:cNvCxnSpPr/>
+          <p:nvPr/>
+        </p:nvCxnSpPr>
+        <p:spPr>
+          <a:xfrm flipH="1" flipV="1">
+            <a:off x="1244108" y="7048500"/>
+            <a:ext cx="546592" cy="1224103"/>
+          </a:xfrm>
+          <a:prstGeom prst="straightConnector1">
+            <a:avLst/>
+          </a:prstGeom>
+          <a:ln w="3175">
+            <a:solidFill>
+              <a:schemeClr val="tx1"/>
+            </a:solidFill>
+            <a:prstDash val="lgDashDotDot"/>
+            <a:tailEnd type="triangle"/>
+          </a:ln>
+        </p:spPr>
+        <p:style>
+          <a:lnRef idx="1">
+            <a:schemeClr val="accent1"/>
+          </a:lnRef>
+          <a:fillRef idx="0">
+            <a:schemeClr val="accent1"/>
+          </a:fillRef>
+          <a:effectRef idx="0">
+            <a:schemeClr val="accent1"/>
+          </a:effectRef>
+          <a:fontRef idx="minor">
+            <a:schemeClr val="tx1"/>
+          </a:fontRef>
+        </p:style>
+      </p:cxnSp>
+    </p:spTree>
+    <p:extLst>
+      <p:ext uri="{BB962C8B-B14F-4D97-AF65-F5344CB8AC3E}">
+        <p14:creationId xmlns:p14="http://schemas.microsoft.com/office/powerpoint/2010/main" val="2971349836"/>
+      </p:ext>
+    </p:extLst>
+  </p:cSld>
+  <p:clrMapOvr>
+    <a:masterClrMapping/>
+  </p:clrMapOvr>
+</p:sld>
+</file>
+
+<file path=ppt/slides/slide3.xml><?xml version="1.0" encoding="utf-8"?>
+<p:sld xmlns:a="http://schemas.openxmlformats.org/drawingml/2006/main" xmlns:r="http://schemas.openxmlformats.org/officeDocument/2006/relationships" xmlns:p="http://schemas.openxmlformats.org/presentationml/2006/main">
+  <p:cSld>
+    <p:spTree>
+      <p:nvGrpSpPr>
+        <p:cNvPr id="1" name=""/>
+        <p:cNvGrpSpPr/>
+        <p:nvPr/>
+      </p:nvGrpSpPr>
+      <p:grpSpPr>
+        <a:xfrm>
+          <a:off x="0" y="0"/>
+          <a:ext cx="0" cy="0"/>
+          <a:chOff x="0" y="0"/>
+          <a:chExt cx="0" cy="0"/>
+        </a:xfrm>
+      </p:grpSpPr>
+      <p:sp>
+        <p:nvSpPr>
+          <p:cNvPr id="27" name="Rectangle 26">
+            <a:extLst>
+              <a:ext uri="{FF2B5EF4-FFF2-40B4-BE49-F238E27FC236}">
+                <a16:creationId xmlns:a16="http://schemas.microsoft.com/office/drawing/2014/main" id="{624041F1-AF8C-0737-E242-F2CAE9DB8EA1}"/>
+              </a:ext>
+            </a:extLst>
+          </p:cNvPr>
+          <p:cNvSpPr/>
+          <p:nvPr/>
+        </p:nvSpPr>
+        <p:spPr>
+          <a:xfrm>
+            <a:off x="334006" y="2390244"/>
+            <a:ext cx="6373506" cy="2562756"/>
+          </a:xfrm>
+          <a:prstGeom prst="rect">
+            <a:avLst/>
+          </a:prstGeom>
+          <a:solidFill>
+            <a:srgbClr val="F7F7F7"/>
+          </a:solidFill>
+          <a:ln>
+            <a:solidFill>
+              <a:schemeClr val="bg1">
+                <a:lumMod val="75000"/>
+              </a:schemeClr>
+            </a:solidFill>
+          </a:ln>
+        </p:spPr>
+        <p:style>
+          <a:lnRef idx="2">
+            <a:schemeClr val="accent1">
+              <a:shade val="50000"/>
+            </a:schemeClr>
+          </a:lnRef>
+          <a:fillRef idx="1">
+            <a:schemeClr val="accent1"/>
+          </a:fillRef>
+          <a:effectRef idx="0">
+            <a:schemeClr val="accent1"/>
+          </a:effectRef>
+          <a:fontRef idx="minor">
+            <a:schemeClr val="lt1"/>
+          </a:fontRef>
+        </p:style>
+        <p:txBody>
+          <a:bodyPr rtlCol="0" anchor="ctr"/>
+          <a:lstStyle/>
+          <a:p>
+            <a:pPr algn="ctr"/>
+            <a:endParaRPr lang="fr-FR"/>
+          </a:p>
+        </p:txBody>
+      </p:sp>
+      <p:sp>
+        <p:nvSpPr>
+          <p:cNvPr id="12" name="Rectangle 11">
+            <a:extLst>
+              <a:ext uri="{FF2B5EF4-FFF2-40B4-BE49-F238E27FC236}">
+                <a16:creationId xmlns:a16="http://schemas.microsoft.com/office/drawing/2014/main" id="{546374D4-535C-6913-48BE-FEB00EC1EEEC}"/>
+              </a:ext>
+            </a:extLst>
+          </p:cNvPr>
+          <p:cNvSpPr/>
+          <p:nvPr/>
+        </p:nvSpPr>
+        <p:spPr>
+          <a:xfrm>
+            <a:off x="341975" y="1073276"/>
+            <a:ext cx="6373506" cy="1224103"/>
+          </a:xfrm>
+          <a:prstGeom prst="rect">
+            <a:avLst/>
+          </a:prstGeom>
+          <a:solidFill>
+            <a:srgbClr val="F7F7F7"/>
+          </a:solidFill>
+          <a:ln>
+            <a:solidFill>
+              <a:schemeClr val="bg1">
+                <a:lumMod val="75000"/>
+              </a:schemeClr>
+            </a:solidFill>
+          </a:ln>
+        </p:spPr>
+        <p:style>
+          <a:lnRef idx="2">
+            <a:schemeClr val="accent1">
+              <a:shade val="50000"/>
+            </a:schemeClr>
+          </a:lnRef>
+          <a:fillRef idx="1">
+            <a:schemeClr val="accent1"/>
+          </a:fillRef>
+          <a:effectRef idx="0">
+            <a:schemeClr val="accent1"/>
+          </a:effectRef>
+          <a:fontRef idx="minor">
+            <a:schemeClr val="lt1"/>
+          </a:fontRef>
+        </p:style>
+        <p:txBody>
+          <a:bodyPr rtlCol="0" anchor="ctr"/>
+          <a:lstStyle/>
+          <a:p>
+            <a:pPr algn="ctr"/>
+            <a:endParaRPr lang="fr-FR"/>
+          </a:p>
+        </p:txBody>
+      </p:sp>
+      <p:sp>
+        <p:nvSpPr>
+          <p:cNvPr id="21" name="ZoneTexte 20">
+            <a:extLst>
+              <a:ext uri="{FF2B5EF4-FFF2-40B4-BE49-F238E27FC236}">
+                <a16:creationId xmlns:a16="http://schemas.microsoft.com/office/drawing/2014/main" id="{40CE1592-F872-04E1-4AB1-C411BF296373}"/>
+              </a:ext>
+            </a:extLst>
+          </p:cNvPr>
+          <p:cNvSpPr txBox="1"/>
+          <p:nvPr/>
+        </p:nvSpPr>
+        <p:spPr>
+          <a:xfrm>
+            <a:off x="1987752" y="510695"/>
+            <a:ext cx="3270963" cy="523220"/>
+          </a:xfrm>
+          <a:prstGeom prst="rect">
+            <a:avLst/>
+          </a:prstGeom>
+          <a:noFill/>
+        </p:spPr>
+        <p:txBody>
+          <a:bodyPr wrap="square" rtlCol="0">
+            <a:spAutoFit/>
+          </a:bodyPr>
+          <a:lstStyle/>
+          <a:p>
+            <a:r>
+              <a:rPr lang="fr-FR" sz="1400" b="1" dirty="0">
+                <a:solidFill>
+                  <a:srgbClr val="7030A0"/>
+                </a:solidFill>
+              </a:rPr>
+              <a:t>Grange </a:t>
+            </a:r>
+            <a:r>
+              <a:rPr lang="fr-FR" sz="1400" b="1" dirty="0" err="1">
+                <a:solidFill>
+                  <a:srgbClr val="7030A0"/>
+                </a:solidFill>
+              </a:rPr>
+              <a:t>annotated</a:t>
+            </a:r>
+            <a:r>
+              <a:rPr lang="fr-FR" sz="1400" b="1" dirty="0">
+                <a:solidFill>
+                  <a:srgbClr val="7030A0"/>
+                </a:solidFill>
+              </a:rPr>
+              <a:t> hg19 </a:t>
+            </a:r>
+            <a:r>
+              <a:rPr lang="fr-FR" sz="1400" b="1" dirty="0" err="1">
+                <a:solidFill>
+                  <a:srgbClr val="7030A0"/>
+                </a:solidFill>
+              </a:rPr>
+              <a:t>with</a:t>
+            </a:r>
+            <a:r>
+              <a:rPr lang="fr-FR" sz="1400" b="1" dirty="0">
+                <a:solidFill>
+                  <a:srgbClr val="7030A0"/>
+                </a:solidFill>
+              </a:rPr>
+              <a:t> threshold10 </a:t>
+            </a:r>
+            <a:r>
+              <a:rPr lang="fr-FR" sz="1400" b="1" dirty="0" err="1">
+                <a:solidFill>
+                  <a:srgbClr val="7030A0"/>
+                </a:solidFill>
+              </a:rPr>
+              <a:t>from</a:t>
+            </a:r>
+            <a:r>
+              <a:rPr lang="fr-FR" sz="1400" b="1" dirty="0">
+                <a:solidFill>
+                  <a:srgbClr val="7030A0"/>
+                </a:solidFill>
+              </a:rPr>
+              <a:t> bloc2 (</a:t>
+            </a:r>
+            <a:r>
+              <a:rPr lang="fr-FR" sz="1400" b="1" dirty="0" err="1">
+                <a:solidFill>
+                  <a:srgbClr val="7030A0"/>
+                </a:solidFill>
+              </a:rPr>
+              <a:t>preprocessing</a:t>
+            </a:r>
+            <a:r>
+              <a:rPr lang="fr-FR" sz="1400" b="1" dirty="0">
+                <a:solidFill>
+                  <a:srgbClr val="7030A0"/>
+                </a:solidFill>
+              </a:rPr>
+              <a:t> </a:t>
+            </a:r>
+            <a:r>
+              <a:rPr lang="fr-FR" sz="1400" b="1" dirty="0" err="1">
+                <a:solidFill>
+                  <a:srgbClr val="7030A0"/>
+                </a:solidFill>
+              </a:rPr>
+              <a:t>steps</a:t>
+            </a:r>
+            <a:r>
+              <a:rPr lang="fr-FR" sz="1400" b="1" dirty="0">
+                <a:solidFill>
+                  <a:srgbClr val="7030A0"/>
+                </a:solidFill>
+              </a:rPr>
+              <a:t>)</a:t>
+            </a:r>
+          </a:p>
+        </p:txBody>
+      </p:sp>
+      <p:sp>
+        <p:nvSpPr>
+          <p:cNvPr id="26" name="ZoneTexte 25">
+            <a:extLst>
+              <a:ext uri="{FF2B5EF4-FFF2-40B4-BE49-F238E27FC236}">
+                <a16:creationId xmlns:a16="http://schemas.microsoft.com/office/drawing/2014/main" id="{65B612E5-1CFD-9CCF-7EA0-1F78D922BAFE}"/>
+              </a:ext>
+            </a:extLst>
+          </p:cNvPr>
+          <p:cNvSpPr txBox="1"/>
+          <p:nvPr/>
+        </p:nvSpPr>
+        <p:spPr>
+          <a:xfrm>
+            <a:off x="4711700" y="177775"/>
+            <a:ext cx="2026084" cy="307777"/>
+          </a:xfrm>
+          <a:prstGeom prst="rect">
+            <a:avLst/>
+          </a:prstGeom>
+          <a:noFill/>
+        </p:spPr>
+        <p:txBody>
+          <a:bodyPr wrap="square" rtlCol="0">
+            <a:spAutoFit/>
+          </a:bodyPr>
+          <a:lstStyle/>
+          <a:p>
+            <a:r>
+              <a:rPr lang="fr-FR" sz="1400" b="1" dirty="0">
+                <a:effectLst>
+                  <a:outerShdw blurRad="38100" dist="38100" dir="2700000" algn="tl">
+                    <a:srgbClr val="000000">
+                      <a:alpha val="43137"/>
+                    </a:srgbClr>
+                  </a:outerShdw>
+                </a:effectLst>
+              </a:rPr>
+              <a:t>Workflow </a:t>
+            </a:r>
+            <a:r>
+              <a:rPr lang="fr-FR" sz="1400" b="1" dirty="0" err="1">
+                <a:effectLst>
+                  <a:outerShdw blurRad="38100" dist="38100" dir="2700000" algn="tl">
+                    <a:srgbClr val="000000">
+                      <a:alpha val="43137"/>
+                    </a:srgbClr>
+                  </a:outerShdw>
+                </a:effectLst>
+              </a:rPr>
+              <a:t>bulkATACseq</a:t>
+            </a:r>
+            <a:endParaRPr lang="fr-FR" sz="1400" b="1" dirty="0">
+              <a:effectLst>
+                <a:outerShdw blurRad="38100" dist="38100" dir="2700000" algn="tl">
+                  <a:srgbClr val="000000">
+                    <a:alpha val="43137"/>
+                  </a:srgbClr>
+                </a:outerShdw>
+              </a:effectLst>
+            </a:endParaRPr>
+          </a:p>
+        </p:txBody>
+      </p:sp>
+      <p:cxnSp>
+        <p:nvCxnSpPr>
+          <p:cNvPr id="29" name="Connecteur droit avec flèche 28">
+            <a:extLst>
+              <a:ext uri="{FF2B5EF4-FFF2-40B4-BE49-F238E27FC236}">
+                <a16:creationId xmlns:a16="http://schemas.microsoft.com/office/drawing/2014/main" id="{BC0F1E8E-20C5-B3D6-8DBB-244479CCED98}"/>
+              </a:ext>
+            </a:extLst>
+          </p:cNvPr>
+          <p:cNvCxnSpPr>
+            <a:cxnSpLocks/>
+          </p:cNvCxnSpPr>
+          <p:nvPr/>
+        </p:nvCxnSpPr>
+        <p:spPr>
+          <a:xfrm>
+            <a:off x="3623233" y="3909382"/>
+            <a:ext cx="145293" cy="340032"/>
+          </a:xfrm>
+          <a:prstGeom prst="straightConnector1">
+            <a:avLst/>
+          </a:prstGeom>
+          <a:ln>
+            <a:tailEnd type="triangle"/>
+          </a:ln>
+        </p:spPr>
+        <p:style>
+          <a:lnRef idx="1">
+            <a:schemeClr val="dk1"/>
+          </a:lnRef>
+          <a:fillRef idx="0">
+            <a:schemeClr val="dk1"/>
+          </a:fillRef>
+          <a:effectRef idx="0">
+            <a:schemeClr val="dk1"/>
+          </a:effectRef>
+          <a:fontRef idx="minor">
+            <a:schemeClr val="tx1"/>
+          </a:fontRef>
+        </p:style>
+      </p:cxnSp>
+      <p:cxnSp>
+        <p:nvCxnSpPr>
+          <p:cNvPr id="32" name="Connecteur droit avec flèche 31">
+            <a:extLst>
+              <a:ext uri="{FF2B5EF4-FFF2-40B4-BE49-F238E27FC236}">
+                <a16:creationId xmlns:a16="http://schemas.microsoft.com/office/drawing/2014/main" id="{E1153E48-3A12-8F19-E3F3-F9336BE496A8}"/>
+              </a:ext>
+            </a:extLst>
+          </p:cNvPr>
+          <p:cNvCxnSpPr>
+            <a:cxnSpLocks/>
+          </p:cNvCxnSpPr>
+          <p:nvPr/>
+        </p:nvCxnSpPr>
+        <p:spPr>
+          <a:xfrm flipH="1">
+            <a:off x="2026783" y="1998270"/>
+            <a:ext cx="1295513" cy="876979"/>
+          </a:xfrm>
+          <a:prstGeom prst="straightConnector1">
+            <a:avLst/>
+          </a:prstGeom>
+          <a:ln>
+            <a:tailEnd type="triangle"/>
+          </a:ln>
+        </p:spPr>
+        <p:style>
+          <a:lnRef idx="1">
+            <a:schemeClr val="dk1"/>
+          </a:lnRef>
+          <a:fillRef idx="0">
+            <a:schemeClr val="dk1"/>
+          </a:fillRef>
+          <a:effectRef idx="0">
+            <a:schemeClr val="dk1"/>
+          </a:effectRef>
+          <a:fontRef idx="minor">
+            <a:schemeClr val="tx1"/>
+          </a:fontRef>
+        </p:style>
+      </p:cxnSp>
+      <p:cxnSp>
+        <p:nvCxnSpPr>
+          <p:cNvPr id="34" name="Connecteur droit avec flèche 33">
+            <a:extLst>
+              <a:ext uri="{FF2B5EF4-FFF2-40B4-BE49-F238E27FC236}">
+                <a16:creationId xmlns:a16="http://schemas.microsoft.com/office/drawing/2014/main" id="{B6F50F6C-D5DA-D995-98C1-BF8F1B0B6005}"/>
+              </a:ext>
+            </a:extLst>
+          </p:cNvPr>
+          <p:cNvCxnSpPr>
+            <a:cxnSpLocks/>
+          </p:cNvCxnSpPr>
+          <p:nvPr/>
+        </p:nvCxnSpPr>
+        <p:spPr>
+          <a:xfrm>
+            <a:off x="3317192" y="1973946"/>
+            <a:ext cx="203567" cy="1382220"/>
+          </a:xfrm>
+          <a:prstGeom prst="straightConnector1">
+            <a:avLst/>
+          </a:prstGeom>
+          <a:ln>
+            <a:tailEnd type="triangle"/>
+          </a:ln>
+        </p:spPr>
+        <p:style>
+          <a:lnRef idx="1">
+            <a:schemeClr val="dk1"/>
+          </a:lnRef>
+          <a:fillRef idx="0">
+            <a:schemeClr val="dk1"/>
+          </a:fillRef>
+          <a:effectRef idx="0">
+            <a:schemeClr val="dk1"/>
+          </a:effectRef>
+          <a:fontRef idx="minor">
+            <a:schemeClr val="tx1"/>
+          </a:fontRef>
+        </p:style>
+      </p:cxnSp>
+      <p:cxnSp>
+        <p:nvCxnSpPr>
+          <p:cNvPr id="42" name="Connecteur droit avec flèche 41">
+            <a:extLst>
+              <a:ext uri="{FF2B5EF4-FFF2-40B4-BE49-F238E27FC236}">
+                <a16:creationId xmlns:a16="http://schemas.microsoft.com/office/drawing/2014/main" id="{C6DF2B37-79F5-52B9-20AD-7F4F8DCD20ED}"/>
+              </a:ext>
+            </a:extLst>
+          </p:cNvPr>
+          <p:cNvCxnSpPr>
+            <a:cxnSpLocks/>
+          </p:cNvCxnSpPr>
+          <p:nvPr/>
+        </p:nvCxnSpPr>
+        <p:spPr>
+          <a:xfrm>
+            <a:off x="3329892" y="1982122"/>
+            <a:ext cx="1661199" cy="672701"/>
+          </a:xfrm>
+          <a:prstGeom prst="straightConnector1">
+            <a:avLst/>
+          </a:prstGeom>
+          <a:ln>
+            <a:tailEnd type="triangle"/>
+          </a:ln>
+        </p:spPr>
+        <p:style>
+          <a:lnRef idx="1">
+            <a:schemeClr val="dk1"/>
+          </a:lnRef>
+          <a:fillRef idx="0">
+            <a:schemeClr val="dk1"/>
+          </a:fillRef>
+          <a:effectRef idx="0">
+            <a:schemeClr val="dk1"/>
+          </a:effectRef>
+          <a:fontRef idx="minor">
+            <a:schemeClr val="tx1"/>
+          </a:fontRef>
+        </p:style>
+      </p:cxnSp>
+      <p:sp>
+        <p:nvSpPr>
+          <p:cNvPr id="35" name="ZoneTexte 34">
+            <a:extLst>
+              <a:ext uri="{FF2B5EF4-FFF2-40B4-BE49-F238E27FC236}">
+                <a16:creationId xmlns:a16="http://schemas.microsoft.com/office/drawing/2014/main" id="{7FF0A812-D534-8F95-196E-79A8C17A3A00}"/>
+              </a:ext>
+            </a:extLst>
+          </p:cNvPr>
+          <p:cNvSpPr txBox="1"/>
+          <p:nvPr/>
+        </p:nvSpPr>
+        <p:spPr>
+          <a:xfrm>
+            <a:off x="4351999" y="2701211"/>
+            <a:ext cx="2143977" cy="492443"/>
+          </a:xfrm>
+          <a:prstGeom prst="rect">
+            <a:avLst/>
+          </a:prstGeom>
+          <a:solidFill>
+            <a:schemeClr val="accent5">
+              <a:lumMod val="20000"/>
+              <a:lumOff val="80000"/>
+            </a:schemeClr>
+          </a:solidFill>
+        </p:spPr>
+        <p:txBody>
+          <a:bodyPr wrap="square" rtlCol="0">
+            <a:spAutoFit/>
+          </a:bodyPr>
+          <a:lstStyle/>
+          <a:p>
+            <a:pPr algn="ctr"/>
+            <a:r>
+              <a:rPr lang="fr-FR" sz="1300" dirty="0" err="1"/>
+              <a:t>bulkATACseq_R_Genome</a:t>
+            </a:r>
+            <a:endParaRPr lang="fr-FR" sz="1300" dirty="0"/>
+          </a:p>
+          <a:p>
+            <a:pPr algn="ctr"/>
+            <a:r>
+              <a:rPr lang="fr-FR" sz="1300" dirty="0" err="1"/>
+              <a:t>Distribution_GeneCoverage</a:t>
+            </a:r>
+            <a:endParaRPr lang="fr-FR" sz="1300" dirty="0"/>
+          </a:p>
+        </p:txBody>
+      </p:sp>
+      <p:sp>
+        <p:nvSpPr>
+          <p:cNvPr id="36" name="ZoneTexte 35">
+            <a:extLst>
+              <a:ext uri="{FF2B5EF4-FFF2-40B4-BE49-F238E27FC236}">
+                <a16:creationId xmlns:a16="http://schemas.microsoft.com/office/drawing/2014/main" id="{58B5D9A4-6373-1F7B-4EFE-D349D81967DF}"/>
+              </a:ext>
+            </a:extLst>
+          </p:cNvPr>
+          <p:cNvSpPr txBox="1"/>
+          <p:nvPr/>
+        </p:nvSpPr>
+        <p:spPr>
+          <a:xfrm>
+            <a:off x="2808890" y="3371879"/>
+            <a:ext cx="2435253" cy="492443"/>
+          </a:xfrm>
+          <a:prstGeom prst="rect">
+            <a:avLst/>
+          </a:prstGeom>
+          <a:solidFill>
+            <a:schemeClr val="accent5">
+              <a:lumMod val="20000"/>
+              <a:lumOff val="80000"/>
+            </a:schemeClr>
+          </a:solidFill>
+        </p:spPr>
+        <p:txBody>
+          <a:bodyPr wrap="square" rtlCol="0">
+            <a:spAutoFit/>
+          </a:bodyPr>
+          <a:lstStyle/>
+          <a:p>
+            <a:pPr algn="ctr"/>
+            <a:r>
+              <a:rPr lang="fr-FR" sz="1300" dirty="0" err="1"/>
+              <a:t>bulkATACseq_R_Multiparametric_DifferentialAccessibility</a:t>
+            </a:r>
+            <a:endParaRPr lang="fr-FR" sz="1300" dirty="0"/>
+          </a:p>
+        </p:txBody>
+      </p:sp>
+      <p:sp>
+        <p:nvSpPr>
+          <p:cNvPr id="37" name="ZoneTexte 36">
+            <a:extLst>
+              <a:ext uri="{FF2B5EF4-FFF2-40B4-BE49-F238E27FC236}">
+                <a16:creationId xmlns:a16="http://schemas.microsoft.com/office/drawing/2014/main" id="{A15DD0B3-C7CF-4978-BBAC-3586C0717E9F}"/>
+              </a:ext>
+            </a:extLst>
+          </p:cNvPr>
+          <p:cNvSpPr txBox="1"/>
+          <p:nvPr/>
+        </p:nvSpPr>
+        <p:spPr>
+          <a:xfrm>
+            <a:off x="830729" y="2977983"/>
+            <a:ext cx="1624491" cy="492443"/>
+          </a:xfrm>
+          <a:prstGeom prst="rect">
+            <a:avLst/>
+          </a:prstGeom>
+          <a:solidFill>
+            <a:schemeClr val="accent5">
+              <a:lumMod val="20000"/>
+              <a:lumOff val="80000"/>
+            </a:schemeClr>
+          </a:solidFill>
+        </p:spPr>
+        <p:txBody>
+          <a:bodyPr wrap="square" rtlCol="0">
+            <a:spAutoFit/>
+          </a:bodyPr>
+          <a:lstStyle/>
+          <a:p>
+            <a:pPr algn="ctr"/>
+            <a:r>
+              <a:rPr lang="fr-FR" sz="1300" dirty="0" err="1"/>
+              <a:t>bulkATACseq_R</a:t>
+            </a:r>
+            <a:r>
+              <a:rPr lang="fr-FR" sz="1300" dirty="0"/>
+              <a:t>_</a:t>
+            </a:r>
+          </a:p>
+          <a:p>
+            <a:pPr algn="ctr"/>
+            <a:r>
+              <a:rPr lang="fr-FR" sz="1300" dirty="0" err="1"/>
+              <a:t>NumberPeaksReport</a:t>
+            </a:r>
+            <a:endParaRPr lang="fr-FR" sz="1300" dirty="0"/>
+          </a:p>
+        </p:txBody>
+      </p:sp>
+      <p:sp>
+        <p:nvSpPr>
+          <p:cNvPr id="38" name="ZoneTexte 37">
+            <a:extLst>
+              <a:ext uri="{FF2B5EF4-FFF2-40B4-BE49-F238E27FC236}">
+                <a16:creationId xmlns:a16="http://schemas.microsoft.com/office/drawing/2014/main" id="{2C7B2316-19B2-BFDC-C145-A1F865F2853E}"/>
+              </a:ext>
+            </a:extLst>
+          </p:cNvPr>
+          <p:cNvSpPr txBox="1"/>
+          <p:nvPr/>
+        </p:nvSpPr>
+        <p:spPr>
+          <a:xfrm>
+            <a:off x="2395402" y="1633397"/>
+            <a:ext cx="2595689" cy="292388"/>
+          </a:xfrm>
+          <a:prstGeom prst="rect">
+            <a:avLst/>
+          </a:prstGeom>
+          <a:solidFill>
+            <a:schemeClr val="accent5">
+              <a:lumMod val="20000"/>
+              <a:lumOff val="80000"/>
+            </a:schemeClr>
+          </a:solidFill>
+        </p:spPr>
+        <p:txBody>
+          <a:bodyPr wrap="square" rtlCol="0">
+            <a:spAutoFit/>
+          </a:bodyPr>
+          <a:lstStyle/>
+          <a:p>
+            <a:pPr algn="ctr"/>
+            <a:r>
+              <a:rPr lang="fr-FR" sz="1300" dirty="0" err="1"/>
+              <a:t>bulkATACseq_R_ChangeAnnotation</a:t>
+            </a:r>
+            <a:endParaRPr lang="fr-FR" sz="1300" dirty="0"/>
+          </a:p>
+        </p:txBody>
+      </p:sp>
+      <p:sp>
+        <p:nvSpPr>
+          <p:cNvPr id="10" name="ZoneTexte 9">
+            <a:extLst>
+              <a:ext uri="{FF2B5EF4-FFF2-40B4-BE49-F238E27FC236}">
+                <a16:creationId xmlns:a16="http://schemas.microsoft.com/office/drawing/2014/main" id="{17DAB3C2-482E-71AB-313B-813A8D7256F6}"/>
+              </a:ext>
+            </a:extLst>
+          </p:cNvPr>
+          <p:cNvSpPr txBox="1"/>
+          <p:nvPr/>
+        </p:nvSpPr>
+        <p:spPr>
+          <a:xfrm rot="20616044">
+            <a:off x="391475" y="704911"/>
+            <a:ext cx="1197591" cy="523220"/>
+          </a:xfrm>
+          <a:prstGeom prst="rect">
+            <a:avLst/>
+          </a:prstGeom>
+          <a:noFill/>
+        </p:spPr>
+        <p:txBody>
+          <a:bodyPr wrap="square" rtlCol="0">
+            <a:spAutoFit/>
+          </a:bodyPr>
+          <a:lstStyle/>
+          <a:p>
+            <a:r>
+              <a:rPr lang="fr-FR" sz="1400" b="1" dirty="0">
+                <a:solidFill>
+                  <a:srgbClr val="7030A0"/>
+                </a:solidFill>
+              </a:rPr>
+              <a:t>hg19_annotations_gr.rds</a:t>
+            </a:r>
+          </a:p>
+        </p:txBody>
+      </p:sp>
+      <p:cxnSp>
+        <p:nvCxnSpPr>
+          <p:cNvPr id="11" name="Connecteur : en arc 10">
+            <a:extLst>
+              <a:ext uri="{FF2B5EF4-FFF2-40B4-BE49-F238E27FC236}">
+                <a16:creationId xmlns:a16="http://schemas.microsoft.com/office/drawing/2014/main" id="{8E3A2121-D4DB-15D3-CD59-A16AE5221903}"/>
+              </a:ext>
+            </a:extLst>
+          </p:cNvPr>
+          <p:cNvCxnSpPr>
+            <a:cxnSpLocks/>
+          </p:cNvCxnSpPr>
+          <p:nvPr/>
+        </p:nvCxnSpPr>
+        <p:spPr>
+          <a:xfrm>
+            <a:off x="1188812" y="1132287"/>
+            <a:ext cx="1128072" cy="717260"/>
+          </a:xfrm>
+          <a:prstGeom prst="curvedConnector3">
+            <a:avLst>
+              <a:gd name="adj1" fmla="val 50000"/>
+            </a:avLst>
+          </a:prstGeom>
+          <a:ln>
+            <a:tailEnd type="triangle"/>
+          </a:ln>
+        </p:spPr>
+        <p:style>
+          <a:lnRef idx="1">
+            <a:schemeClr val="dk1"/>
+          </a:lnRef>
+          <a:fillRef idx="0">
+            <a:schemeClr val="dk1"/>
+          </a:fillRef>
+          <a:effectRef idx="0">
+            <a:schemeClr val="dk1"/>
+          </a:effectRef>
+          <a:fontRef idx="minor">
+            <a:schemeClr val="tx1"/>
+          </a:fontRef>
+        </p:style>
+      </p:cxnSp>
+      <p:cxnSp>
+        <p:nvCxnSpPr>
+          <p:cNvPr id="25" name="Connecteur droit avec flèche 24">
+            <a:extLst>
+              <a:ext uri="{FF2B5EF4-FFF2-40B4-BE49-F238E27FC236}">
+                <a16:creationId xmlns:a16="http://schemas.microsoft.com/office/drawing/2014/main" id="{7CD3C7A1-8065-CD3E-C4AB-A49C13E94DC8}"/>
+              </a:ext>
+            </a:extLst>
+          </p:cNvPr>
+          <p:cNvCxnSpPr/>
+          <p:nvPr/>
+        </p:nvCxnSpPr>
+        <p:spPr>
+          <a:xfrm>
+            <a:off x="3322296" y="1022121"/>
+            <a:ext cx="0" cy="514579"/>
+          </a:xfrm>
+          <a:prstGeom prst="straightConnector1">
+            <a:avLst/>
+          </a:prstGeom>
+          <a:ln>
+            <a:tailEnd type="triangle"/>
+          </a:ln>
+        </p:spPr>
+        <p:style>
+          <a:lnRef idx="1">
+            <a:schemeClr val="dk1"/>
+          </a:lnRef>
+          <a:fillRef idx="0">
+            <a:schemeClr val="dk1"/>
+          </a:fillRef>
+          <a:effectRef idx="0">
+            <a:schemeClr val="dk1"/>
+          </a:effectRef>
+          <a:fontRef idx="minor">
+            <a:schemeClr val="tx1"/>
+          </a:fontRef>
+        </p:style>
+      </p:cxnSp>
+      <p:sp>
+        <p:nvSpPr>
+          <p:cNvPr id="33" name="ZoneTexte 32">
+            <a:extLst>
+              <a:ext uri="{FF2B5EF4-FFF2-40B4-BE49-F238E27FC236}">
+                <a16:creationId xmlns:a16="http://schemas.microsoft.com/office/drawing/2014/main" id="{98DE0D22-CB57-F1C4-B8FE-28732CF3188C}"/>
+              </a:ext>
+            </a:extLst>
+          </p:cNvPr>
+          <p:cNvSpPr txBox="1"/>
+          <p:nvPr/>
+        </p:nvSpPr>
+        <p:spPr>
+          <a:xfrm>
+            <a:off x="3693246" y="4294474"/>
+            <a:ext cx="2525183" cy="492443"/>
+          </a:xfrm>
+          <a:prstGeom prst="rect">
+            <a:avLst/>
+          </a:prstGeom>
+          <a:solidFill>
+            <a:schemeClr val="accent5">
+              <a:lumMod val="20000"/>
+              <a:lumOff val="80000"/>
+            </a:schemeClr>
+          </a:solidFill>
+        </p:spPr>
+        <p:txBody>
+          <a:bodyPr wrap="square" rtlCol="0">
+            <a:spAutoFit/>
+          </a:bodyPr>
+          <a:lstStyle/>
+          <a:p>
+            <a:pPr algn="ctr"/>
+            <a:r>
+              <a:rPr lang="fr-FR" sz="1300" dirty="0" err="1"/>
+              <a:t>bulkATACseq_R_Multiparametric_wotVPA</a:t>
+            </a:r>
+            <a:endParaRPr lang="fr-FR" sz="1300" dirty="0"/>
+          </a:p>
+        </p:txBody>
+      </p:sp>
+    </p:spTree>
+    <p:extLst>
+      <p:ext uri="{BB962C8B-B14F-4D97-AF65-F5344CB8AC3E}">
+        <p14:creationId xmlns:p14="http://schemas.microsoft.com/office/powerpoint/2010/main" val="1456294187"/>
+      </p:ext>
+    </p:extLst>
+  </p:cSld>
+  <p:clrMapOvr>
+    <a:masterClrMapping/>
+  </p:clrMapOvr>
+</p:sld>
+</file>
+
+<file path=ppt/slides/slide4.xml><?xml version="1.0" encoding="utf-8"?>
+<p:sld xmlns:a="http://schemas.openxmlformats.org/drawingml/2006/main" xmlns:r="http://schemas.openxmlformats.org/officeDocument/2006/relationships" xmlns:p="http://schemas.openxmlformats.org/presentationml/2006/main">
+  <p:cSld>
+    <p:spTree>
+      <p:nvGrpSpPr>
+        <p:cNvPr id="1" name=""/>
+        <p:cNvGrpSpPr/>
+        <p:nvPr/>
+      </p:nvGrpSpPr>
+      <p:grpSpPr>
+        <a:xfrm>
+          <a:off x="0" y="0"/>
+          <a:ext cx="0" cy="0"/>
+          <a:chOff x="0" y="0"/>
+          <a:chExt cx="0" cy="0"/>
+        </a:xfrm>
+      </p:grpSpPr>
+      <p:sp>
+        <p:nvSpPr>
+          <p:cNvPr id="5" name="Rectangle 4">
+            <a:extLst>
+              <a:ext uri="{FF2B5EF4-FFF2-40B4-BE49-F238E27FC236}">
+                <a16:creationId xmlns:a16="http://schemas.microsoft.com/office/drawing/2014/main" id="{308BDC9B-CDF1-046C-7D5C-BD857CE90BA2}"/>
+              </a:ext>
+            </a:extLst>
+          </p:cNvPr>
+          <p:cNvSpPr/>
+          <p:nvPr/>
+        </p:nvSpPr>
+        <p:spPr>
+          <a:xfrm>
+            <a:off x="333310" y="1595555"/>
+            <a:ext cx="6271139" cy="3192346"/>
+          </a:xfrm>
+          <a:prstGeom prst="rect">
+            <a:avLst/>
+          </a:prstGeom>
+          <a:solidFill>
+            <a:srgbClr val="F7F7F7"/>
+          </a:solidFill>
+          <a:ln>
+            <a:solidFill>
+              <a:schemeClr val="bg1">
+                <a:lumMod val="75000"/>
+              </a:schemeClr>
+            </a:solidFill>
+          </a:ln>
+        </p:spPr>
+        <p:style>
+          <a:lnRef idx="2">
+            <a:schemeClr val="accent1">
+              <a:shade val="50000"/>
+            </a:schemeClr>
+          </a:lnRef>
+          <a:fillRef idx="1">
+            <a:schemeClr val="accent1"/>
+          </a:fillRef>
+          <a:effectRef idx="0">
+            <a:schemeClr val="accent1"/>
+          </a:effectRef>
+          <a:fontRef idx="minor">
+            <a:schemeClr val="lt1"/>
+          </a:fontRef>
+        </p:style>
+        <p:txBody>
+          <a:bodyPr rtlCol="0" anchor="ctr"/>
+          <a:lstStyle/>
+          <a:p>
+            <a:pPr algn="ctr"/>
+            <a:endParaRPr lang="fr-FR"/>
+          </a:p>
+        </p:txBody>
+      </p:sp>
+      <p:sp>
+        <p:nvSpPr>
+          <p:cNvPr id="6" name="ZoneTexte 5">
+            <a:extLst>
+              <a:ext uri="{FF2B5EF4-FFF2-40B4-BE49-F238E27FC236}">
+                <a16:creationId xmlns:a16="http://schemas.microsoft.com/office/drawing/2014/main" id="{45A8F20C-C6D6-7951-5CE1-F236571FC156}"/>
+              </a:ext>
+            </a:extLst>
+          </p:cNvPr>
+          <p:cNvSpPr txBox="1"/>
+          <p:nvPr/>
+        </p:nvSpPr>
+        <p:spPr>
+          <a:xfrm>
+            <a:off x="391094" y="708090"/>
+            <a:ext cx="3065254" cy="738664"/>
+          </a:xfrm>
+          <a:prstGeom prst="rect">
+            <a:avLst/>
+          </a:prstGeom>
+          <a:noFill/>
+        </p:spPr>
+        <p:txBody>
+          <a:bodyPr wrap="square" rtlCol="0">
+            <a:spAutoFit/>
+          </a:bodyPr>
+          <a:lstStyle/>
+          <a:p>
+            <a:r>
+              <a:rPr lang="fr-FR" sz="1400" b="1" dirty="0" err="1">
+                <a:solidFill>
+                  <a:srgbClr val="7030A0"/>
+                </a:solidFill>
+              </a:rPr>
+              <a:t>bulkATACseq</a:t>
+            </a:r>
+            <a:r>
+              <a:rPr lang="fr-FR" sz="1400" b="1" dirty="0">
+                <a:solidFill>
+                  <a:srgbClr val="7030A0"/>
+                </a:solidFill>
+              </a:rPr>
+              <a:t> : Grange </a:t>
+            </a:r>
+            <a:r>
+              <a:rPr lang="fr-FR" sz="1400" b="1" dirty="0" err="1">
+                <a:solidFill>
+                  <a:srgbClr val="7030A0"/>
+                </a:solidFill>
+              </a:rPr>
+              <a:t>annotated</a:t>
+            </a:r>
+            <a:r>
+              <a:rPr lang="fr-FR" sz="1400" b="1" dirty="0">
+                <a:solidFill>
+                  <a:srgbClr val="7030A0"/>
+                </a:solidFill>
+              </a:rPr>
+              <a:t> hg19 </a:t>
+            </a:r>
+            <a:r>
+              <a:rPr lang="fr-FR" sz="1400" b="1" dirty="0" err="1">
+                <a:solidFill>
+                  <a:srgbClr val="7030A0"/>
+                </a:solidFill>
+              </a:rPr>
+              <a:t>with</a:t>
+            </a:r>
+            <a:r>
+              <a:rPr lang="fr-FR" sz="1400" b="1" dirty="0">
+                <a:solidFill>
+                  <a:srgbClr val="7030A0"/>
+                </a:solidFill>
+              </a:rPr>
+              <a:t> threshold10 </a:t>
+            </a:r>
+            <a:r>
+              <a:rPr lang="fr-FR" sz="1400" b="1" dirty="0" err="1">
+                <a:solidFill>
+                  <a:srgbClr val="7030A0"/>
+                </a:solidFill>
+              </a:rPr>
+              <a:t>from</a:t>
+            </a:r>
+            <a:r>
+              <a:rPr lang="fr-FR" sz="1400" b="1" dirty="0">
+                <a:solidFill>
+                  <a:srgbClr val="7030A0"/>
+                </a:solidFill>
+              </a:rPr>
+              <a:t> </a:t>
+            </a:r>
+            <a:r>
+              <a:rPr lang="fr-FR" sz="1400" b="1" dirty="0" err="1">
+                <a:solidFill>
+                  <a:srgbClr val="7030A0"/>
+                </a:solidFill>
+              </a:rPr>
+              <a:t>bulkATACseq_R_ChangeAnnotation</a:t>
+            </a:r>
+            <a:endParaRPr lang="fr-FR" sz="1400" b="1" dirty="0">
+              <a:solidFill>
+                <a:srgbClr val="7030A0"/>
+              </a:solidFill>
+            </a:endParaRPr>
+          </a:p>
+        </p:txBody>
+      </p:sp>
+      <p:cxnSp>
+        <p:nvCxnSpPr>
+          <p:cNvPr id="7" name="Connecteur droit avec flèche 6">
+            <a:extLst>
+              <a:ext uri="{FF2B5EF4-FFF2-40B4-BE49-F238E27FC236}">
+                <a16:creationId xmlns:a16="http://schemas.microsoft.com/office/drawing/2014/main" id="{C89C1EC4-E7EF-E2F5-BC56-1620F2D8EC6D}"/>
+              </a:ext>
+            </a:extLst>
+          </p:cNvPr>
+          <p:cNvCxnSpPr>
+            <a:cxnSpLocks/>
+          </p:cNvCxnSpPr>
+          <p:nvPr/>
+        </p:nvCxnSpPr>
+        <p:spPr>
+          <a:xfrm flipH="1">
+            <a:off x="3798744" y="3429818"/>
+            <a:ext cx="258057" cy="505311"/>
+          </a:xfrm>
+          <a:prstGeom prst="straightConnector1">
+            <a:avLst/>
+          </a:prstGeom>
+          <a:ln>
+            <a:tailEnd type="triangle"/>
+          </a:ln>
+        </p:spPr>
+        <p:style>
+          <a:lnRef idx="1">
+            <a:schemeClr val="dk1"/>
+          </a:lnRef>
+          <a:fillRef idx="0">
+            <a:schemeClr val="dk1"/>
+          </a:fillRef>
+          <a:effectRef idx="0">
+            <a:schemeClr val="dk1"/>
+          </a:effectRef>
+          <a:fontRef idx="minor">
+            <a:schemeClr val="tx1"/>
+          </a:fontRef>
+        </p:style>
+      </p:cxnSp>
+      <p:cxnSp>
+        <p:nvCxnSpPr>
+          <p:cNvPr id="8" name="Connecteur droit avec flèche 7">
+            <a:extLst>
+              <a:ext uri="{FF2B5EF4-FFF2-40B4-BE49-F238E27FC236}">
+                <a16:creationId xmlns:a16="http://schemas.microsoft.com/office/drawing/2014/main" id="{66AEBCB0-B586-CE2B-9217-D06EDAA18503}"/>
+              </a:ext>
+            </a:extLst>
+          </p:cNvPr>
+          <p:cNvCxnSpPr>
+            <a:cxnSpLocks/>
+          </p:cNvCxnSpPr>
+          <p:nvPr/>
+        </p:nvCxnSpPr>
+        <p:spPr>
+          <a:xfrm flipH="1">
+            <a:off x="4857254" y="1347247"/>
+            <a:ext cx="315248" cy="509337"/>
+          </a:xfrm>
+          <a:prstGeom prst="straightConnector1">
+            <a:avLst/>
+          </a:prstGeom>
+          <a:ln>
+            <a:tailEnd type="triangle"/>
+          </a:ln>
+        </p:spPr>
+        <p:style>
+          <a:lnRef idx="1">
+            <a:schemeClr val="dk1"/>
+          </a:lnRef>
+          <a:fillRef idx="0">
+            <a:schemeClr val="dk1"/>
+          </a:fillRef>
+          <a:effectRef idx="0">
+            <a:schemeClr val="dk1"/>
+          </a:effectRef>
+          <a:fontRef idx="minor">
+            <a:schemeClr val="tx1"/>
+          </a:fontRef>
+        </p:style>
+      </p:cxnSp>
+      <p:cxnSp>
+        <p:nvCxnSpPr>
+          <p:cNvPr id="9" name="Connecteur droit avec flèche 8">
+            <a:extLst>
+              <a:ext uri="{FF2B5EF4-FFF2-40B4-BE49-F238E27FC236}">
+                <a16:creationId xmlns:a16="http://schemas.microsoft.com/office/drawing/2014/main" id="{B379CB7B-AC7D-C7B1-AED5-46951B315395}"/>
+              </a:ext>
+            </a:extLst>
+          </p:cNvPr>
+          <p:cNvCxnSpPr>
+            <a:cxnSpLocks/>
+          </p:cNvCxnSpPr>
+          <p:nvPr/>
+        </p:nvCxnSpPr>
+        <p:spPr>
+          <a:xfrm>
+            <a:off x="1441630" y="1482686"/>
+            <a:ext cx="853003" cy="2452443"/>
+          </a:xfrm>
+          <a:prstGeom prst="straightConnector1">
+            <a:avLst/>
+          </a:prstGeom>
+          <a:ln>
+            <a:tailEnd type="triangle"/>
+          </a:ln>
+        </p:spPr>
+        <p:style>
+          <a:lnRef idx="1">
+            <a:schemeClr val="dk1"/>
+          </a:lnRef>
+          <a:fillRef idx="0">
+            <a:schemeClr val="dk1"/>
+          </a:fillRef>
+          <a:effectRef idx="0">
+            <a:schemeClr val="dk1"/>
+          </a:effectRef>
+          <a:fontRef idx="minor">
+            <a:schemeClr val="tx1"/>
+          </a:fontRef>
+        </p:style>
+      </p:cxnSp>
+      <p:sp>
+        <p:nvSpPr>
+          <p:cNvPr id="12" name="ZoneTexte 11">
+            <a:extLst>
+              <a:ext uri="{FF2B5EF4-FFF2-40B4-BE49-F238E27FC236}">
+                <a16:creationId xmlns:a16="http://schemas.microsoft.com/office/drawing/2014/main" id="{A6D3201D-43AF-883F-05A2-788675CFE089}"/>
+              </a:ext>
+            </a:extLst>
+          </p:cNvPr>
+          <p:cNvSpPr txBox="1"/>
+          <p:nvPr/>
+        </p:nvSpPr>
+        <p:spPr>
+          <a:xfrm>
+            <a:off x="1272167" y="4147106"/>
+            <a:ext cx="2784634" cy="292388"/>
+          </a:xfrm>
+          <a:prstGeom prst="rect">
+            <a:avLst/>
+          </a:prstGeom>
+          <a:solidFill>
+            <a:schemeClr val="accent5">
+              <a:lumMod val="20000"/>
+              <a:lumOff val="80000"/>
+            </a:schemeClr>
+          </a:solidFill>
+        </p:spPr>
+        <p:txBody>
+          <a:bodyPr wrap="square" rtlCol="0">
+            <a:spAutoFit/>
+          </a:bodyPr>
+          <a:lstStyle/>
+          <a:p>
+            <a:pPr algn="ctr"/>
+            <a:r>
+              <a:rPr lang="fr-FR" sz="1300" dirty="0" err="1"/>
+              <a:t>scATACseq_bulkATACseq_R_overlap</a:t>
+            </a:r>
+            <a:endParaRPr lang="fr-FR" sz="1300" dirty="0"/>
+          </a:p>
+        </p:txBody>
+      </p:sp>
+      <p:sp>
+        <p:nvSpPr>
+          <p:cNvPr id="14" name="ZoneTexte 13">
+            <a:extLst>
+              <a:ext uri="{FF2B5EF4-FFF2-40B4-BE49-F238E27FC236}">
+                <a16:creationId xmlns:a16="http://schemas.microsoft.com/office/drawing/2014/main" id="{6F91D618-E628-F14E-D9FF-5153E8E053E5}"/>
+              </a:ext>
+            </a:extLst>
+          </p:cNvPr>
+          <p:cNvSpPr txBox="1"/>
+          <p:nvPr/>
+        </p:nvSpPr>
+        <p:spPr>
+          <a:xfrm>
+            <a:off x="3927773" y="1900541"/>
+            <a:ext cx="1840654" cy="492443"/>
+          </a:xfrm>
+          <a:prstGeom prst="rect">
+            <a:avLst/>
+          </a:prstGeom>
+          <a:solidFill>
+            <a:schemeClr val="accent5">
+              <a:lumMod val="20000"/>
+              <a:lumOff val="80000"/>
+            </a:schemeClr>
+          </a:solidFill>
+        </p:spPr>
+        <p:txBody>
+          <a:bodyPr wrap="square" rtlCol="0">
+            <a:spAutoFit/>
+          </a:bodyPr>
+          <a:lstStyle/>
+          <a:p>
+            <a:pPr algn="ctr"/>
+            <a:r>
+              <a:rPr lang="fr-FR" sz="1300" dirty="0" err="1"/>
+              <a:t>converted</a:t>
+            </a:r>
+            <a:r>
+              <a:rPr lang="fr-FR" sz="1300" dirty="0"/>
+              <a:t> to hg19 </a:t>
+            </a:r>
+            <a:r>
+              <a:rPr lang="fr-FR" sz="1300" dirty="0" err="1"/>
+              <a:t>peaks</a:t>
+            </a:r>
+            <a:r>
+              <a:rPr lang="fr-FR" sz="1300" dirty="0"/>
+              <a:t> on </a:t>
+            </a:r>
+            <a:r>
+              <a:rPr lang="fr-FR" sz="1300" dirty="0" err="1"/>
+              <a:t>external</a:t>
+            </a:r>
+            <a:r>
+              <a:rPr lang="fr-FR" sz="1300" dirty="0"/>
+              <a:t> </a:t>
+            </a:r>
+            <a:r>
+              <a:rPr lang="fr-FR" sz="1300" dirty="0" err="1"/>
+              <a:t>website</a:t>
+            </a:r>
+            <a:endParaRPr lang="fr-FR" sz="1300" dirty="0"/>
+          </a:p>
+        </p:txBody>
+      </p:sp>
+      <p:cxnSp>
+        <p:nvCxnSpPr>
+          <p:cNvPr id="17" name="Connecteur droit avec flèche 16">
+            <a:extLst>
+              <a:ext uri="{FF2B5EF4-FFF2-40B4-BE49-F238E27FC236}">
+                <a16:creationId xmlns:a16="http://schemas.microsoft.com/office/drawing/2014/main" id="{2F1580C2-40CA-DAF1-6B45-3D12D9FBA6CB}"/>
+              </a:ext>
+            </a:extLst>
+          </p:cNvPr>
+          <p:cNvCxnSpPr>
+            <a:cxnSpLocks/>
+          </p:cNvCxnSpPr>
+          <p:nvPr/>
+        </p:nvCxnSpPr>
+        <p:spPr>
+          <a:xfrm flipH="1">
+            <a:off x="4378324" y="2433630"/>
+            <a:ext cx="211596" cy="389506"/>
+          </a:xfrm>
+          <a:prstGeom prst="straightConnector1">
+            <a:avLst/>
+          </a:prstGeom>
+          <a:ln>
+            <a:tailEnd type="triangle"/>
+          </a:ln>
+        </p:spPr>
+        <p:style>
+          <a:lnRef idx="1">
+            <a:schemeClr val="dk1"/>
+          </a:lnRef>
+          <a:fillRef idx="0">
+            <a:schemeClr val="dk1"/>
+          </a:fillRef>
+          <a:effectRef idx="0">
+            <a:schemeClr val="dk1"/>
+          </a:effectRef>
+          <a:fontRef idx="minor">
+            <a:schemeClr val="tx1"/>
+          </a:fontRef>
+        </p:style>
+      </p:cxnSp>
+      <p:sp>
+        <p:nvSpPr>
+          <p:cNvPr id="25" name="ZoneTexte 24">
+            <a:extLst>
+              <a:ext uri="{FF2B5EF4-FFF2-40B4-BE49-F238E27FC236}">
+                <a16:creationId xmlns:a16="http://schemas.microsoft.com/office/drawing/2014/main" id="{B2130126-FBD7-5515-F530-DEFBF2316933}"/>
+              </a:ext>
+            </a:extLst>
+          </p:cNvPr>
+          <p:cNvSpPr txBox="1"/>
+          <p:nvPr/>
+        </p:nvSpPr>
+        <p:spPr>
+          <a:xfrm>
+            <a:off x="3714793" y="117900"/>
+            <a:ext cx="2972592" cy="307777"/>
+          </a:xfrm>
+          <a:prstGeom prst="rect">
+            <a:avLst/>
+          </a:prstGeom>
+          <a:noFill/>
+        </p:spPr>
+        <p:txBody>
+          <a:bodyPr wrap="square" rtlCol="0">
+            <a:spAutoFit/>
+          </a:bodyPr>
+          <a:lstStyle/>
+          <a:p>
+            <a:r>
+              <a:rPr lang="fr-FR" sz="1400" b="1" dirty="0">
+                <a:effectLst>
+                  <a:outerShdw blurRad="38100" dist="38100" dir="2700000" algn="tl">
+                    <a:srgbClr val="000000">
+                      <a:alpha val="43137"/>
+                    </a:srgbClr>
+                  </a:outerShdw>
+                </a:effectLst>
+              </a:rPr>
+              <a:t>Workflow </a:t>
+            </a:r>
+            <a:r>
+              <a:rPr lang="fr-FR" sz="1400" b="1" dirty="0" err="1">
+                <a:effectLst>
+                  <a:outerShdw blurRad="38100" dist="38100" dir="2700000" algn="tl">
+                    <a:srgbClr val="000000">
+                      <a:alpha val="43137"/>
+                    </a:srgbClr>
+                  </a:outerShdw>
+                </a:effectLst>
+              </a:rPr>
+              <a:t>bulkATACseq</a:t>
+            </a:r>
+            <a:r>
+              <a:rPr lang="fr-FR" sz="1400" b="1" dirty="0">
+                <a:effectLst>
+                  <a:outerShdw blurRad="38100" dist="38100" dir="2700000" algn="tl">
+                    <a:srgbClr val="000000">
+                      <a:alpha val="43137"/>
+                    </a:srgbClr>
+                  </a:outerShdw>
+                </a:effectLst>
+              </a:rPr>
+              <a:t> VS </a:t>
+            </a:r>
+            <a:r>
+              <a:rPr lang="fr-FR" sz="1400" b="1" dirty="0" err="1">
+                <a:effectLst>
+                  <a:outerShdw blurRad="38100" dist="38100" dir="2700000" algn="tl">
+                    <a:srgbClr val="000000">
+                      <a:alpha val="43137"/>
+                    </a:srgbClr>
+                  </a:outerShdw>
+                </a:effectLst>
+              </a:rPr>
+              <a:t>scATACseq</a:t>
+            </a:r>
+            <a:endParaRPr lang="fr-FR" sz="1400" b="1" dirty="0">
+              <a:effectLst>
+                <a:outerShdw blurRad="38100" dist="38100" dir="2700000" algn="tl">
+                  <a:srgbClr val="000000">
+                    <a:alpha val="43137"/>
+                  </a:srgbClr>
+                </a:outerShdw>
+              </a:effectLst>
+            </a:endParaRPr>
+          </a:p>
+        </p:txBody>
+      </p:sp>
+      <p:sp>
+        <p:nvSpPr>
+          <p:cNvPr id="26" name="ZoneTexte 25">
+            <a:extLst>
+              <a:ext uri="{FF2B5EF4-FFF2-40B4-BE49-F238E27FC236}">
+                <a16:creationId xmlns:a16="http://schemas.microsoft.com/office/drawing/2014/main" id="{28436D8E-4D65-2909-286C-2D77086DC2C2}"/>
+              </a:ext>
+            </a:extLst>
+          </p:cNvPr>
+          <p:cNvSpPr txBox="1"/>
+          <p:nvPr/>
+        </p:nvSpPr>
+        <p:spPr>
+          <a:xfrm>
+            <a:off x="4378324" y="753006"/>
+            <a:ext cx="2226125" cy="523220"/>
+          </a:xfrm>
+          <a:prstGeom prst="rect">
+            <a:avLst/>
+          </a:prstGeom>
+          <a:noFill/>
+        </p:spPr>
+        <p:txBody>
+          <a:bodyPr wrap="square" rtlCol="0">
+            <a:spAutoFit/>
+          </a:bodyPr>
+          <a:lstStyle/>
+          <a:p>
+            <a:r>
+              <a:rPr lang="fr-FR" sz="1400" b="1" dirty="0" err="1">
+                <a:solidFill>
+                  <a:srgbClr val="7030A0"/>
+                </a:solidFill>
+              </a:rPr>
+              <a:t>scATACseq</a:t>
+            </a:r>
+            <a:r>
+              <a:rPr lang="fr-FR" sz="1400" b="1" dirty="0">
+                <a:solidFill>
+                  <a:srgbClr val="7030A0"/>
+                </a:solidFill>
+              </a:rPr>
+              <a:t> : hg38 </a:t>
+            </a:r>
+            <a:r>
+              <a:rPr lang="fr-FR" sz="1400" b="1" dirty="0" err="1">
+                <a:solidFill>
+                  <a:srgbClr val="7030A0"/>
+                </a:solidFill>
+              </a:rPr>
+              <a:t>peaks</a:t>
+            </a:r>
+            <a:r>
+              <a:rPr lang="fr-FR" sz="1400" b="1" dirty="0">
+                <a:solidFill>
+                  <a:srgbClr val="7030A0"/>
+                </a:solidFill>
+              </a:rPr>
+              <a:t> .</a:t>
+            </a:r>
+            <a:r>
+              <a:rPr lang="fr-FR" sz="1400" b="1" dirty="0" err="1">
+                <a:solidFill>
+                  <a:srgbClr val="7030A0"/>
+                </a:solidFill>
+              </a:rPr>
+              <a:t>bed</a:t>
+            </a:r>
+            <a:r>
+              <a:rPr lang="fr-FR" sz="1400" b="1" dirty="0">
+                <a:solidFill>
+                  <a:srgbClr val="7030A0"/>
+                </a:solidFill>
+              </a:rPr>
+              <a:t> </a:t>
+            </a:r>
+            <a:r>
+              <a:rPr lang="fr-FR" sz="1400" b="1" dirty="0" err="1">
+                <a:solidFill>
+                  <a:srgbClr val="7030A0"/>
+                </a:solidFill>
+              </a:rPr>
+              <a:t>without</a:t>
+            </a:r>
+            <a:r>
+              <a:rPr lang="fr-FR" sz="1400" b="1" dirty="0">
+                <a:solidFill>
+                  <a:srgbClr val="7030A0"/>
+                </a:solidFill>
+              </a:rPr>
+              <a:t> annotation</a:t>
+            </a:r>
+          </a:p>
+        </p:txBody>
+      </p:sp>
+      <p:sp>
+        <p:nvSpPr>
+          <p:cNvPr id="29" name="ZoneTexte 28">
+            <a:extLst>
+              <a:ext uri="{FF2B5EF4-FFF2-40B4-BE49-F238E27FC236}">
+                <a16:creationId xmlns:a16="http://schemas.microsoft.com/office/drawing/2014/main" id="{8D6C87C4-4FC1-09AB-AEA3-CF31F499B371}"/>
+              </a:ext>
+            </a:extLst>
+          </p:cNvPr>
+          <p:cNvSpPr txBox="1"/>
+          <p:nvPr/>
+        </p:nvSpPr>
+        <p:spPr>
+          <a:xfrm>
+            <a:off x="3441707" y="2869060"/>
+            <a:ext cx="1840654" cy="492443"/>
+          </a:xfrm>
+          <a:prstGeom prst="rect">
+            <a:avLst/>
+          </a:prstGeom>
+          <a:solidFill>
+            <a:schemeClr val="accent5">
+              <a:lumMod val="20000"/>
+              <a:lumOff val="80000"/>
+            </a:schemeClr>
+          </a:solidFill>
+        </p:spPr>
+        <p:txBody>
+          <a:bodyPr wrap="square" rtlCol="0">
+            <a:spAutoFit/>
+          </a:bodyPr>
+          <a:lstStyle/>
+          <a:p>
+            <a:pPr algn="ctr"/>
+            <a:r>
+              <a:rPr lang="fr-FR" sz="1300" dirty="0" err="1"/>
+              <a:t>scATACseq_bulkATACseq_R_SwitchGenome</a:t>
+            </a:r>
+            <a:endParaRPr lang="fr-FR" sz="1300" dirty="0"/>
+          </a:p>
+        </p:txBody>
+      </p:sp>
+    </p:spTree>
+    <p:extLst>
+      <p:ext uri="{BB962C8B-B14F-4D97-AF65-F5344CB8AC3E}">
+        <p14:creationId xmlns:p14="http://schemas.microsoft.com/office/powerpoint/2010/main" val="3326097339"/>
       </p:ext>
     </p:extLst>
   </p:cSld>

</xml_diff>